<commit_message>
edist deviation-variance law-of-large-numbers.pptx, typos Jenn_Final_Problems
</commit_message>
<xml_diff>
--- a/spring13/slides13/deviation-variance.pptx
+++ b/spring13/slides13/deviation-variance.pptx
@@ -6,10 +6,10 @@
     <p:sldMasterId id="2147483687" r:id="rId2"/>
   </p:sldMasterIdLst>
   <p:notesMasterIdLst>
-    <p:notesMasterId r:id="rId20"/>
+    <p:notesMasterId r:id="rId23"/>
   </p:notesMasterIdLst>
   <p:handoutMasterIdLst>
-    <p:handoutMasterId r:id="rId21"/>
+    <p:handoutMasterId r:id="rId24"/>
   </p:handoutMasterIdLst>
   <p:sldIdLst>
     <p:sldId id="764" r:id="rId3"/>
@@ -21,19 +21,22 @@
     <p:sldId id="833" r:id="rId9"/>
     <p:sldId id="834" r:id="rId10"/>
     <p:sldId id="853" r:id="rId11"/>
-    <p:sldId id="854" r:id="rId12"/>
-    <p:sldId id="856" r:id="rId13"/>
-    <p:sldId id="857" r:id="rId14"/>
-    <p:sldId id="858" r:id="rId15"/>
-    <p:sldId id="852" r:id="rId16"/>
-    <p:sldId id="836" r:id="rId17"/>
-    <p:sldId id="860" r:id="rId18"/>
-    <p:sldId id="804" r:id="rId19"/>
+    <p:sldId id="861" r:id="rId12"/>
+    <p:sldId id="862" r:id="rId13"/>
+    <p:sldId id="863" r:id="rId14"/>
+    <p:sldId id="854" r:id="rId15"/>
+    <p:sldId id="864" r:id="rId16"/>
+    <p:sldId id="865" r:id="rId17"/>
+    <p:sldId id="858" r:id="rId18"/>
+    <p:sldId id="852" r:id="rId19"/>
+    <p:sldId id="836" r:id="rId20"/>
+    <p:sldId id="860" r:id="rId21"/>
+    <p:sldId id="804" r:id="rId22"/>
   </p:sldIdLst>
   <p:sldSz cx="9144000" cy="6858000" type="screen4x3"/>
   <p:notesSz cx="9601200" cy="7315200"/>
   <p:custDataLst>
-    <p:tags r:id="rId23"/>
+    <p:tags r:id="rId26"/>
   </p:custDataLst>
   <p:defaultTextStyle>
     <a:defPPr>
@@ -980,7 +983,7 @@
             <a:fld id="{A51DC426-842B-423B-9866-ADC9A79455AB}" type="slidenum">
               <a:rPr lang="en-US"/>
               <a:pPr/>
-              <a:t>10</a:t>
+              <a:t>12</a:t>
             </a:fld>
             <a:endParaRPr lang="en-US"/>
           </a:p>
@@ -1068,7 +1071,7 @@
             <a:fld id="{A51DC426-842B-423B-9866-ADC9A79455AB}" type="slidenum">
               <a:rPr lang="en-US"/>
               <a:pPr/>
-              <a:t>11</a:t>
+              <a:t>13</a:t>
             </a:fld>
             <a:endParaRPr lang="en-US"/>
           </a:p>
@@ -1156,7 +1159,7 @@
             <a:fld id="{A51DC426-842B-423B-9866-ADC9A79455AB}" type="slidenum">
               <a:rPr lang="en-US"/>
               <a:pPr/>
-              <a:t>12</a:t>
+              <a:t>14</a:t>
             </a:fld>
             <a:endParaRPr lang="en-US"/>
           </a:p>
@@ -1244,7 +1247,7 @@
             <a:fld id="{A51DC426-842B-423B-9866-ADC9A79455AB}" type="slidenum">
               <a:rPr lang="en-US"/>
               <a:pPr/>
-              <a:t>13</a:t>
+              <a:t>15</a:t>
             </a:fld>
             <a:endParaRPr lang="en-US"/>
           </a:p>
@@ -1332,7 +1335,7 @@
             <a:fld id="{A51DC426-842B-423B-9866-ADC9A79455AB}" type="slidenum">
               <a:rPr lang="en-US"/>
               <a:pPr/>
-              <a:t>14</a:t>
+              <a:t>16</a:t>
             </a:fld>
             <a:endParaRPr lang="en-US"/>
           </a:p>
@@ -1417,10 +1420,10 @@
           <a:bodyPr/>
           <a:lstStyle/>
           <a:p>
-            <a:fld id="{2BDCB961-47F7-401D-B9AA-8D197EFC2C04}" type="slidenum">
+            <a:fld id="{A51DC426-842B-423B-9866-ADC9A79455AB}" type="slidenum">
               <a:rPr lang="en-US"/>
               <a:pPr/>
-              <a:t>15</a:t>
+              <a:t>17</a:t>
             </a:fld>
             <a:endParaRPr lang="en-US"/>
           </a:p>
@@ -1428,7 +1431,7 @@
       </p:sp>
       <p:sp>
         <p:nvSpPr>
-          <p:cNvPr id="107522" name="Rectangle 2"/>
+          <p:cNvPr id="105474" name="Rectangle 2"/>
           <p:cNvSpPr>
             <a:spLocks noGrp="1" noRot="1" noChangeAspect="1" noChangeArrowheads="1" noTextEdit="1"/>
           </p:cNvSpPr>
@@ -1446,7 +1449,7 @@
       </p:sp>
       <p:sp>
         <p:nvSpPr>
-          <p:cNvPr id="107523" name="Rectangle 3"/>
+          <p:cNvPr id="105475" name="Rectangle 3"/>
           <p:cNvSpPr>
             <a:spLocks noGrp="1" noChangeArrowheads="1"/>
           </p:cNvSpPr>
@@ -1508,7 +1511,7 @@
             <a:fld id="{2BDCB961-47F7-401D-B9AA-8D197EFC2C04}" type="slidenum">
               <a:rPr lang="en-US"/>
               <a:pPr/>
-              <a:t>16</a:t>
+              <a:t>18</a:t>
             </a:fld>
             <a:endParaRPr lang="en-US"/>
           </a:p>
@@ -1578,6 +1581,94 @@
       </p:grpSpPr>
       <p:sp>
         <p:nvSpPr>
+          <p:cNvPr id="7" name="Rectangle 7"/>
+          <p:cNvSpPr>
+            <a:spLocks noGrp="1" noChangeArrowheads="1"/>
+          </p:cNvSpPr>
+          <p:nvPr>
+            <p:ph type="sldNum" sz="quarter" idx="5"/>
+          </p:nvPr>
+        </p:nvSpPr>
+        <p:spPr>
+          <a:ln/>
+        </p:spPr>
+        <p:txBody>
+          <a:bodyPr/>
+          <a:lstStyle/>
+          <a:p>
+            <a:fld id="{2BDCB961-47F7-401D-B9AA-8D197EFC2C04}" type="slidenum">
+              <a:rPr lang="en-US"/>
+              <a:pPr/>
+              <a:t>19</a:t>
+            </a:fld>
+            <a:endParaRPr lang="en-US"/>
+          </a:p>
+        </p:txBody>
+      </p:sp>
+      <p:sp>
+        <p:nvSpPr>
+          <p:cNvPr id="107522" name="Rectangle 2"/>
+          <p:cNvSpPr>
+            <a:spLocks noGrp="1" noRot="1" noChangeAspect="1" noChangeArrowheads="1" noTextEdit="1"/>
+          </p:cNvSpPr>
+          <p:nvPr>
+            <p:ph type="sldImg"/>
+          </p:nvPr>
+        </p:nvSpPr>
+        <p:spPr>
+          <a:xfrm>
+            <a:off x="2974975" y="549275"/>
+            <a:ext cx="3657600" cy="2743200"/>
+          </a:xfrm>
+          <a:ln/>
+        </p:spPr>
+      </p:sp>
+      <p:sp>
+        <p:nvSpPr>
+          <p:cNvPr id="107523" name="Rectangle 3"/>
+          <p:cNvSpPr>
+            <a:spLocks noGrp="1" noChangeArrowheads="1"/>
+          </p:cNvSpPr>
+          <p:nvPr>
+            <p:ph type="body" idx="1"/>
+          </p:nvPr>
+        </p:nvSpPr>
+        <p:spPr/>
+        <p:txBody>
+          <a:bodyPr/>
+          <a:lstStyle/>
+          <a:p>
+            <a:endParaRPr lang="en-US"/>
+          </a:p>
+        </p:txBody>
+      </p:sp>
+    </p:spTree>
+  </p:cSld>
+  <p:clrMapOvr>
+    <a:masterClrMapping/>
+  </p:clrMapOvr>
+</p:notes>
+</file>
+
+<file path=ppt/notesSlides/notesSlide18.xml><?xml version="1.0" encoding="utf-8"?>
+<p:notes xmlns:a="http://schemas.openxmlformats.org/drawingml/2006/main" xmlns:r="http://schemas.openxmlformats.org/officeDocument/2006/relationships" xmlns:p="http://schemas.openxmlformats.org/presentationml/2006/main">
+  <p:cSld>
+    <p:spTree>
+      <p:nvGrpSpPr>
+        <p:cNvPr id="1" name=""/>
+        <p:cNvGrpSpPr/>
+        <p:nvPr/>
+      </p:nvGrpSpPr>
+      <p:grpSpPr>
+        <a:xfrm>
+          <a:off x="0" y="0"/>
+          <a:ext cx="0" cy="0"/>
+          <a:chOff x="0" y="0"/>
+          <a:chExt cx="0" cy="0"/>
+        </a:xfrm>
+      </p:grpSpPr>
+      <p:sp>
+        <p:nvSpPr>
           <p:cNvPr id="91138" name="Rectangle 7"/>
           <p:cNvSpPr>
             <a:spLocks noGrp="1" noChangeArrowheads="1"/>
@@ -1596,7 +1687,7 @@
             <a:fld id="{38A214EA-5A11-4F74-BE22-31FC84D62DF5}" type="slidenum">
               <a:rPr lang="en-US"/>
               <a:pPr/>
-              <a:t>17</a:t>
+              <a:t>20</a:t>
             </a:fld>
             <a:endParaRPr lang="en-US"/>
           </a:p>
@@ -4587,6 +4678,933 @@
           <a:chExt cx="0" cy="0"/>
         </a:xfrm>
       </p:grpSpPr>
+      <p:sp>
+        <p:nvSpPr>
+          <p:cNvPr id="3" name="TextBox 2"/>
+          <p:cNvSpPr txBox="1"/>
+          <p:nvPr/>
+        </p:nvSpPr>
+        <p:spPr>
+          <a:xfrm>
+            <a:off x="508000" y="1003300"/>
+            <a:ext cx="7630142" cy="1754327"/>
+          </a:xfrm>
+          <a:prstGeom prst="rect">
+            <a:avLst/>
+          </a:prstGeom>
+          <a:noFill/>
+        </p:spPr>
+        <p:txBody>
+          <a:bodyPr wrap="none" rtlCol="0">
+            <a:spAutoFit/>
+          </a:bodyPr>
+          <a:lstStyle/>
+          <a:p>
+            <a:r>
+              <a:rPr lang="en-US" sz="5400" dirty="0" smtClean="0">
+                <a:solidFill>
+                  <a:srgbClr val="660066"/>
+                </a:solidFill>
+                <a:latin typeface="Comic Sans MS"/>
+                <a:cs typeface="Comic Sans MS"/>
+              </a:rPr>
+              <a:t>lemma: </a:t>
+            </a:r>
+            <a:r>
+              <a:rPr lang="en-US" sz="5400" dirty="0" smtClean="0">
+                <a:latin typeface="Comic Sans MS"/>
+                <a:cs typeface="Comic Sans MS"/>
+              </a:rPr>
+              <a:t>For </a:t>
+            </a:r>
+            <a:r>
+              <a:rPr lang="en-US" sz="5400" dirty="0" smtClean="0">
+                <a:solidFill>
+                  <a:srgbClr val="008000"/>
+                </a:solidFill>
+                <a:latin typeface="Comic Sans MS"/>
+                <a:cs typeface="Comic Sans MS"/>
+              </a:rPr>
+              <a:t>F</a:t>
+            </a:r>
+            <a:r>
+              <a:rPr lang="en-US" sz="5400" dirty="0" smtClean="0">
+                <a:latin typeface="Comic Sans MS"/>
+                <a:cs typeface="Comic Sans MS"/>
+              </a:rPr>
+              <a:t> </a:t>
+            </a:r>
+            <a:r>
+              <a:rPr lang="en-US" sz="5400" b="1" dirty="0" smtClean="0">
+                <a:latin typeface="Euclid Symbol" charset="2"/>
+                <a:cs typeface="Euclid Symbol" charset="2"/>
+              </a:rPr>
+              <a:t>=</a:t>
+            </a:r>
+            <a:r>
+              <a:rPr lang="en-US" sz="5400" dirty="0" smtClean="0">
+                <a:latin typeface="Comic Sans MS"/>
+                <a:cs typeface="Comic Sans MS"/>
+              </a:rPr>
+              <a:t> time to</a:t>
+            </a:r>
+          </a:p>
+          <a:p>
+            <a:r>
+              <a:rPr lang="en-US" sz="5400" dirty="0" smtClean="0">
+                <a:latin typeface="Comic Sans MS"/>
+                <a:cs typeface="Comic Sans MS"/>
+              </a:rPr>
+              <a:t>failure,                 ,</a:t>
+            </a:r>
+          </a:p>
+        </p:txBody>
+      </p:sp>
+      <p:graphicFrame>
+        <p:nvGraphicFramePr>
+          <p:cNvPr id="4" name="Object 3"/>
+          <p:cNvGraphicFramePr>
+            <a:graphicFrameLocks noChangeAspect="1"/>
+          </p:cNvGraphicFramePr>
+          <p:nvPr>
+            <p:extLst>
+              <p:ext uri="{D42A27DB-BD31-4B8C-83A1-F6EECF244321}">
+                <p14:modId xmlns:p14="http://schemas.microsoft.com/office/powerpoint/2010/main" val="2791904282"/>
+              </p:ext>
+            </p:extLst>
+          </p:nvPr>
+        </p:nvGraphicFramePr>
+        <p:xfrm>
+          <a:off x="366713" y="2933700"/>
+          <a:ext cx="4389437" cy="1020763"/>
+        </p:xfrm>
+        <a:graphic>
+          <a:graphicData uri="http://schemas.openxmlformats.org/presentationml/2006/ole">
+            <mc:AlternateContent xmlns:mc="http://schemas.openxmlformats.org/markup-compatibility/2006">
+              <mc:Choice xmlns:v="urn:schemas-microsoft-com:vml" Requires="v">
+                <p:oleObj spid="_x0000_s506898" name="Equation" r:id="rId3" imgW="1054100" imgH="241300" progId="Equation.DSMT4">
+                  <p:embed/>
+                </p:oleObj>
+              </mc:Choice>
+              <mc:Fallback>
+                <p:oleObj name="Equation" r:id="rId3" imgW="1054100" imgH="241300" progId="Equation.DSMT4">
+                  <p:embed/>
+                  <p:pic>
+                    <p:nvPicPr>
+                      <p:cNvPr id="0" name=""/>
+                      <p:cNvPicPr/>
+                      <p:nvPr/>
+                    </p:nvPicPr>
+                    <p:blipFill>
+                      <a:blip r:embed="rId4"/>
+                      <a:stretch>
+                        <a:fillRect/>
+                      </a:stretch>
+                    </p:blipFill>
+                    <p:spPr>
+                      <a:xfrm>
+                        <a:off x="366713" y="2933700"/>
+                        <a:ext cx="4389437" cy="1020763"/>
+                      </a:xfrm>
+                      <a:prstGeom prst="rect">
+                        <a:avLst/>
+                      </a:prstGeom>
+                    </p:spPr>
+                  </p:pic>
+                </p:oleObj>
+              </mc:Fallback>
+            </mc:AlternateContent>
+          </a:graphicData>
+        </a:graphic>
+      </p:graphicFrame>
+      <p:graphicFrame>
+        <p:nvGraphicFramePr>
+          <p:cNvPr id="5" name="Object 4"/>
+          <p:cNvGraphicFramePr>
+            <a:graphicFrameLocks noChangeAspect="1"/>
+          </p:cNvGraphicFramePr>
+          <p:nvPr>
+            <p:extLst>
+              <p:ext uri="{D42A27DB-BD31-4B8C-83A1-F6EECF244321}">
+                <p14:modId xmlns:p14="http://schemas.microsoft.com/office/powerpoint/2010/main" val="107358021"/>
+              </p:ext>
+            </p:extLst>
+          </p:nvPr>
+        </p:nvGraphicFramePr>
+        <p:xfrm>
+          <a:off x="3067050" y="1854199"/>
+          <a:ext cx="3464300" cy="1090613"/>
+        </p:xfrm>
+        <a:graphic>
+          <a:graphicData uri="http://schemas.openxmlformats.org/presentationml/2006/ole">
+            <mc:AlternateContent xmlns:mc="http://schemas.openxmlformats.org/markup-compatibility/2006">
+              <mc:Choice xmlns:v="urn:schemas-microsoft-com:vml" Requires="v">
+                <p:oleObj spid="_x0000_s506899" name="Equation" r:id="rId5" imgW="685800" imgH="215900" progId="Equation.DSMT4">
+                  <p:embed/>
+                </p:oleObj>
+              </mc:Choice>
+              <mc:Fallback>
+                <p:oleObj name="Equation" r:id="rId5" imgW="685800" imgH="215900" progId="Equation.DSMT4">
+                  <p:embed/>
+                  <p:pic>
+                    <p:nvPicPr>
+                      <p:cNvPr id="0" name=""/>
+                      <p:cNvPicPr/>
+                      <p:nvPr/>
+                    </p:nvPicPr>
+                    <p:blipFill>
+                      <a:blip r:embed="rId6"/>
+                      <a:stretch>
+                        <a:fillRect/>
+                      </a:stretch>
+                    </p:blipFill>
+                    <p:spPr>
+                      <a:xfrm>
+                        <a:off x="3067050" y="1854199"/>
+                        <a:ext cx="3464300" cy="1090613"/>
+                      </a:xfrm>
+                      <a:prstGeom prst="rect">
+                        <a:avLst/>
+                      </a:prstGeom>
+                    </p:spPr>
+                  </p:pic>
+                </p:oleObj>
+              </mc:Fallback>
+            </mc:AlternateContent>
+          </a:graphicData>
+        </a:graphic>
+      </p:graphicFrame>
+      <p:sp>
+        <p:nvSpPr>
+          <p:cNvPr id="6" name="TextBox 5"/>
+          <p:cNvSpPr txBox="1"/>
+          <p:nvPr/>
+        </p:nvSpPr>
+        <p:spPr>
+          <a:xfrm>
+            <a:off x="1257300" y="190500"/>
+            <a:ext cx="7693332" cy="830997"/>
+          </a:xfrm>
+          <a:prstGeom prst="rect">
+            <a:avLst/>
+          </a:prstGeom>
+          <a:noFill/>
+        </p:spPr>
+        <p:txBody>
+          <a:bodyPr wrap="none" rtlCol="0">
+            <a:spAutoFit/>
+          </a:bodyPr>
+          <a:lstStyle/>
+          <a:p>
+            <a:r>
+              <a:rPr lang="en-US" sz="4800" dirty="0" smtClean="0">
+                <a:latin typeface="Comic Sans MS"/>
+                <a:cs typeface="Comic Sans MS"/>
+              </a:rPr>
+              <a:t>Conditional time to failure</a:t>
+            </a:r>
+          </a:p>
+        </p:txBody>
+      </p:sp>
+    </p:spTree>
+    <p:extLst>
+      <p:ext uri="{BB962C8B-B14F-4D97-AF65-F5344CB8AC3E}">
+        <p14:creationId xmlns:p14="http://schemas.microsoft.com/office/powerpoint/2010/main" val="607201947"/>
+      </p:ext>
+    </p:extLst>
+  </p:cSld>
+  <p:clrMapOvr>
+    <a:masterClrMapping/>
+  </p:clrMapOvr>
+  <p:transition xmlns:p14="http://schemas.microsoft.com/office/powerpoint/2010/main" spd="slow" advClick="0">
+    <p:fade/>
+  </p:transition>
+  <p:timing>
+    <p:tnLst>
+      <p:par>
+        <p:cTn xmlns:p14="http://schemas.microsoft.com/office/powerpoint/2010/main" id="1" dur="indefinite" restart="never" nodeType="tmRoot">
+          <p:childTnLst>
+            <p:seq concurrent="1" nextAc="seek">
+              <p:cTn id="2" dur="indefinite" nodeType="mainSeq">
+                <p:childTnLst>
+                  <p:par>
+                    <p:cTn id="3" fill="hold">
+                      <p:stCondLst>
+                        <p:cond delay="indefinite"/>
+                      </p:stCondLst>
+                      <p:childTnLst>
+                        <p:par>
+                          <p:cTn id="4" fill="hold">
+                            <p:stCondLst>
+                              <p:cond delay="0"/>
+                            </p:stCondLst>
+                            <p:childTnLst>
+                              <p:par>
+                                <p:cTn id="5" presetID="10" presetClass="entr" presetSubtype="0" fill="hold" grpId="0" nodeType="clickEffect">
+                                  <p:stCondLst>
+                                    <p:cond delay="0"/>
+                                  </p:stCondLst>
+                                  <p:childTnLst>
+                                    <p:set>
+                                      <p:cBhvr>
+                                        <p:cTn id="6" dur="1" fill="hold">
+                                          <p:stCondLst>
+                                            <p:cond delay="0"/>
+                                          </p:stCondLst>
+                                        </p:cTn>
+                                        <p:tgtEl>
+                                          <p:spTgt spid="3"/>
+                                        </p:tgtEl>
+                                        <p:attrNameLst>
+                                          <p:attrName>style.visibility</p:attrName>
+                                        </p:attrNameLst>
+                                      </p:cBhvr>
+                                      <p:to>
+                                        <p:strVal val="visible"/>
+                                      </p:to>
+                                    </p:set>
+                                    <p:animEffect transition="in" filter="fade">
+                                      <p:cBhvr>
+                                        <p:cTn id="7" dur="500"/>
+                                        <p:tgtEl>
+                                          <p:spTgt spid="3"/>
+                                        </p:tgtEl>
+                                      </p:cBhvr>
+                                    </p:animEffect>
+                                  </p:childTnLst>
+                                </p:cTn>
+                              </p:par>
+                              <p:par>
+                                <p:cTn id="8" presetID="10" presetClass="entr" presetSubtype="0" fill="hold" nodeType="withEffect">
+                                  <p:stCondLst>
+                                    <p:cond delay="0"/>
+                                  </p:stCondLst>
+                                  <p:childTnLst>
+                                    <p:set>
+                                      <p:cBhvr>
+                                        <p:cTn id="9" dur="1" fill="hold">
+                                          <p:stCondLst>
+                                            <p:cond delay="0"/>
+                                          </p:stCondLst>
+                                        </p:cTn>
+                                        <p:tgtEl>
+                                          <p:spTgt spid="5"/>
+                                        </p:tgtEl>
+                                        <p:attrNameLst>
+                                          <p:attrName>style.visibility</p:attrName>
+                                        </p:attrNameLst>
+                                      </p:cBhvr>
+                                      <p:to>
+                                        <p:strVal val="visible"/>
+                                      </p:to>
+                                    </p:set>
+                                    <p:animEffect transition="in" filter="fade">
+                                      <p:cBhvr>
+                                        <p:cTn id="10" dur="500"/>
+                                        <p:tgtEl>
+                                          <p:spTgt spid="5"/>
+                                        </p:tgtEl>
+                                      </p:cBhvr>
+                                    </p:animEffect>
+                                  </p:childTnLst>
+                                </p:cTn>
+                              </p:par>
+                            </p:childTnLst>
+                          </p:cTn>
+                        </p:par>
+                      </p:childTnLst>
+                    </p:cTn>
+                  </p:par>
+                  <p:par>
+                    <p:cTn id="11" fill="hold">
+                      <p:stCondLst>
+                        <p:cond delay="indefinite"/>
+                      </p:stCondLst>
+                      <p:childTnLst>
+                        <p:par>
+                          <p:cTn id="12" fill="hold">
+                            <p:stCondLst>
+                              <p:cond delay="0"/>
+                            </p:stCondLst>
+                            <p:childTnLst>
+                              <p:par>
+                                <p:cTn id="13" presetID="22" presetClass="entr" presetSubtype="8" fill="hold" nodeType="clickEffect">
+                                  <p:stCondLst>
+                                    <p:cond delay="0"/>
+                                  </p:stCondLst>
+                                  <p:childTnLst>
+                                    <p:set>
+                                      <p:cBhvr>
+                                        <p:cTn id="14" dur="1" fill="hold">
+                                          <p:stCondLst>
+                                            <p:cond delay="0"/>
+                                          </p:stCondLst>
+                                        </p:cTn>
+                                        <p:tgtEl>
+                                          <p:spTgt spid="4"/>
+                                        </p:tgtEl>
+                                        <p:attrNameLst>
+                                          <p:attrName>style.visibility</p:attrName>
+                                        </p:attrNameLst>
+                                      </p:cBhvr>
+                                      <p:to>
+                                        <p:strVal val="visible"/>
+                                      </p:to>
+                                    </p:set>
+                                    <p:animEffect transition="in" filter="wipe(left)">
+                                      <p:cBhvr>
+                                        <p:cTn id="15" dur="2000"/>
+                                        <p:tgtEl>
+                                          <p:spTgt spid="4"/>
+                                        </p:tgtEl>
+                                      </p:cBhvr>
+                                    </p:animEffect>
+                                  </p:childTnLst>
+                                </p:cTn>
+                              </p:par>
+                            </p:childTnLst>
+                          </p:cTn>
+                        </p:par>
+                      </p:childTnLst>
+                    </p:cTn>
+                  </p:par>
+                </p:childTnLst>
+              </p:cTn>
+              <p:prevCondLst>
+                <p:cond evt="onPrev" delay="0">
+                  <p:tgtEl>
+                    <p:sldTgt/>
+                  </p:tgtEl>
+                </p:cond>
+              </p:prevCondLst>
+              <p:nextCondLst>
+                <p:cond evt="onNext" delay="0">
+                  <p:tgtEl>
+                    <p:sldTgt/>
+                  </p:tgtEl>
+                </p:cond>
+              </p:nextCondLst>
+            </p:seq>
+          </p:childTnLst>
+        </p:cTn>
+      </p:par>
+    </p:tnLst>
+    <p:bldLst>
+      <p:bldP spid="3" grpId="0"/>
+    </p:bldLst>
+  </p:timing>
+</p:sld>
+</file>
+
+<file path=ppt/slides/slide11.xml><?xml version="1.0" encoding="utf-8"?>
+<p:sld xmlns:a="http://schemas.openxmlformats.org/drawingml/2006/main" xmlns:r="http://schemas.openxmlformats.org/officeDocument/2006/relationships" xmlns:p="http://schemas.openxmlformats.org/presentationml/2006/main">
+  <p:cSld>
+    <p:spTree>
+      <p:nvGrpSpPr>
+        <p:cNvPr id="1" name=""/>
+        <p:cNvGrpSpPr/>
+        <p:nvPr/>
+      </p:nvGrpSpPr>
+      <p:grpSpPr>
+        <a:xfrm>
+          <a:off x="0" y="0"/>
+          <a:ext cx="0" cy="0"/>
+          <a:chOff x="0" y="0"/>
+          <a:chExt cx="0" cy="0"/>
+        </a:xfrm>
+      </p:grpSpPr>
+      <p:graphicFrame>
+        <p:nvGraphicFramePr>
+          <p:cNvPr id="2" name="Object 1"/>
+          <p:cNvGraphicFramePr>
+            <a:graphicFrameLocks noChangeAspect="1"/>
+          </p:cNvGraphicFramePr>
+          <p:nvPr>
+            <p:extLst>
+              <p:ext uri="{D42A27DB-BD31-4B8C-83A1-F6EECF244321}">
+                <p14:modId xmlns:p14="http://schemas.microsoft.com/office/powerpoint/2010/main" val="2761167265"/>
+              </p:ext>
+            </p:extLst>
+          </p:nvPr>
+        </p:nvGraphicFramePr>
+        <p:xfrm>
+          <a:off x="617537" y="5080000"/>
+          <a:ext cx="8220076" cy="1258888"/>
+        </p:xfrm>
+        <a:graphic>
+          <a:graphicData uri="http://schemas.openxmlformats.org/presentationml/2006/ole">
+            <mc:AlternateContent xmlns:mc="http://schemas.openxmlformats.org/markup-compatibility/2006">
+              <mc:Choice xmlns:v="urn:schemas-microsoft-com:vml" Requires="v">
+                <p:oleObj spid="_x0000_s507921" name="Equation" r:id="rId3" imgW="1574800" imgH="241300" progId="Equation.DSMT4">
+                  <p:embed/>
+                </p:oleObj>
+              </mc:Choice>
+              <mc:Fallback>
+                <p:oleObj name="Equation" r:id="rId3" imgW="1574800" imgH="241300" progId="Equation.DSMT4">
+                  <p:embed/>
+                  <p:pic>
+                    <p:nvPicPr>
+                      <p:cNvPr id="0" name=""/>
+                      <p:cNvPicPr/>
+                      <p:nvPr/>
+                    </p:nvPicPr>
+                    <p:blipFill>
+                      <a:blip r:embed="rId4"/>
+                      <a:stretch>
+                        <a:fillRect/>
+                      </a:stretch>
+                    </p:blipFill>
+                    <p:spPr>
+                      <a:xfrm>
+                        <a:off x="617537" y="5080000"/>
+                        <a:ext cx="8220076" cy="1258888"/>
+                      </a:xfrm>
+                      <a:prstGeom prst="rect">
+                        <a:avLst/>
+                      </a:prstGeom>
+                    </p:spPr>
+                  </p:pic>
+                </p:oleObj>
+              </mc:Fallback>
+            </mc:AlternateContent>
+          </a:graphicData>
+        </a:graphic>
+      </p:graphicFrame>
+      <p:sp>
+        <p:nvSpPr>
+          <p:cNvPr id="3" name="TextBox 2"/>
+          <p:cNvSpPr txBox="1"/>
+          <p:nvPr/>
+        </p:nvSpPr>
+        <p:spPr>
+          <a:xfrm>
+            <a:off x="508000" y="1003300"/>
+            <a:ext cx="7630142" cy="1754327"/>
+          </a:xfrm>
+          <a:prstGeom prst="rect">
+            <a:avLst/>
+          </a:prstGeom>
+          <a:noFill/>
+        </p:spPr>
+        <p:txBody>
+          <a:bodyPr wrap="none" rtlCol="0">
+            <a:spAutoFit/>
+          </a:bodyPr>
+          <a:lstStyle/>
+          <a:p>
+            <a:r>
+              <a:rPr lang="en-US" sz="5400" dirty="0" smtClean="0">
+                <a:solidFill>
+                  <a:srgbClr val="660066"/>
+                </a:solidFill>
+                <a:latin typeface="Comic Sans MS"/>
+                <a:cs typeface="Comic Sans MS"/>
+              </a:rPr>
+              <a:t>lemma: </a:t>
+            </a:r>
+            <a:r>
+              <a:rPr lang="en-US" sz="5400" dirty="0" smtClean="0">
+                <a:latin typeface="Comic Sans MS"/>
+                <a:cs typeface="Comic Sans MS"/>
+              </a:rPr>
+              <a:t>For </a:t>
+            </a:r>
+            <a:r>
+              <a:rPr lang="en-US" sz="5400" dirty="0" smtClean="0">
+                <a:solidFill>
+                  <a:srgbClr val="008000"/>
+                </a:solidFill>
+                <a:latin typeface="Comic Sans MS"/>
+                <a:cs typeface="Comic Sans MS"/>
+              </a:rPr>
+              <a:t>F</a:t>
+            </a:r>
+            <a:r>
+              <a:rPr lang="en-US" sz="5400" dirty="0" smtClean="0">
+                <a:latin typeface="Comic Sans MS"/>
+                <a:cs typeface="Comic Sans MS"/>
+              </a:rPr>
+              <a:t> </a:t>
+            </a:r>
+            <a:r>
+              <a:rPr lang="en-US" sz="5400" b="1" dirty="0" smtClean="0">
+                <a:latin typeface="Euclid Symbol" charset="2"/>
+                <a:cs typeface="Euclid Symbol" charset="2"/>
+              </a:rPr>
+              <a:t>=</a:t>
+            </a:r>
+            <a:r>
+              <a:rPr lang="en-US" sz="5400" dirty="0" smtClean="0">
+                <a:latin typeface="Comic Sans MS"/>
+                <a:cs typeface="Comic Sans MS"/>
+              </a:rPr>
+              <a:t> time to</a:t>
+            </a:r>
+          </a:p>
+          <a:p>
+            <a:r>
+              <a:rPr lang="en-US" sz="5400" dirty="0" smtClean="0">
+                <a:latin typeface="Comic Sans MS"/>
+                <a:cs typeface="Comic Sans MS"/>
+              </a:rPr>
+              <a:t>failure,                 ,</a:t>
+            </a:r>
+          </a:p>
+        </p:txBody>
+      </p:sp>
+      <p:graphicFrame>
+        <p:nvGraphicFramePr>
+          <p:cNvPr id="4" name="Object 3"/>
+          <p:cNvGraphicFramePr>
+            <a:graphicFrameLocks noChangeAspect="1"/>
+          </p:cNvGraphicFramePr>
+          <p:nvPr>
+            <p:extLst>
+              <p:ext uri="{D42A27DB-BD31-4B8C-83A1-F6EECF244321}">
+                <p14:modId xmlns:p14="http://schemas.microsoft.com/office/powerpoint/2010/main" val="377656379"/>
+              </p:ext>
+            </p:extLst>
+          </p:nvPr>
+        </p:nvGraphicFramePr>
+        <p:xfrm>
+          <a:off x="366713" y="2925763"/>
+          <a:ext cx="8302625" cy="1003300"/>
+        </p:xfrm>
+        <a:graphic>
+          <a:graphicData uri="http://schemas.openxmlformats.org/presentationml/2006/ole">
+            <mc:AlternateContent xmlns:mc="http://schemas.openxmlformats.org/markup-compatibility/2006">
+              <mc:Choice xmlns:v="urn:schemas-microsoft-com:vml" Requires="v">
+                <p:oleObj spid="_x0000_s507922" name="Equation" r:id="rId5" imgW="1993900" imgH="241300" progId="Equation.DSMT4">
+                  <p:embed/>
+                </p:oleObj>
+              </mc:Choice>
+              <mc:Fallback>
+                <p:oleObj name="Equation" r:id="rId5" imgW="1993900" imgH="241300" progId="Equation.DSMT4">
+                  <p:embed/>
+                  <p:pic>
+                    <p:nvPicPr>
+                      <p:cNvPr id="0" name=""/>
+                      <p:cNvPicPr/>
+                      <p:nvPr/>
+                    </p:nvPicPr>
+                    <p:blipFill>
+                      <a:blip r:embed="rId6"/>
+                      <a:stretch>
+                        <a:fillRect/>
+                      </a:stretch>
+                    </p:blipFill>
+                    <p:spPr>
+                      <a:xfrm>
+                        <a:off x="366713" y="2925763"/>
+                        <a:ext cx="8302625" cy="1003300"/>
+                      </a:xfrm>
+                      <a:prstGeom prst="rect">
+                        <a:avLst/>
+                      </a:prstGeom>
+                    </p:spPr>
+                  </p:pic>
+                </p:oleObj>
+              </mc:Fallback>
+            </mc:AlternateContent>
+          </a:graphicData>
+        </a:graphic>
+      </p:graphicFrame>
+      <p:graphicFrame>
+        <p:nvGraphicFramePr>
+          <p:cNvPr id="5" name="Object 4"/>
+          <p:cNvGraphicFramePr>
+            <a:graphicFrameLocks noChangeAspect="1"/>
+          </p:cNvGraphicFramePr>
+          <p:nvPr>
+            <p:extLst>
+              <p:ext uri="{D42A27DB-BD31-4B8C-83A1-F6EECF244321}">
+                <p14:modId xmlns:p14="http://schemas.microsoft.com/office/powerpoint/2010/main" val="3646948515"/>
+              </p:ext>
+            </p:extLst>
+          </p:nvPr>
+        </p:nvGraphicFramePr>
+        <p:xfrm>
+          <a:off x="3067050" y="1854199"/>
+          <a:ext cx="3464300" cy="1090613"/>
+        </p:xfrm>
+        <a:graphic>
+          <a:graphicData uri="http://schemas.openxmlformats.org/presentationml/2006/ole">
+            <mc:AlternateContent xmlns:mc="http://schemas.openxmlformats.org/markup-compatibility/2006">
+              <mc:Choice xmlns:v="urn:schemas-microsoft-com:vml" Requires="v">
+                <p:oleObj spid="_x0000_s507923" name="Equation" r:id="rId7" imgW="685800" imgH="215900" progId="Equation.DSMT4">
+                  <p:embed/>
+                </p:oleObj>
+              </mc:Choice>
+              <mc:Fallback>
+                <p:oleObj name="Equation" r:id="rId7" imgW="685800" imgH="215900" progId="Equation.DSMT4">
+                  <p:embed/>
+                  <p:pic>
+                    <p:nvPicPr>
+                      <p:cNvPr id="0" name=""/>
+                      <p:cNvPicPr/>
+                      <p:nvPr/>
+                    </p:nvPicPr>
+                    <p:blipFill>
+                      <a:blip r:embed="rId8"/>
+                      <a:stretch>
+                        <a:fillRect/>
+                      </a:stretch>
+                    </p:blipFill>
+                    <p:spPr>
+                      <a:xfrm>
+                        <a:off x="3067050" y="1854199"/>
+                        <a:ext cx="3464300" cy="1090613"/>
+                      </a:xfrm>
+                      <a:prstGeom prst="rect">
+                        <a:avLst/>
+                      </a:prstGeom>
+                    </p:spPr>
+                  </p:pic>
+                </p:oleObj>
+              </mc:Fallback>
+            </mc:AlternateContent>
+          </a:graphicData>
+        </a:graphic>
+      </p:graphicFrame>
+      <p:sp>
+        <p:nvSpPr>
+          <p:cNvPr id="6" name="TextBox 5"/>
+          <p:cNvSpPr txBox="1"/>
+          <p:nvPr/>
+        </p:nvSpPr>
+        <p:spPr>
+          <a:xfrm>
+            <a:off x="1257300" y="190500"/>
+            <a:ext cx="7693332" cy="830997"/>
+          </a:xfrm>
+          <a:prstGeom prst="rect">
+            <a:avLst/>
+          </a:prstGeom>
+          <a:noFill/>
+        </p:spPr>
+        <p:txBody>
+          <a:bodyPr wrap="none" rtlCol="0">
+            <a:spAutoFit/>
+          </a:bodyPr>
+          <a:lstStyle/>
+          <a:p>
+            <a:r>
+              <a:rPr lang="en-US" sz="4800" dirty="0" smtClean="0">
+                <a:latin typeface="Comic Sans MS"/>
+                <a:cs typeface="Comic Sans MS"/>
+              </a:rPr>
+              <a:t>Conditional time to failure</a:t>
+            </a:r>
+          </a:p>
+        </p:txBody>
+      </p:sp>
+      <p:sp>
+        <p:nvSpPr>
+          <p:cNvPr id="7" name="TextBox 6"/>
+          <p:cNvSpPr txBox="1"/>
+          <p:nvPr/>
+        </p:nvSpPr>
+        <p:spPr>
+          <a:xfrm>
+            <a:off x="393700" y="4038600"/>
+            <a:ext cx="3296846" cy="923330"/>
+          </a:xfrm>
+          <a:prstGeom prst="rect">
+            <a:avLst/>
+          </a:prstGeom>
+          <a:noFill/>
+        </p:spPr>
+        <p:txBody>
+          <a:bodyPr wrap="none" rtlCol="0">
+            <a:spAutoFit/>
+          </a:bodyPr>
+          <a:lstStyle/>
+          <a:p>
+            <a:r>
+              <a:rPr lang="en-US" sz="5400" dirty="0" smtClean="0">
+                <a:solidFill>
+                  <a:srgbClr val="660066"/>
+                </a:solidFill>
+                <a:latin typeface="Comic Sans MS"/>
+                <a:cs typeface="Comic Sans MS"/>
+              </a:rPr>
+              <a:t>Corollary:</a:t>
+            </a:r>
+          </a:p>
+        </p:txBody>
+      </p:sp>
+    </p:spTree>
+    <p:extLst>
+      <p:ext uri="{BB962C8B-B14F-4D97-AF65-F5344CB8AC3E}">
+        <p14:creationId xmlns:p14="http://schemas.microsoft.com/office/powerpoint/2010/main" val="1275407747"/>
+      </p:ext>
+    </p:extLst>
+  </p:cSld>
+  <p:clrMapOvr>
+    <a:masterClrMapping/>
+  </p:clrMapOvr>
+  <mc:AlternateContent xmlns:mc="http://schemas.openxmlformats.org/markup-compatibility/2006" xmlns:p14="http://schemas.microsoft.com/office/powerpoint/2010/main">
+    <mc:Choice Requires="p14">
+      <p:transition spd="med" p14:dur="600" advClick="0">
+        <p:fade/>
+      </p:transition>
+    </mc:Choice>
+    <mc:Fallback xmlns="">
+      <p:transition xmlns:p14="http://schemas.microsoft.com/office/powerpoint/2010/main" spd="med" advClick="0">
+        <p:fade/>
+      </p:transition>
+    </mc:Fallback>
+  </mc:AlternateContent>
+  <p:timing>
+    <p:tnLst>
+      <p:par>
+        <p:cTn xmlns:p14="http://schemas.microsoft.com/office/powerpoint/2010/main" id="1" dur="indefinite" restart="never" nodeType="tmRoot">
+          <p:childTnLst>
+            <p:seq concurrent="1" nextAc="seek">
+              <p:cTn id="2" dur="indefinite" nodeType="mainSeq">
+                <p:childTnLst>
+                  <p:par>
+                    <p:cTn id="3" fill="hold">
+                      <p:stCondLst>
+                        <p:cond delay="indefinite"/>
+                      </p:stCondLst>
+                      <p:childTnLst>
+                        <p:par>
+                          <p:cTn id="4" fill="hold">
+                            <p:stCondLst>
+                              <p:cond delay="0"/>
+                            </p:stCondLst>
+                            <p:childTnLst>
+                              <p:par>
+                                <p:cTn id="5" presetID="10" presetClass="entr" presetSubtype="0" fill="hold" grpId="0" nodeType="clickEffect">
+                                  <p:stCondLst>
+                                    <p:cond delay="0"/>
+                                  </p:stCondLst>
+                                  <p:childTnLst>
+                                    <p:set>
+                                      <p:cBhvr>
+                                        <p:cTn id="6" dur="1" fill="hold">
+                                          <p:stCondLst>
+                                            <p:cond delay="0"/>
+                                          </p:stCondLst>
+                                        </p:cTn>
+                                        <p:tgtEl>
+                                          <p:spTgt spid="7"/>
+                                        </p:tgtEl>
+                                        <p:attrNameLst>
+                                          <p:attrName>style.visibility</p:attrName>
+                                        </p:attrNameLst>
+                                      </p:cBhvr>
+                                      <p:to>
+                                        <p:strVal val="visible"/>
+                                      </p:to>
+                                    </p:set>
+                                    <p:animEffect transition="in" filter="fade">
+                                      <p:cBhvr>
+                                        <p:cTn id="7" dur="500"/>
+                                        <p:tgtEl>
+                                          <p:spTgt spid="7"/>
+                                        </p:tgtEl>
+                                      </p:cBhvr>
+                                    </p:animEffect>
+                                  </p:childTnLst>
+                                </p:cTn>
+                              </p:par>
+                            </p:childTnLst>
+                          </p:cTn>
+                        </p:par>
+                        <p:par>
+                          <p:cTn id="8" fill="hold">
+                            <p:stCondLst>
+                              <p:cond delay="500"/>
+                            </p:stCondLst>
+                            <p:childTnLst>
+                              <p:par>
+                                <p:cTn id="9" presetID="22" presetClass="entr" presetSubtype="8" fill="hold" nodeType="afterEffect">
+                                  <p:stCondLst>
+                                    <p:cond delay="0"/>
+                                  </p:stCondLst>
+                                  <p:childTnLst>
+                                    <p:set>
+                                      <p:cBhvr>
+                                        <p:cTn id="10" dur="1" fill="hold">
+                                          <p:stCondLst>
+                                            <p:cond delay="0"/>
+                                          </p:stCondLst>
+                                        </p:cTn>
+                                        <p:tgtEl>
+                                          <p:spTgt spid="2"/>
+                                        </p:tgtEl>
+                                        <p:attrNameLst>
+                                          <p:attrName>style.visibility</p:attrName>
+                                        </p:attrNameLst>
+                                      </p:cBhvr>
+                                      <p:to>
+                                        <p:strVal val="visible"/>
+                                      </p:to>
+                                    </p:set>
+                                    <p:animEffect transition="in" filter="wipe(left)">
+                                      <p:cBhvr>
+                                        <p:cTn id="11" dur="1000"/>
+                                        <p:tgtEl>
+                                          <p:spTgt spid="2"/>
+                                        </p:tgtEl>
+                                      </p:cBhvr>
+                                    </p:animEffect>
+                                  </p:childTnLst>
+                                </p:cTn>
+                              </p:par>
+                            </p:childTnLst>
+                          </p:cTn>
+                        </p:par>
+                      </p:childTnLst>
+                    </p:cTn>
+                  </p:par>
+                </p:childTnLst>
+              </p:cTn>
+              <p:prevCondLst>
+                <p:cond evt="onPrev" delay="0">
+                  <p:tgtEl>
+                    <p:sldTgt/>
+                  </p:tgtEl>
+                </p:cond>
+              </p:prevCondLst>
+              <p:nextCondLst>
+                <p:cond evt="onNext" delay="0">
+                  <p:tgtEl>
+                    <p:sldTgt/>
+                  </p:tgtEl>
+                </p:cond>
+              </p:nextCondLst>
+            </p:seq>
+          </p:childTnLst>
+        </p:cTn>
+      </p:par>
+    </p:tnLst>
+    <p:bldLst>
+      <p:bldP spid="7" grpId="0"/>
+    </p:bldLst>
+  </p:timing>
+</p:sld>
+</file>
+
+<file path=ppt/slides/slide12.xml><?xml version="1.0" encoding="utf-8"?>
+<p:sld xmlns:a="http://schemas.openxmlformats.org/drawingml/2006/main" xmlns:r="http://schemas.openxmlformats.org/officeDocument/2006/relationships" xmlns:p="http://schemas.openxmlformats.org/presentationml/2006/main">
+  <p:cSld>
+    <p:spTree>
+      <p:nvGrpSpPr>
+        <p:cNvPr id="1" name=""/>
+        <p:cNvGrpSpPr/>
+        <p:nvPr/>
+      </p:nvGrpSpPr>
+      <p:grpSpPr>
+        <a:xfrm>
+          <a:off x="0" y="0"/>
+          <a:ext cx="0" cy="0"/>
+          <a:chOff x="0" y="0"/>
+          <a:chExt cx="0" cy="0"/>
+        </a:xfrm>
+      </p:grpSpPr>
       <p:graphicFrame>
         <p:nvGraphicFramePr>
           <p:cNvPr id="104452" name="Object 4"/>
@@ -4596,20 +5614,371 @@
           <p:nvPr>
             <p:extLst>
               <p:ext uri="{D42A27DB-BD31-4B8C-83A1-F6EECF244321}">
-                <p14:modId xmlns:p14="http://schemas.microsoft.com/office/powerpoint/2010/main" val="3788081066"/>
+                <p14:modId xmlns:p14="http://schemas.microsoft.com/office/powerpoint/2010/main" val="1053538980"/>
               </p:ext>
             </p:extLst>
           </p:nvPr>
         </p:nvGraphicFramePr>
         <p:xfrm>
-          <a:off x="871538" y="2249488"/>
+          <a:off x="871538" y="2197100"/>
+          <a:ext cx="6943725" cy="2146300"/>
+        </p:xfrm>
+        <a:graphic>
+          <a:graphicData uri="http://schemas.openxmlformats.org/presentationml/2006/ole">
+            <mc:AlternateContent xmlns:mc="http://schemas.openxmlformats.org/markup-compatibility/2006">
+              <mc:Choice xmlns:v="urn:schemas-microsoft-com:vml" Requires="v">
+                <p:oleObj spid="_x0000_s508938" name="Equation" r:id="rId5" imgW="1562100" imgH="482600" progId="Equation.DSMT4">
+                  <p:embed/>
+                </p:oleObj>
+              </mc:Choice>
+              <mc:Fallback>
+                <p:oleObj name="Equation" r:id="rId5" imgW="1562100" imgH="482600" progId="Equation.DSMT4">
+                  <p:embed/>
+                  <p:pic>
+                    <p:nvPicPr>
+                      <p:cNvPr id="0" name=""/>
+                      <p:cNvPicPr>
+                        <a:picLocks noChangeAspect="1" noChangeArrowheads="1"/>
+                      </p:cNvPicPr>
+                      <p:nvPr/>
+                    </p:nvPicPr>
+                    <p:blipFill>
+                      <a:blip r:embed="rId6"/>
+                      <a:srcRect/>
+                      <a:stretch>
+                        <a:fillRect/>
+                      </a:stretch>
+                    </p:blipFill>
+                    <p:spPr bwMode="auto">
+                      <a:xfrm>
+                        <a:off x="871538" y="2197100"/>
+                        <a:ext cx="6943725" cy="2146300"/>
+                      </a:xfrm>
+                      <a:prstGeom prst="rect">
+                        <a:avLst/>
+                      </a:prstGeom>
+                      <a:noFill/>
+                      <a:extLst/>
+                    </p:spPr>
+                  </p:pic>
+                </p:oleObj>
+              </mc:Fallback>
+            </mc:AlternateContent>
+          </a:graphicData>
+        </a:graphic>
+      </p:graphicFrame>
+      <p:sp>
+        <p:nvSpPr>
+          <p:cNvPr id="104454" name="Rectangle 6"/>
+          <p:cNvSpPr>
+            <a:spLocks noChangeArrowheads="1"/>
+          </p:cNvSpPr>
+          <p:nvPr/>
+        </p:nvSpPr>
+        <p:spPr bwMode="auto">
+          <a:xfrm>
+            <a:off x="1219200" y="5105400"/>
+            <a:ext cx="304800" cy="228600"/>
+          </a:xfrm>
+          <a:prstGeom prst="rect">
+            <a:avLst/>
+          </a:prstGeom>
+          <a:noFill/>
+          <a:ln w="9525">
+            <a:noFill/>
+            <a:miter lim="800000"/>
+            <a:headEnd/>
+            <a:tailEnd/>
+          </a:ln>
+        </p:spPr>
+        <p:txBody>
+          <a:bodyPr wrap="none" anchor="ctr">
+            <a:spAutoFit/>
+          </a:bodyPr>
+          <a:lstStyle/>
+          <a:p>
+            <a:pPr algn="ctr"/>
+            <a:endParaRPr lang="en-US">
+              <a:latin typeface="Times New Roman" pitchFamily="18" charset="0"/>
+            </a:endParaRPr>
+          </a:p>
+        </p:txBody>
+      </p:sp>
+      <p:sp>
+        <p:nvSpPr>
+          <p:cNvPr id="10" name="Rectangle 3"/>
+          <p:cNvSpPr txBox="1">
+            <a:spLocks noChangeArrowheads="1"/>
+          </p:cNvSpPr>
+          <p:nvPr/>
+        </p:nvSpPr>
+        <p:spPr bwMode="auto">
+          <a:xfrm>
+            <a:off x="1238251" y="52921"/>
+            <a:ext cx="7598832" cy="1079500"/>
+          </a:xfrm>
+          <a:prstGeom prst="rect">
+            <a:avLst/>
+          </a:prstGeom>
+          <a:noFill/>
+          <a:ln w="9525">
+            <a:noFill/>
+            <a:miter lim="800000"/>
+            <a:headEnd/>
+            <a:tailEnd/>
+          </a:ln>
+        </p:spPr>
+        <p:txBody>
+          <a:bodyPr vert="horz" wrap="square" lIns="91440" tIns="45720" rIns="91440" bIns="45720" numCol="1" anchor="ctr" anchorCtr="0" compatLnSpc="1">
+            <a:prstTxWarp prst="textNoShape">
+              <a:avLst/>
+            </a:prstTxWarp>
+          </a:bodyPr>
+          <a:lstStyle/>
+          <a:p>
+            <a:pPr marL="0" marR="0" lvl="0" indent="0" algn="l" defTabSz="914400" rtl="0" eaLnBrk="0" fontAlgn="base" latinLnBrk="0" hangingPunct="0">
+              <a:lnSpc>
+                <a:spcPct val="100000"/>
+              </a:lnSpc>
+              <a:spcBef>
+                <a:spcPct val="0"/>
+              </a:spcBef>
+              <a:spcAft>
+                <a:spcPct val="0"/>
+              </a:spcAft>
+              <a:buClrTx/>
+              <a:buSzTx/>
+              <a:buFontTx/>
+              <a:buNone/>
+              <a:tabLst/>
+              <a:defRPr/>
+            </a:pPr>
+            <a:r>
+              <a:rPr kumimoji="0" lang="en-US" sz="4400" b="0" i="0" u="none" strike="noStrike" kern="0" cap="none" spc="0" normalizeH="0" baseline="0" noProof="0" dirty="0" smtClean="0">
+                <a:ln>
+                  <a:noFill/>
+                </a:ln>
+                <a:solidFill>
+                  <a:schemeClr val="tx2"/>
+                </a:solidFill>
+                <a:effectLst/>
+                <a:uLnTx/>
+                <a:uFillTx/>
+                <a:latin typeface="+mj-lt"/>
+                <a:ea typeface="+mj-ea"/>
+                <a:cs typeface="+mj-cs"/>
+              </a:rPr>
+              <a:t>Variance of Time to Failure</a:t>
+            </a:r>
+            <a:endParaRPr kumimoji="0" lang="en-US" sz="4400" b="0" i="0" u="none" strike="noStrike" kern="0" cap="none" spc="0" normalizeH="0" baseline="0" noProof="0" dirty="0">
+              <a:ln>
+                <a:noFill/>
+              </a:ln>
+              <a:solidFill>
+                <a:schemeClr val="tx2"/>
+              </a:solidFill>
+              <a:effectLst/>
+              <a:uLnTx/>
+              <a:uFillTx/>
+              <a:latin typeface="+mj-lt"/>
+              <a:ea typeface="+mj-ea"/>
+              <a:cs typeface="+mj-cs"/>
+            </a:endParaRPr>
+          </a:p>
+        </p:txBody>
+      </p:sp>
+      <p:sp>
+        <p:nvSpPr>
+          <p:cNvPr id="11" name="TextBox 10"/>
+          <p:cNvSpPr txBox="1"/>
+          <p:nvPr/>
+        </p:nvSpPr>
+        <p:spPr>
+          <a:xfrm>
+            <a:off x="613834" y="781050"/>
+            <a:ext cx="5152672" cy="1569660"/>
+          </a:xfrm>
+          <a:prstGeom prst="rect">
+            <a:avLst/>
+          </a:prstGeom>
+          <a:noFill/>
+        </p:spPr>
+        <p:txBody>
+          <a:bodyPr wrap="none" rtlCol="0">
+            <a:spAutoFit/>
+          </a:bodyPr>
+          <a:lstStyle/>
+          <a:p>
+            <a:r>
+              <a:rPr lang="en-US" sz="4800" dirty="0" smtClean="0">
+                <a:solidFill>
+                  <a:srgbClr val="660066"/>
+                </a:solidFill>
+                <a:latin typeface="Comic Sans MS"/>
+                <a:cs typeface="Comic Sans MS"/>
+              </a:rPr>
+              <a:t>total expectation</a:t>
+            </a:r>
+          </a:p>
+          <a:p>
+            <a:r>
+              <a:rPr lang="en-US" sz="4800" dirty="0" smtClean="0">
+                <a:solidFill>
+                  <a:srgbClr val="660066"/>
+                </a:solidFill>
+                <a:latin typeface="Comic Sans MS"/>
+                <a:cs typeface="Comic Sans MS"/>
+              </a:rPr>
+              <a:t> approach:</a:t>
+            </a:r>
+          </a:p>
+        </p:txBody>
+      </p:sp>
+      <p:graphicFrame>
+        <p:nvGraphicFramePr>
+          <p:cNvPr id="7" name="Object 6"/>
+          <p:cNvGraphicFramePr>
+            <a:graphicFrameLocks noChangeAspect="1"/>
+          </p:cNvGraphicFramePr>
+          <p:nvPr>
+            <p:extLst>
+              <p:ext uri="{D42A27DB-BD31-4B8C-83A1-F6EECF244321}">
+                <p14:modId xmlns:p14="http://schemas.microsoft.com/office/powerpoint/2010/main" val="3719434794"/>
+              </p:ext>
+            </p:extLst>
+          </p:nvPr>
+        </p:nvGraphicFramePr>
+        <p:xfrm>
+          <a:off x="6350000" y="895350"/>
+          <a:ext cx="2133600" cy="989013"/>
+        </p:xfrm>
+        <a:graphic>
+          <a:graphicData uri="http://schemas.openxmlformats.org/presentationml/2006/ole">
+            <mc:AlternateContent xmlns:mc="http://schemas.openxmlformats.org/markup-compatibility/2006">
+              <mc:Choice xmlns:v="urn:schemas-microsoft-com:vml" Requires="v">
+                <p:oleObj spid="_x0000_s508939" name="Equation" r:id="rId7" imgW="520700" imgH="241300" progId="Equation.DSMT4">
+                  <p:embed/>
+                </p:oleObj>
+              </mc:Choice>
+              <mc:Fallback>
+                <p:oleObj name="Equation" r:id="rId7" imgW="520700" imgH="241300" progId="Equation.DSMT4">
+                  <p:embed/>
+                  <p:pic>
+                    <p:nvPicPr>
+                      <p:cNvPr id="0" name=""/>
+                      <p:cNvPicPr>
+                        <a:picLocks noChangeAspect="1" noChangeArrowheads="1"/>
+                      </p:cNvPicPr>
+                      <p:nvPr/>
+                    </p:nvPicPr>
+                    <p:blipFill>
+                      <a:blip r:embed="rId8"/>
+                      <a:srcRect/>
+                      <a:stretch>
+                        <a:fillRect/>
+                      </a:stretch>
+                    </p:blipFill>
+                    <p:spPr bwMode="auto">
+                      <a:xfrm>
+                        <a:off x="6350000" y="895350"/>
+                        <a:ext cx="2133600" cy="989013"/>
+                      </a:xfrm>
+                      <a:prstGeom prst="rect">
+                        <a:avLst/>
+                      </a:prstGeom>
+                      <a:noFill/>
+                      <a:extLst>
+                        <a:ext uri="{909E8E84-426E-40dd-AFC4-6F175D3DCCD1}">
+                          <a14:hiddenFill xmlns:a14="http://schemas.microsoft.com/office/drawing/2010/main">
+                            <a:solidFill>
+                              <a:srgbClr val="FFFFFF"/>
+                            </a:solidFill>
+                          </a14:hiddenFill>
+                        </a:ext>
+                      </a:extLst>
+                    </p:spPr>
+                  </p:pic>
+                </p:oleObj>
+              </mc:Fallback>
+            </mc:AlternateContent>
+          </a:graphicData>
+        </a:graphic>
+      </p:graphicFrame>
+    </p:spTree>
+    <p:custDataLst>
+      <p:tags r:id="rId2"/>
+    </p:custDataLst>
+    <p:extLst>
+      <p:ext uri="{BB962C8B-B14F-4D97-AF65-F5344CB8AC3E}">
+        <p14:creationId xmlns:p14="http://schemas.microsoft.com/office/powerpoint/2010/main" val="881777118"/>
+      </p:ext>
+    </p:extLst>
+  </p:cSld>
+  <p:clrMapOvr>
+    <a:masterClrMapping/>
+  </p:clrMapOvr>
+  <mc:AlternateContent xmlns:mc="http://schemas.openxmlformats.org/markup-compatibility/2006" xmlns:p14="http://schemas.microsoft.com/office/powerpoint/2010/main">
+    <mc:Choice Requires="p14">
+      <p:transition spd="med" p14:dur="700" advClick="0">
+        <p:fade thruBlk="1"/>
+      </p:transition>
+    </mc:Choice>
+    <mc:Fallback xmlns="">
+      <p:transition xmlns:p14="http://schemas.microsoft.com/office/powerpoint/2010/main" spd="med" advClick="0">
+        <p:fade thruBlk="1"/>
+      </p:transition>
+    </mc:Fallback>
+  </mc:AlternateContent>
+  <p:timing>
+    <p:tnLst>
+      <p:par>
+        <p:cTn xmlns:p14="http://schemas.microsoft.com/office/powerpoint/2010/main" id="1" dur="indefinite" restart="never" nodeType="tmRoot"/>
+      </p:par>
+    </p:tnLst>
+  </p:timing>
+</p:sld>
+</file>
+
+<file path=ppt/slides/slide13.xml><?xml version="1.0" encoding="utf-8"?>
+<p:sld xmlns:a="http://schemas.openxmlformats.org/drawingml/2006/main" xmlns:r="http://schemas.openxmlformats.org/officeDocument/2006/relationships" xmlns:p="http://schemas.openxmlformats.org/presentationml/2006/main">
+  <p:cSld>
+    <p:spTree>
+      <p:nvGrpSpPr>
+        <p:cNvPr id="1" name=""/>
+        <p:cNvGrpSpPr/>
+        <p:nvPr/>
+      </p:nvGrpSpPr>
+      <p:grpSpPr>
+        <a:xfrm>
+          <a:off x="0" y="0"/>
+          <a:ext cx="0" cy="0"/>
+          <a:chOff x="0" y="0"/>
+          <a:chExt cx="0" cy="0"/>
+        </a:xfrm>
+      </p:grpSpPr>
+      <p:graphicFrame>
+        <p:nvGraphicFramePr>
+          <p:cNvPr id="104452" name="Object 4"/>
+          <p:cNvGraphicFramePr>
+            <a:graphicFrameLocks noChangeAspect="1"/>
+          </p:cNvGraphicFramePr>
+          <p:nvPr>
+            <p:extLst>
+              <p:ext uri="{D42A27DB-BD31-4B8C-83A1-F6EECF244321}">
+                <p14:modId xmlns:p14="http://schemas.microsoft.com/office/powerpoint/2010/main" val="1430667398"/>
+              </p:ext>
+            </p:extLst>
+          </p:nvPr>
+        </p:nvGraphicFramePr>
+        <p:xfrm>
+          <a:off x="871538" y="2262188"/>
           <a:ext cx="6943725" cy="2036762"/>
         </p:xfrm>
         <a:graphic>
           <a:graphicData uri="http://schemas.openxmlformats.org/presentationml/2006/ole">
             <mc:AlternateContent xmlns:mc="http://schemas.openxmlformats.org/markup-compatibility/2006">
               <mc:Choice xmlns:v="urn:schemas-microsoft-com:vml" Requires="v">
-                <p:oleObj spid="_x0000_s492594" name="Equation" r:id="rId4" imgW="1562100" imgH="457200" progId="Equation.DSMT4">
+                <p:oleObj spid="_x0000_s492610" name="Equation" r:id="rId4" imgW="1562100" imgH="457200" progId="Equation.DSMT4">
                   <p:embed/>
                 </p:oleObj>
               </mc:Choice>
@@ -4633,7 +6002,7 @@
                     </p:blipFill>
                     <p:spPr bwMode="auto">
                       <a:xfrm>
-                        <a:off x="871538" y="2249488"/>
+                        <a:off x="871538" y="2262188"/>
                         <a:ext cx="6943725" cy="2036762"/>
                       </a:xfrm>
                       <a:prstGeom prst="rect">
@@ -4769,41 +6138,6 @@
           </a:p>
         </p:txBody>
       </p:sp>
-      <p:sp>
-        <p:nvSpPr>
-          <p:cNvPr id="11" name="TextBox 10"/>
-          <p:cNvSpPr txBox="1"/>
-          <p:nvPr/>
-        </p:nvSpPr>
-        <p:spPr>
-          <a:xfrm>
-            <a:off x="613834" y="984250"/>
-            <a:ext cx="5519360" cy="830997"/>
-          </a:xfrm>
-          <a:prstGeom prst="rect">
-            <a:avLst/>
-          </a:prstGeom>
-          <a:noFill/>
-        </p:spPr>
-        <p:txBody>
-          <a:bodyPr wrap="none" rtlCol="0">
-            <a:spAutoFit/>
-          </a:bodyPr>
-          <a:lstStyle/>
-          <a:p>
-            <a:r>
-              <a:rPr lang="en-US" sz="4800" dirty="0" smtClean="0">
-                <a:solidFill>
-                  <a:srgbClr val="660066"/>
-                </a:solidFill>
-                <a:latin typeface="Comic Sans MS"/>
-                <a:cs typeface="Comic Sans MS"/>
-              </a:rPr>
-              <a:t>cleverer approach:</a:t>
-            </a:r>
-          </a:p>
-        </p:txBody>
-      </p:sp>
       <p:graphicFrame>
         <p:nvGraphicFramePr>
           <p:cNvPr id="7" name="Object 6"/>
@@ -4826,7 +6160,7 @@
           <a:graphicData uri="http://schemas.openxmlformats.org/presentationml/2006/ole">
             <mc:AlternateContent xmlns:mc="http://schemas.openxmlformats.org/markup-compatibility/2006">
               <mc:Choice xmlns:v="urn:schemas-microsoft-com:vml" Requires="v">
-                <p:oleObj spid="_x0000_s492595" name="Equation" r:id="rId6" imgW="520700" imgH="241300" progId="Equation.DSMT4">
+                <p:oleObj spid="_x0000_s492611" name="Equation" r:id="rId6" imgW="520700" imgH="241300" progId="Equation.DSMT4">
                   <p:embed/>
                 </p:oleObj>
               </mc:Choice>
@@ -4874,6 +6208,53 @@
           </a:graphicData>
         </a:graphic>
       </p:graphicFrame>
+      <p:sp>
+        <p:nvSpPr>
+          <p:cNvPr id="8" name="TextBox 7"/>
+          <p:cNvSpPr txBox="1"/>
+          <p:nvPr/>
+        </p:nvSpPr>
+        <p:spPr>
+          <a:xfrm>
+            <a:off x="613834" y="781050"/>
+            <a:ext cx="5152672" cy="1569660"/>
+          </a:xfrm>
+          <a:prstGeom prst="rect">
+            <a:avLst/>
+          </a:prstGeom>
+          <a:noFill/>
+        </p:spPr>
+        <p:txBody>
+          <a:bodyPr wrap="none" rtlCol="0">
+            <a:spAutoFit/>
+          </a:bodyPr>
+          <a:lstStyle/>
+          <a:p>
+            <a:r>
+              <a:rPr lang="en-US" sz="4800" dirty="0" smtClean="0">
+                <a:solidFill>
+                  <a:srgbClr val="660066"/>
+                </a:solidFill>
+                <a:latin typeface="Comic Sans MS"/>
+                <a:cs typeface="Comic Sans MS"/>
+              </a:rPr>
+              <a:t>total expectation</a:t>
+            </a:r>
+          </a:p>
+          <a:p>
+            <a:r>
+              <a:rPr lang="en-US" sz="4800" dirty="0" smtClean="0">
+                <a:solidFill>
+                  <a:srgbClr val="660066"/>
+                </a:solidFill>
+                <a:latin typeface="Comic Sans MS"/>
+                <a:cs typeface="Comic Sans MS"/>
+              </a:rPr>
+              <a:t> approach:</a:t>
+            </a:r>
+          </a:p>
+        </p:txBody>
+      </p:sp>
     </p:spTree>
     <p:extLst>
       <p:ext uri="{BB962C8B-B14F-4D97-AF65-F5344CB8AC3E}">
@@ -4897,7 +6278,7 @@
 </p:sld>
 </file>
 
-<file path=ppt/slides/slide11.xml><?xml version="1.0" encoding="utf-8"?>
+<file path=ppt/slides/slide14.xml><?xml version="1.0" encoding="utf-8"?>
 <p:sld xmlns:a="http://schemas.openxmlformats.org/drawingml/2006/main" xmlns:r="http://schemas.openxmlformats.org/officeDocument/2006/relationships" xmlns:p="http://schemas.openxmlformats.org/presentationml/2006/main">
   <p:cSld>
     <p:spTree>
@@ -4923,25 +6304,25 @@
           <p:nvPr>
             <p:extLst>
               <p:ext uri="{D42A27DB-BD31-4B8C-83A1-F6EECF244321}">
-                <p14:modId xmlns:p14="http://schemas.microsoft.com/office/powerpoint/2010/main" val="1742883341"/>
+                <p14:modId xmlns:p14="http://schemas.microsoft.com/office/powerpoint/2010/main" val="462837592"/>
               </p:ext>
             </p:extLst>
           </p:nvPr>
         </p:nvGraphicFramePr>
         <p:xfrm>
-          <a:off x="1660525" y="2222500"/>
-          <a:ext cx="5364163" cy="2092325"/>
+          <a:off x="868363" y="2246313"/>
+          <a:ext cx="5475287" cy="2093912"/>
         </p:xfrm>
         <a:graphic>
           <a:graphicData uri="http://schemas.openxmlformats.org/presentationml/2006/ole">
             <mc:AlternateContent xmlns:mc="http://schemas.openxmlformats.org/markup-compatibility/2006">
               <mc:Choice xmlns:v="urn:schemas-microsoft-com:vml" Requires="v">
-                <p:oleObj spid="_x0000_s494642" name="Equation" r:id="rId4" imgW="1206500" imgH="469900" progId="Equation.DSMT4">
+                <p:oleObj spid="_x0000_s510988" name="Equation" r:id="rId4" imgW="1231900" imgH="469900" progId="Equation.DSMT4">
                   <p:embed/>
                 </p:oleObj>
               </mc:Choice>
               <mc:Fallback>
-                <p:oleObj name="Equation" r:id="rId4" imgW="1206500" imgH="469900" progId="Equation.DSMT4">
+                <p:oleObj name="Equation" r:id="rId4" imgW="1231900" imgH="469900" progId="Equation.DSMT4">
                   <p:embed/>
                   <p:pic>
                     <p:nvPicPr>
@@ -4960,8 +6341,8 @@
                     </p:blipFill>
                     <p:spPr bwMode="auto">
                       <a:xfrm>
-                        <a:off x="1660525" y="2222500"/>
-                        <a:ext cx="5364163" cy="2092325"/>
+                        <a:off x="868363" y="2246313"/>
+                        <a:ext cx="5475287" cy="2093912"/>
                       </a:xfrm>
                       <a:prstGeom prst="rect">
                         <a:avLst/>
@@ -5096,41 +6477,6 @@
           </a:p>
         </p:txBody>
       </p:sp>
-      <p:sp>
-        <p:nvSpPr>
-          <p:cNvPr id="11" name="TextBox 10"/>
-          <p:cNvSpPr txBox="1"/>
-          <p:nvPr/>
-        </p:nvSpPr>
-        <p:spPr>
-          <a:xfrm>
-            <a:off x="613834" y="984250"/>
-            <a:ext cx="5519360" cy="830997"/>
-          </a:xfrm>
-          <a:prstGeom prst="rect">
-            <a:avLst/>
-          </a:prstGeom>
-          <a:noFill/>
-        </p:spPr>
-        <p:txBody>
-          <a:bodyPr wrap="none" rtlCol="0">
-            <a:spAutoFit/>
-          </a:bodyPr>
-          <a:lstStyle/>
-          <a:p>
-            <a:r>
-              <a:rPr lang="en-US" sz="4800" dirty="0" smtClean="0">
-                <a:solidFill>
-                  <a:srgbClr val="660066"/>
-                </a:solidFill>
-                <a:latin typeface="Comic Sans MS"/>
-                <a:cs typeface="Comic Sans MS"/>
-              </a:rPr>
-              <a:t>cleverer approach:</a:t>
-            </a:r>
-          </a:p>
-        </p:txBody>
-      </p:sp>
       <p:graphicFrame>
         <p:nvGraphicFramePr>
           <p:cNvPr id="7" name="Object 6"/>
@@ -5140,7 +6486,7 @@
           <p:nvPr>
             <p:extLst>
               <p:ext uri="{D42A27DB-BD31-4B8C-83A1-F6EECF244321}">
-                <p14:modId xmlns:p14="http://schemas.microsoft.com/office/powerpoint/2010/main" val="516401631"/>
+                <p14:modId xmlns:p14="http://schemas.microsoft.com/office/powerpoint/2010/main" val="3919527453"/>
               </p:ext>
             </p:extLst>
           </p:nvPr>
@@ -5153,7 +6499,7 @@
           <a:graphicData uri="http://schemas.openxmlformats.org/presentationml/2006/ole">
             <mc:AlternateContent xmlns:mc="http://schemas.openxmlformats.org/markup-compatibility/2006">
               <mc:Choice xmlns:v="urn:schemas-microsoft-com:vml" Requires="v">
-                <p:oleObj spid="_x0000_s494643" name="Equation" r:id="rId6" imgW="520700" imgH="241300" progId="Equation.DSMT4">
+                <p:oleObj spid="_x0000_s510989" name="Equation" r:id="rId6" imgW="520700" imgH="241300" progId="Equation.DSMT4">
                   <p:embed/>
                 </p:oleObj>
               </mc:Choice>
@@ -5201,10 +6547,57 @@
           </a:graphicData>
         </a:graphic>
       </p:graphicFrame>
+      <p:sp>
+        <p:nvSpPr>
+          <p:cNvPr id="8" name="TextBox 7"/>
+          <p:cNvSpPr txBox="1"/>
+          <p:nvPr/>
+        </p:nvSpPr>
+        <p:spPr>
+          <a:xfrm>
+            <a:off x="613834" y="781050"/>
+            <a:ext cx="5152672" cy="1569660"/>
+          </a:xfrm>
+          <a:prstGeom prst="rect">
+            <a:avLst/>
+          </a:prstGeom>
+          <a:noFill/>
+        </p:spPr>
+        <p:txBody>
+          <a:bodyPr wrap="none" rtlCol="0">
+            <a:spAutoFit/>
+          </a:bodyPr>
+          <a:lstStyle/>
+          <a:p>
+            <a:r>
+              <a:rPr lang="en-US" sz="4800" dirty="0" smtClean="0">
+                <a:solidFill>
+                  <a:srgbClr val="660066"/>
+                </a:solidFill>
+                <a:latin typeface="Comic Sans MS"/>
+                <a:cs typeface="Comic Sans MS"/>
+              </a:rPr>
+              <a:t>total expectation</a:t>
+            </a:r>
+          </a:p>
+          <a:p>
+            <a:r>
+              <a:rPr lang="en-US" sz="4800" dirty="0" smtClean="0">
+                <a:solidFill>
+                  <a:srgbClr val="660066"/>
+                </a:solidFill>
+                <a:latin typeface="Comic Sans MS"/>
+                <a:cs typeface="Comic Sans MS"/>
+              </a:rPr>
+              <a:t> approach:</a:t>
+            </a:r>
+          </a:p>
+        </p:txBody>
+      </p:sp>
     </p:spTree>
     <p:extLst>
       <p:ext uri="{BB962C8B-B14F-4D97-AF65-F5344CB8AC3E}">
-        <p14:creationId xmlns:p14="http://schemas.microsoft.com/office/powerpoint/2010/main" val="1692490571"/>
+        <p14:creationId xmlns:p14="http://schemas.microsoft.com/office/powerpoint/2010/main" val="1865286443"/>
       </p:ext>
     </p:extLst>
   </p:cSld>
@@ -5224,7 +6617,7 @@
 </p:sld>
 </file>
 
-<file path=ppt/slides/slide12.xml><?xml version="1.0" encoding="utf-8"?>
+<file path=ppt/slides/slide15.xml><?xml version="1.0" encoding="utf-8"?>
 <p:sld xmlns:a="http://schemas.openxmlformats.org/drawingml/2006/main" xmlns:r="http://schemas.openxmlformats.org/officeDocument/2006/relationships" xmlns:p="http://schemas.openxmlformats.org/presentationml/2006/main">
   <p:cSld>
     <p:spTree>
@@ -5250,25 +6643,25 @@
           <p:nvPr>
             <p:extLst>
               <p:ext uri="{D42A27DB-BD31-4B8C-83A1-F6EECF244321}">
-                <p14:modId xmlns:p14="http://schemas.microsoft.com/office/powerpoint/2010/main" val="3461524355"/>
+                <p14:modId xmlns:p14="http://schemas.microsoft.com/office/powerpoint/2010/main" val="192345466"/>
               </p:ext>
             </p:extLst>
           </p:nvPr>
         </p:nvGraphicFramePr>
         <p:xfrm>
-          <a:off x="1660525" y="2222500"/>
-          <a:ext cx="5364163" cy="2092325"/>
+          <a:off x="873125" y="2281238"/>
+          <a:ext cx="6151563" cy="3168650"/>
         </p:xfrm>
         <a:graphic>
           <a:graphicData uri="http://schemas.openxmlformats.org/presentationml/2006/ole">
             <mc:AlternateContent xmlns:mc="http://schemas.openxmlformats.org/markup-compatibility/2006">
               <mc:Choice xmlns:v="urn:schemas-microsoft-com:vml" Requires="v">
-                <p:oleObj spid="_x0000_s495667" name="Equation" r:id="rId4" imgW="1206500" imgH="469900" progId="Equation.DSMT4">
+                <p:oleObj spid="_x0000_s512012" name="Equation" r:id="rId4" imgW="1384300" imgH="711200" progId="Equation.DSMT4">
                   <p:embed/>
                 </p:oleObj>
               </mc:Choice>
               <mc:Fallback>
-                <p:oleObj name="Equation" r:id="rId4" imgW="1206500" imgH="469900" progId="Equation.DSMT4">
+                <p:oleObj name="Equation" r:id="rId4" imgW="1384300" imgH="711200" progId="Equation.DSMT4">
                   <p:embed/>
                   <p:pic>
                     <p:nvPicPr>
@@ -5287,8 +6680,8 @@
                     </p:blipFill>
                     <p:spPr bwMode="auto">
                       <a:xfrm>
-                        <a:off x="1660525" y="2222500"/>
-                        <a:ext cx="5364163" cy="2092325"/>
+                        <a:off x="873125" y="2281238"/>
+                        <a:ext cx="6151563" cy="3168650"/>
                       </a:xfrm>
                       <a:prstGeom prst="rect">
                         <a:avLst/>
@@ -5423,51 +6816,16 @@
           </a:p>
         </p:txBody>
       </p:sp>
-      <p:sp>
-        <p:nvSpPr>
-          <p:cNvPr id="11" name="TextBox 10"/>
-          <p:cNvSpPr txBox="1"/>
-          <p:nvPr/>
-        </p:nvSpPr>
-        <p:spPr>
-          <a:xfrm>
-            <a:off x="613834" y="984250"/>
-            <a:ext cx="5519360" cy="830997"/>
-          </a:xfrm>
-          <a:prstGeom prst="rect">
-            <a:avLst/>
-          </a:prstGeom>
-          <a:noFill/>
-        </p:spPr>
-        <p:txBody>
-          <a:bodyPr wrap="none" rtlCol="0">
-            <a:spAutoFit/>
-          </a:bodyPr>
-          <a:lstStyle/>
-          <a:p>
-            <a:r>
-              <a:rPr lang="en-US" sz="4800" dirty="0" smtClean="0">
-                <a:solidFill>
-                  <a:srgbClr val="660066"/>
-                </a:solidFill>
-                <a:latin typeface="Comic Sans MS"/>
-                <a:cs typeface="Comic Sans MS"/>
-              </a:rPr>
-              <a:t>cleverer approach:</a:t>
-            </a:r>
-          </a:p>
-        </p:txBody>
-      </p:sp>
       <p:graphicFrame>
         <p:nvGraphicFramePr>
-          <p:cNvPr id="8" name="Object 7"/>
+          <p:cNvPr id="7" name="Object 6"/>
           <p:cNvGraphicFramePr>
             <a:graphicFrameLocks noChangeAspect="1"/>
           </p:cNvGraphicFramePr>
           <p:nvPr>
             <p:extLst>
               <p:ext uri="{D42A27DB-BD31-4B8C-83A1-F6EECF244321}">
-                <p14:modId xmlns:p14="http://schemas.microsoft.com/office/powerpoint/2010/main" val="4258665652"/>
+                <p14:modId xmlns:p14="http://schemas.microsoft.com/office/powerpoint/2010/main" val="399099884"/>
               </p:ext>
             </p:extLst>
           </p:nvPr>
@@ -5480,7 +6838,7 @@
           <a:graphicData uri="http://schemas.openxmlformats.org/presentationml/2006/ole">
             <mc:AlternateContent xmlns:mc="http://schemas.openxmlformats.org/markup-compatibility/2006">
               <mc:Choice xmlns:v="urn:schemas-microsoft-com:vml" Requires="v">
-                <p:oleObj spid="_x0000_s495668" name="Equation" r:id="rId6" imgW="520700" imgH="241300" progId="Equation.DSMT4">
+                <p:oleObj spid="_x0000_s512013" name="Equation" r:id="rId6" imgW="520700" imgH="241300" progId="Equation.DSMT4">
                   <p:embed/>
                 </p:oleObj>
               </mc:Choice>
@@ -5528,31 +6886,306 @@
           </a:graphicData>
         </a:graphic>
       </p:graphicFrame>
+      <p:sp>
+        <p:nvSpPr>
+          <p:cNvPr id="8" name="TextBox 7"/>
+          <p:cNvSpPr txBox="1"/>
+          <p:nvPr/>
+        </p:nvSpPr>
+        <p:spPr>
+          <a:xfrm>
+            <a:off x="613834" y="781050"/>
+            <a:ext cx="5152672" cy="1569660"/>
+          </a:xfrm>
+          <a:prstGeom prst="rect">
+            <a:avLst/>
+          </a:prstGeom>
+          <a:noFill/>
+        </p:spPr>
+        <p:txBody>
+          <a:bodyPr wrap="none" rtlCol="0">
+            <a:spAutoFit/>
+          </a:bodyPr>
+          <a:lstStyle/>
+          <a:p>
+            <a:r>
+              <a:rPr lang="en-US" sz="4800" dirty="0" smtClean="0">
+                <a:solidFill>
+                  <a:srgbClr val="660066"/>
+                </a:solidFill>
+                <a:latin typeface="Comic Sans MS"/>
+                <a:cs typeface="Comic Sans MS"/>
+              </a:rPr>
+              <a:t>total expectation</a:t>
+            </a:r>
+          </a:p>
+          <a:p>
+            <a:r>
+              <a:rPr lang="en-US" sz="4800" dirty="0" smtClean="0">
+                <a:solidFill>
+                  <a:srgbClr val="660066"/>
+                </a:solidFill>
+                <a:latin typeface="Comic Sans MS"/>
+                <a:cs typeface="Comic Sans MS"/>
+              </a:rPr>
+              <a:t> approach:</a:t>
+            </a:r>
+          </a:p>
+        </p:txBody>
+      </p:sp>
+      <p:sp>
+        <p:nvSpPr>
+          <p:cNvPr id="9" name="TextBox 8"/>
+          <p:cNvSpPr txBox="1"/>
+          <p:nvPr/>
+        </p:nvSpPr>
+        <p:spPr>
+          <a:xfrm>
+            <a:off x="719666" y="5418667"/>
+            <a:ext cx="4454953" cy="923330"/>
+          </a:xfrm>
+          <a:prstGeom prst="rect">
+            <a:avLst/>
+          </a:prstGeom>
+          <a:noFill/>
+        </p:spPr>
+        <p:txBody>
+          <a:bodyPr wrap="none" rtlCol="0">
+            <a:spAutoFit/>
+          </a:bodyPr>
+          <a:lstStyle/>
+          <a:p>
+            <a:r>
+              <a:rPr lang="en-US" sz="5400" dirty="0" smtClean="0">
+                <a:solidFill>
+                  <a:srgbClr val="0000E5"/>
+                </a:solidFill>
+                <a:latin typeface="Comic Sans MS"/>
+                <a:cs typeface="Comic Sans MS"/>
+              </a:rPr>
+              <a:t>now solve for </a:t>
+            </a:r>
+          </a:p>
+        </p:txBody>
+      </p:sp>
+      <p:graphicFrame>
+        <p:nvGraphicFramePr>
+          <p:cNvPr id="11" name="Object 10"/>
+          <p:cNvGraphicFramePr>
+            <a:graphicFrameLocks noChangeAspect="1"/>
+          </p:cNvGraphicFramePr>
+          <p:nvPr>
+            <p:extLst>
+              <p:ext uri="{D42A27DB-BD31-4B8C-83A1-F6EECF244321}">
+                <p14:modId xmlns:p14="http://schemas.microsoft.com/office/powerpoint/2010/main" val="2168701291"/>
+              </p:ext>
+            </p:extLst>
+          </p:nvPr>
+        </p:nvGraphicFramePr>
+        <p:xfrm>
+          <a:off x="5311775" y="5416550"/>
+          <a:ext cx="1820863" cy="989013"/>
+        </p:xfrm>
+        <a:graphic>
+          <a:graphicData uri="http://schemas.openxmlformats.org/presentationml/2006/ole">
+            <mc:AlternateContent xmlns:mc="http://schemas.openxmlformats.org/markup-compatibility/2006">
+              <mc:Choice xmlns:v="urn:schemas-microsoft-com:vml" Requires="v">
+                <p:oleObj spid="_x0000_s512014" name="Equation" r:id="rId8" imgW="444500" imgH="241300" progId="Equation.DSMT4">
+                  <p:embed/>
+                </p:oleObj>
+              </mc:Choice>
+              <mc:Fallback>
+                <p:oleObj name="Equation" r:id="rId8" imgW="444500" imgH="241300" progId="Equation.DSMT4">
+                  <p:embed/>
+                  <p:pic>
+                    <p:nvPicPr>
+                      <p:cNvPr id="0" name=""/>
+                      <p:cNvPicPr>
+                        <a:picLocks noChangeAspect="1" noChangeArrowheads="1"/>
+                      </p:cNvPicPr>
+                      <p:nvPr/>
+                    </p:nvPicPr>
+                    <p:blipFill>
+                      <a:blip r:embed="rId9"/>
+                      <a:srcRect/>
+                      <a:stretch>
+                        <a:fillRect/>
+                      </a:stretch>
+                    </p:blipFill>
+                    <p:spPr bwMode="auto">
+                      <a:xfrm>
+                        <a:off x="5311775" y="5416550"/>
+                        <a:ext cx="1820863" cy="989013"/>
+                      </a:xfrm>
+                      <a:prstGeom prst="rect">
+                        <a:avLst/>
+                      </a:prstGeom>
+                      <a:noFill/>
+                      <a:extLst>
+                        <a:ext uri="{909E8E84-426E-40dd-AFC4-6F175D3DCCD1}">
+                          <a14:hiddenFill xmlns:a14="http://schemas.microsoft.com/office/drawing/2010/main">
+                            <a:solidFill>
+                              <a:srgbClr val="FFFFFF"/>
+                            </a:solidFill>
+                          </a14:hiddenFill>
+                        </a:ext>
+                      </a:extLst>
+                    </p:spPr>
+                  </p:pic>
+                </p:oleObj>
+              </mc:Fallback>
+            </mc:AlternateContent>
+          </a:graphicData>
+        </a:graphic>
+      </p:graphicFrame>
     </p:spTree>
     <p:extLst>
       <p:ext uri="{BB962C8B-B14F-4D97-AF65-F5344CB8AC3E}">
-        <p14:creationId xmlns:p14="http://schemas.microsoft.com/office/powerpoint/2010/main" val="2019422065"/>
+        <p14:creationId xmlns:p14="http://schemas.microsoft.com/office/powerpoint/2010/main" val="951027085"/>
       </p:ext>
     </p:extLst>
   </p:cSld>
   <p:clrMapOvr>
     <a:masterClrMapping/>
   </p:clrMapOvr>
-  <p:transition xmlns:p14="http://schemas.microsoft.com/office/powerpoint/2010/main" spd="slow" advClick="0">
-    <p:fade/>
-  </p:transition>
+  <mc:AlternateContent xmlns:mc="http://schemas.openxmlformats.org/markup-compatibility/2006" xmlns:p14="http://schemas.microsoft.com/office/powerpoint/2010/main">
+    <mc:Choice Requires="p14">
+      <p:transition spd="med" p14:dur="600" advClick="0">
+        <p:fade/>
+      </p:transition>
+    </mc:Choice>
+    <mc:Fallback xmlns="">
+      <p:transition xmlns:p14="http://schemas.microsoft.com/office/powerpoint/2010/main" spd="med" advClick="0">
+        <p:fade/>
+      </p:transition>
+    </mc:Fallback>
+  </mc:AlternateContent>
   <p:timing>
     <p:tnLst>
       <p:par>
-        <p:cTn xmlns:p14="http://schemas.microsoft.com/office/powerpoint/2010/main" id="1" dur="indefinite" restart="never" nodeType="tmRoot"/>
+        <p:cTn xmlns:p14="http://schemas.microsoft.com/office/powerpoint/2010/main" id="1" dur="indefinite" restart="never" nodeType="tmRoot">
+          <p:childTnLst>
+            <p:seq concurrent="1" nextAc="seek">
+              <p:cTn id="2" dur="indefinite" nodeType="mainSeq">
+                <p:childTnLst>
+                  <p:par>
+                    <p:cTn id="3" fill="hold">
+                      <p:stCondLst>
+                        <p:cond delay="indefinite"/>
+                      </p:stCondLst>
+                      <p:childTnLst>
+                        <p:par>
+                          <p:cTn id="4" fill="hold">
+                            <p:stCondLst>
+                              <p:cond delay="0"/>
+                            </p:stCondLst>
+                            <p:childTnLst>
+                              <p:par>
+                                <p:cTn id="5" presetID="10" presetClass="entr" presetSubtype="0" fill="hold" grpId="0" nodeType="clickEffect">
+                                  <p:stCondLst>
+                                    <p:cond delay="0"/>
+                                  </p:stCondLst>
+                                  <p:childTnLst>
+                                    <p:set>
+                                      <p:cBhvr>
+                                        <p:cTn id="6" dur="1" fill="hold">
+                                          <p:stCondLst>
+                                            <p:cond delay="0"/>
+                                          </p:stCondLst>
+                                        </p:cTn>
+                                        <p:tgtEl>
+                                          <p:spTgt spid="9"/>
+                                        </p:tgtEl>
+                                        <p:attrNameLst>
+                                          <p:attrName>style.visibility</p:attrName>
+                                        </p:attrNameLst>
+                                      </p:cBhvr>
+                                      <p:to>
+                                        <p:strVal val="visible"/>
+                                      </p:to>
+                                    </p:set>
+                                    <p:animEffect transition="in" filter="fade">
+                                      <p:cBhvr>
+                                        <p:cTn id="7" dur="500"/>
+                                        <p:tgtEl>
+                                          <p:spTgt spid="9"/>
+                                        </p:tgtEl>
+                                      </p:cBhvr>
+                                    </p:animEffect>
+                                  </p:childTnLst>
+                                </p:cTn>
+                              </p:par>
+                              <p:par>
+                                <p:cTn id="8" presetID="10" presetClass="entr" presetSubtype="0" fill="hold" nodeType="withEffect">
+                                  <p:stCondLst>
+                                    <p:cond delay="0"/>
+                                  </p:stCondLst>
+                                  <p:childTnLst>
+                                    <p:set>
+                                      <p:cBhvr>
+                                        <p:cTn id="9" dur="1" fill="hold">
+                                          <p:stCondLst>
+                                            <p:cond delay="0"/>
+                                          </p:stCondLst>
+                                        </p:cTn>
+                                        <p:tgtEl>
+                                          <p:spTgt spid="11"/>
+                                        </p:tgtEl>
+                                        <p:attrNameLst>
+                                          <p:attrName>style.visibility</p:attrName>
+                                        </p:attrNameLst>
+                                      </p:cBhvr>
+                                      <p:to>
+                                        <p:strVal val="visible"/>
+                                      </p:to>
+                                    </p:set>
+                                    <p:animEffect transition="in" filter="fade">
+                                      <p:cBhvr>
+                                        <p:cTn id="10" dur="500"/>
+                                        <p:tgtEl>
+                                          <p:spTgt spid="11"/>
+                                        </p:tgtEl>
+                                      </p:cBhvr>
+                                    </p:animEffect>
+                                  </p:childTnLst>
+                                </p:cTn>
+                              </p:par>
+                            </p:childTnLst>
+                          </p:cTn>
+                        </p:par>
+                      </p:childTnLst>
+                    </p:cTn>
+                  </p:par>
+                </p:childTnLst>
+              </p:cTn>
+              <p:prevCondLst>
+                <p:cond evt="onPrev" delay="0">
+                  <p:tgtEl>
+                    <p:sldTgt/>
+                  </p:tgtEl>
+                </p:cond>
+              </p:prevCondLst>
+              <p:nextCondLst>
+                <p:cond evt="onNext" delay="0">
+                  <p:tgtEl>
+                    <p:sldTgt/>
+                  </p:tgtEl>
+                </p:cond>
+              </p:nextCondLst>
+            </p:seq>
+          </p:childTnLst>
+        </p:cTn>
       </p:par>
     </p:tnLst>
+    <p:bldLst>
+      <p:bldP spid="9" grpId="0"/>
+    </p:bldLst>
   </p:timing>
 </p:sld>
 </file>
 
-<file path=ppt/slides/slide13.xml><?xml version="1.0" encoding="utf-8"?>
-<p:sld xmlns:a="http://schemas.openxmlformats.org/drawingml/2006/main" xmlns:r="http://schemas.openxmlformats.org/officeDocument/2006/relationships" xmlns:p="http://schemas.openxmlformats.org/presentationml/2006/main">
+<file path=ppt/slides/slide16.xml><?xml version="1.0" encoding="utf-8"?>
+<p:sld xmlns:a="http://schemas.openxmlformats.org/drawingml/2006/main" xmlns:r="http://schemas.openxmlformats.org/officeDocument/2006/relationships" xmlns:p="http://schemas.openxmlformats.org/presentationml/2006/main" show="0">
   <p:cSld>
     <p:spTree>
       <p:nvGrpSpPr>
@@ -5590,7 +7223,7 @@
           <a:graphicData uri="http://schemas.openxmlformats.org/presentationml/2006/ole">
             <mc:AlternateContent xmlns:mc="http://schemas.openxmlformats.org/markup-compatibility/2006">
               <mc:Choice xmlns:v="urn:schemas-microsoft-com:vml" Requires="v">
-                <p:oleObj spid="_x0000_s496761" name="Equation" r:id="rId5" imgW="1155700" imgH="254000" progId="Equation.DSMT4">
+                <p:oleObj spid="_x0000_s496788" name="Equation" r:id="rId5" imgW="1155700" imgH="254000" progId="Equation.DSMT4">
                   <p:embed/>
                 </p:oleObj>
               </mc:Choice>
@@ -5807,7 +7440,7 @@
           <a:graphicData uri="http://schemas.openxmlformats.org/presentationml/2006/ole">
             <mc:AlternateContent xmlns:mc="http://schemas.openxmlformats.org/markup-compatibility/2006">
               <mc:Choice xmlns:v="urn:schemas-microsoft-com:vml" Requires="v">
-                <p:oleObj spid="_x0000_s496762" name="Equation" r:id="rId7" imgW="1447800" imgH="254000" progId="Equation.DSMT4">
+                <p:oleObj spid="_x0000_s496789" name="Equation" r:id="rId7" imgW="1447800" imgH="254000" progId="Equation.DSMT4">
                   <p:embed/>
                 </p:oleObj>
               </mc:Choice>
@@ -5869,7 +7502,7 @@
           <a:graphicData uri="http://schemas.openxmlformats.org/presentationml/2006/ole">
             <mc:AlternateContent xmlns:mc="http://schemas.openxmlformats.org/markup-compatibility/2006">
               <mc:Choice xmlns:v="urn:schemas-microsoft-com:vml" Requires="v">
-                <p:oleObj spid="_x0000_s496763" name="Equation" r:id="rId9" imgW="1447800" imgH="254000" progId="Equation.DSMT4">
+                <p:oleObj spid="_x0000_s496790" name="Equation" r:id="rId9" imgW="1447800" imgH="254000" progId="Equation.DSMT4">
                   <p:embed/>
                 </p:oleObj>
               </mc:Choice>
@@ -5966,7 +7599,7 @@
           <a:graphicData uri="http://schemas.openxmlformats.org/presentationml/2006/ole">
             <mc:AlternateContent xmlns:mc="http://schemas.openxmlformats.org/markup-compatibility/2006">
               <mc:Choice xmlns:v="urn:schemas-microsoft-com:vml" Requires="v">
-                <p:oleObj spid="_x0000_s496764" name="Equation" r:id="rId11" imgW="520700" imgH="241300" progId="Equation.DSMT4">
+                <p:oleObj spid="_x0000_s496791" name="Equation" r:id="rId11" imgW="520700" imgH="241300" progId="Equation.DSMT4">
                   <p:embed/>
                 </p:oleObj>
               </mc:Choice>
@@ -6036,7 +7669,7 @@
           <a:graphicData uri="http://schemas.openxmlformats.org/presentationml/2006/ole">
             <mc:AlternateContent xmlns:mc="http://schemas.openxmlformats.org/markup-compatibility/2006">
               <mc:Choice xmlns:v="urn:schemas-microsoft-com:vml" Requires="v">
-                <p:oleObj spid="_x0000_s496765" name="Equation" r:id="rId13" imgW="444500" imgH="241300" progId="Equation.DSMT4">
+                <p:oleObj spid="_x0000_s496792" name="Equation" r:id="rId13" imgW="444500" imgH="241300" progId="Equation.DSMT4">
                   <p:embed/>
                 </p:oleObj>
               </mc:Choice>
@@ -6330,7 +7963,7 @@
 </p:sld>
 </file>
 
-<file path=ppt/slides/slide14.xml><?xml version="1.0" encoding="utf-8"?>
+<file path=ppt/slides/slide17.xml><?xml version="1.0" encoding="utf-8"?>
 <p:sld xmlns:a="http://schemas.openxmlformats.org/drawingml/2006/main" xmlns:r="http://schemas.openxmlformats.org/officeDocument/2006/relationships" xmlns:p="http://schemas.openxmlformats.org/presentationml/2006/main" show="0">
   <p:cSld>
     <p:spTree>
@@ -6369,7 +8002,7 @@
           <a:graphicData uri="http://schemas.openxmlformats.org/presentationml/2006/ole">
             <mc:AlternateContent xmlns:mc="http://schemas.openxmlformats.org/markup-compatibility/2006">
               <mc:Choice xmlns:v="urn:schemas-microsoft-com:vml" Requires="v">
-                <p:oleObj spid="_x0000_s1134" name="Equation" r:id="rId4" imgW="1193800" imgH="304800" progId="Equation.DSMT4">
+                <p:oleObj spid="_x0000_s1161" name="Equation" r:id="rId4" imgW="1193800" imgH="304800" progId="Equation.DSMT4">
                   <p:embed/>
                 </p:oleObj>
               </mc:Choice>
@@ -6596,7 +8229,7 @@
           <a:graphicData uri="http://schemas.openxmlformats.org/presentationml/2006/ole">
             <mc:AlternateContent xmlns:mc="http://schemas.openxmlformats.org/markup-compatibility/2006">
               <mc:Choice xmlns:v="urn:schemas-microsoft-com:vml" Requires="v">
-                <p:oleObj spid="_x0000_s1135" name="Equation" r:id="rId6" imgW="1816100" imgH="292100" progId="Equation.DSMT4">
+                <p:oleObj spid="_x0000_s1162" name="Equation" r:id="rId6" imgW="1816100" imgH="292100" progId="Equation.DSMT4">
                   <p:embed/>
                 </p:oleObj>
               </mc:Choice>
@@ -6660,7 +8293,7 @@
           <a:graphicData uri="http://schemas.openxmlformats.org/presentationml/2006/ole">
             <mc:AlternateContent xmlns:mc="http://schemas.openxmlformats.org/markup-compatibility/2006">
               <mc:Choice xmlns:v="urn:schemas-microsoft-com:vml" Requires="v">
-                <p:oleObj spid="_x0000_s1136" name="Equation" r:id="rId8" imgW="546100" imgH="241300" progId="Equation.DSMT4">
+                <p:oleObj spid="_x0000_s1163" name="Equation" r:id="rId8" imgW="546100" imgH="241300" progId="Equation.DSMT4">
                   <p:embed/>
                 </p:oleObj>
               </mc:Choice>
@@ -6736,7 +8369,7 @@
           <a:graphicData uri="http://schemas.openxmlformats.org/presentationml/2006/ole">
             <mc:AlternateContent xmlns:mc="http://schemas.openxmlformats.org/markup-compatibility/2006">
               <mc:Choice xmlns:v="urn:schemas-microsoft-com:vml" Requires="v">
-                <p:oleObj spid="_x0000_s1137" name="Equation" r:id="rId10" imgW="1574800" imgH="482600" progId="Equation.DSMT4">
+                <p:oleObj spid="_x0000_s1164" name="Equation" r:id="rId10" imgW="1574800" imgH="482600" progId="Equation.DSMT4">
                   <p:embed/>
                 </p:oleObj>
               </mc:Choice>
@@ -6849,7 +8482,7 @@
             <a:graphicData uri="http://schemas.openxmlformats.org/presentationml/2006/ole">
               <mc:AlternateContent xmlns:mc="http://schemas.openxmlformats.org/markup-compatibility/2006">
                 <mc:Choice xmlns:v="urn:schemas-microsoft-com:vml" Requires="v">
-                  <p:oleObj spid="_x0000_s1138" name="Equation" r:id="rId12" imgW="469900" imgH="241300" progId="Equation.DSMT4">
+                  <p:oleObj spid="_x0000_s1165" name="Equation" r:id="rId12" imgW="469900" imgH="241300" progId="Equation.DSMT4">
                     <p:embed/>
                   </p:oleObj>
                 </mc:Choice>
@@ -7162,7 +8795,7 @@
 </p:sld>
 </file>
 
-<file path=ppt/slides/slide15.xml><?xml version="1.0" encoding="utf-8"?>
+<file path=ppt/slides/slide18.xml><?xml version="1.0" encoding="utf-8"?>
 <p:sld xmlns:a="http://schemas.openxmlformats.org/drawingml/2006/main" xmlns:r="http://schemas.openxmlformats.org/officeDocument/2006/relationships" xmlns:p="http://schemas.openxmlformats.org/presentationml/2006/main">
   <p:cSld>
     <p:spTree>
@@ -7609,7 +9242,7 @@
           <a:graphicData uri="http://schemas.openxmlformats.org/presentationml/2006/ole">
             <mc:AlternateContent xmlns:mc="http://schemas.openxmlformats.org/markup-compatibility/2006">
               <mc:Choice xmlns:v="urn:schemas-microsoft-com:vml" Requires="v">
-                <p:oleObj spid="_x0000_s270385" name="Equation" r:id="rId6" imgW="1270000" imgH="482600" progId="Equation.DSMT4">
+                <p:oleObj spid="_x0000_s270392" name="Equation" r:id="rId6" imgW="1270000" imgH="482600" progId="Equation.DSMT4">
                   <p:embed/>
                 </p:oleObj>
               </mc:Choice>
@@ -7692,7 +9325,7 @@
     <a:masterClrMapping/>
   </p:clrMapOvr>
   <p:transition xmlns:p14="http://schemas.microsoft.com/office/powerpoint/2010/main" spd="slow" advClick="0">
-    <p:fade/>
+    <p:fade thruBlk="1"/>
   </p:transition>
   <p:timing>
     <p:tnLst>
@@ -8118,7 +9751,7 @@
 </p:sld>
 </file>
 
-<file path=ppt/slides/slide16.xml><?xml version="1.0" encoding="utf-8"?>
+<file path=ppt/slides/slide19.xml><?xml version="1.0" encoding="utf-8"?>
 <p:sld xmlns:a="http://schemas.openxmlformats.org/drawingml/2006/main" xmlns:r="http://schemas.openxmlformats.org/officeDocument/2006/relationships" xmlns:p="http://schemas.openxmlformats.org/presentationml/2006/main">
   <p:cSld>
     <p:spTree>
@@ -8547,7 +10180,7 @@
           <a:graphicData uri="http://schemas.openxmlformats.org/presentationml/2006/ole">
             <mc:AlternateContent xmlns:mc="http://schemas.openxmlformats.org/markup-compatibility/2006">
               <mc:Choice xmlns:v="urn:schemas-microsoft-com:vml" Requires="v">
-                <p:oleObj spid="_x0000_s503815" name="Equation" r:id="rId6" imgW="1270000" imgH="482600" progId="Equation.DSMT4">
+                <p:oleObj spid="_x0000_s503822" name="Equation" r:id="rId6" imgW="1270000" imgH="482600" progId="Equation.DSMT4">
                   <p:embed/>
                 </p:oleObj>
               </mc:Choice>
@@ -8656,1051 +10289,6 @@
 </p:sld>
 </file>
 
-<file path=ppt/slides/slide17.xml><?xml version="1.0" encoding="utf-8"?>
-<p:sld xmlns:a="http://schemas.openxmlformats.org/drawingml/2006/main" xmlns:r="http://schemas.openxmlformats.org/officeDocument/2006/relationships" xmlns:p="http://schemas.openxmlformats.org/presentationml/2006/main">
-  <p:cSld>
-    <p:spTree>
-      <p:nvGrpSpPr>
-        <p:cNvPr id="1" name=""/>
-        <p:cNvGrpSpPr/>
-        <p:nvPr/>
-      </p:nvGrpSpPr>
-      <p:grpSpPr>
-        <a:xfrm>
-          <a:off x="0" y="0"/>
-          <a:ext cx="0" cy="0"/>
-          <a:chOff x="0" y="0"/>
-          <a:chExt cx="0" cy="0"/>
-        </a:xfrm>
-      </p:grpSpPr>
-      <p:sp>
-        <p:nvSpPr>
-          <p:cNvPr id="50179" name="Rectangle 2"/>
-          <p:cNvSpPr>
-            <a:spLocks noGrp="1" noChangeArrowheads="1"/>
-          </p:cNvSpPr>
-          <p:nvPr>
-            <p:ph type="title"/>
-          </p:nvPr>
-        </p:nvSpPr>
-        <p:spPr/>
-        <p:txBody>
-          <a:bodyPr/>
-          <a:lstStyle/>
-          <a:p>
-            <a:pPr eaLnBrk="1" hangingPunct="1"/>
-            <a:r>
-              <a:rPr lang="en-US" sz="3600" dirty="0" smtClean="0"/>
-              <a:t>Calculating Variance</a:t>
-            </a:r>
-          </a:p>
-        </p:txBody>
-      </p:sp>
-      <p:sp>
-        <p:nvSpPr>
-          <p:cNvPr id="50180" name="Rectangle 4"/>
-          <p:cNvSpPr>
-            <a:spLocks noChangeArrowheads="1"/>
-          </p:cNvSpPr>
-          <p:nvPr/>
-        </p:nvSpPr>
-        <p:spPr bwMode="auto">
-          <a:xfrm>
-            <a:off x="2590800" y="3048000"/>
-            <a:ext cx="1143000" cy="609600"/>
-          </a:xfrm>
-          <a:prstGeom prst="rect">
-            <a:avLst/>
-          </a:prstGeom>
-          <a:noFill/>
-          <a:ln w="9525">
-            <a:noFill/>
-            <a:miter lim="800000"/>
-            <a:headEnd/>
-            <a:tailEnd/>
-          </a:ln>
-        </p:spPr>
-        <p:txBody>
-          <a:bodyPr wrap="none" anchor="ctr">
-            <a:spAutoFit/>
-          </a:bodyPr>
-          <a:lstStyle/>
-          <a:p>
-            <a:endParaRPr lang="en-US"/>
-          </a:p>
-        </p:txBody>
-      </p:sp>
-      <p:sp>
-        <p:nvSpPr>
-          <p:cNvPr id="50182" name="Text Box 6"/>
-          <p:cNvSpPr txBox="1">
-            <a:spLocks noChangeArrowheads="1"/>
-          </p:cNvSpPr>
-          <p:nvPr/>
-        </p:nvSpPr>
-        <p:spPr bwMode="auto">
-          <a:xfrm>
-            <a:off x="1350963" y="3604895"/>
-            <a:ext cx="6459537" cy="1378839"/>
-          </a:xfrm>
-          <a:prstGeom prst="rect">
-            <a:avLst/>
-          </a:prstGeom>
-          <a:noFill/>
-          <a:ln w="9525">
-            <a:noFill/>
-            <a:miter lim="800000"/>
-            <a:headEnd/>
-            <a:tailEnd/>
-          </a:ln>
-        </p:spPr>
-        <p:txBody>
-          <a:bodyPr wrap="square">
-            <a:spAutoFit/>
-          </a:bodyPr>
-          <a:lstStyle/>
-          <a:p>
-            <a:pPr>
-              <a:lnSpc>
-                <a:spcPct val="90000"/>
-              </a:lnSpc>
-            </a:pPr>
-            <a:r>
-              <a:rPr lang="en-US" sz="4400" dirty="0">
-                <a:latin typeface="Comic Sans MS" pitchFamily="66" charset="0"/>
-                <a:cs typeface="Times New Roman" pitchFamily="18" charset="0"/>
-                <a:sym typeface="Symbol" pitchFamily="18" charset="2"/>
-              </a:rPr>
-              <a:t>providing</a:t>
-            </a:r>
-            <a:r>
-              <a:rPr lang="en-US" sz="4400" dirty="0">
-                <a:solidFill>
-                  <a:srgbClr val="FF00FF"/>
-                </a:solidFill>
-                <a:latin typeface="Comic Sans MS" pitchFamily="66" charset="0"/>
-                <a:cs typeface="Times New Roman" pitchFamily="18" charset="0"/>
-                <a:sym typeface="Symbol" pitchFamily="18" charset="2"/>
-              </a:rPr>
-              <a:t> </a:t>
-            </a:r>
-            <a:r>
-              <a:rPr lang="en-US" sz="4400" dirty="0">
-                <a:solidFill>
-                  <a:schemeClr val="accent1">
-                    <a:lumMod val="50000"/>
-                  </a:schemeClr>
-                </a:solidFill>
-                <a:latin typeface="Comic Sans MS" pitchFamily="66" charset="0"/>
-                <a:cs typeface="Times New Roman" pitchFamily="18" charset="0"/>
-                <a:sym typeface="Symbol" pitchFamily="18" charset="2"/>
-              </a:rPr>
-              <a:t>R</a:t>
-            </a:r>
-            <a:r>
-              <a:rPr lang="en-US" sz="4400" baseline="-25000" dirty="0">
-                <a:solidFill>
-                  <a:schemeClr val="accent1">
-                    <a:lumMod val="50000"/>
-                  </a:schemeClr>
-                </a:solidFill>
-                <a:latin typeface="Comic Sans MS" pitchFamily="66" charset="0"/>
-                <a:cs typeface="Times New Roman" pitchFamily="18" charset="0"/>
-                <a:sym typeface="Symbol" pitchFamily="18" charset="2"/>
-              </a:rPr>
-              <a:t>1</a:t>
-            </a:r>
-            <a:r>
-              <a:rPr lang="en-US" sz="4400" dirty="0">
-                <a:solidFill>
-                  <a:schemeClr val="accent1">
-                    <a:lumMod val="50000"/>
-                  </a:schemeClr>
-                </a:solidFill>
-                <a:latin typeface="Comic Sans MS" pitchFamily="66" charset="0"/>
-                <a:cs typeface="Times New Roman" pitchFamily="18" charset="0"/>
-                <a:sym typeface="Symbol" pitchFamily="18" charset="2"/>
-              </a:rPr>
-              <a:t>,R</a:t>
-            </a:r>
-            <a:r>
-              <a:rPr lang="en-US" sz="4400" baseline="-25000" dirty="0">
-                <a:solidFill>
-                  <a:schemeClr val="accent1">
-                    <a:lumMod val="50000"/>
-                  </a:schemeClr>
-                </a:solidFill>
-                <a:latin typeface="Comic Sans MS" pitchFamily="66" charset="0"/>
-                <a:cs typeface="Times New Roman" pitchFamily="18" charset="0"/>
-                <a:sym typeface="Symbol" pitchFamily="18" charset="2"/>
-              </a:rPr>
-              <a:t>2</a:t>
-            </a:r>
-            <a:r>
-              <a:rPr lang="en-US" sz="4400" dirty="0">
-                <a:solidFill>
-                  <a:schemeClr val="accent1">
-                    <a:lumMod val="50000"/>
-                  </a:schemeClr>
-                </a:solidFill>
-                <a:latin typeface="Comic Sans MS" pitchFamily="66" charset="0"/>
-                <a:cs typeface="Times New Roman" pitchFamily="18" charset="0"/>
-                <a:sym typeface="Symbol" pitchFamily="18" charset="2"/>
-              </a:rPr>
-              <a:t>,…,</a:t>
-            </a:r>
-            <a:r>
-              <a:rPr lang="en-US" sz="4400" dirty="0" err="1">
-                <a:solidFill>
-                  <a:schemeClr val="accent1">
-                    <a:lumMod val="50000"/>
-                  </a:schemeClr>
-                </a:solidFill>
-                <a:latin typeface="Comic Sans MS" pitchFamily="66" charset="0"/>
-                <a:cs typeface="Times New Roman" pitchFamily="18" charset="0"/>
-                <a:sym typeface="Symbol" pitchFamily="18" charset="2"/>
-              </a:rPr>
-              <a:t>R</a:t>
-            </a:r>
-            <a:r>
-              <a:rPr lang="en-US" sz="4400" baseline="-25000" dirty="0" err="1">
-                <a:solidFill>
-                  <a:schemeClr val="accent1">
-                    <a:lumMod val="50000"/>
-                  </a:schemeClr>
-                </a:solidFill>
-                <a:latin typeface="Comic Sans MS" pitchFamily="66" charset="0"/>
-                <a:cs typeface="Times New Roman" pitchFamily="18" charset="0"/>
-                <a:sym typeface="Symbol" pitchFamily="18" charset="2"/>
-              </a:rPr>
-              <a:t>n</a:t>
-            </a:r>
-            <a:r>
-              <a:rPr lang="en-US" sz="4400" dirty="0">
-                <a:solidFill>
-                  <a:srgbClr val="FF6600"/>
-                </a:solidFill>
-                <a:latin typeface="Comic Sans MS" pitchFamily="66" charset="0"/>
-                <a:cs typeface="Times New Roman" pitchFamily="18" charset="0"/>
-                <a:sym typeface="Symbol" pitchFamily="18" charset="2"/>
-              </a:rPr>
-              <a:t> </a:t>
-            </a:r>
-            <a:r>
-              <a:rPr lang="en-US" sz="4400" dirty="0" smtClean="0">
-                <a:latin typeface="Comic Sans MS" pitchFamily="66" charset="0"/>
-                <a:cs typeface="Times New Roman" pitchFamily="18" charset="0"/>
-                <a:sym typeface="Symbol" pitchFamily="18" charset="2"/>
-              </a:rPr>
-              <a:t>are</a:t>
-            </a:r>
-            <a:endParaRPr lang="en-US" sz="4400" dirty="0">
-              <a:latin typeface="Comic Sans MS" pitchFamily="66" charset="0"/>
-              <a:cs typeface="Times New Roman" pitchFamily="18" charset="0"/>
-              <a:sym typeface="Symbol" pitchFamily="18" charset="2"/>
-            </a:endParaRPr>
-          </a:p>
-          <a:p>
-            <a:r>
-              <a:rPr lang="en-US" sz="4400" dirty="0" err="1">
-                <a:solidFill>
-                  <a:srgbClr val="008000"/>
-                </a:solidFill>
-                <a:latin typeface="Comic Sans MS" pitchFamily="66" charset="0"/>
-                <a:cs typeface="Times New Roman" pitchFamily="18" charset="0"/>
-                <a:sym typeface="Symbol" pitchFamily="18" charset="2"/>
-              </a:rPr>
-              <a:t>pairwise</a:t>
-            </a:r>
-            <a:r>
-              <a:rPr lang="en-US" sz="4400" dirty="0">
-                <a:solidFill>
-                  <a:srgbClr val="008000"/>
-                </a:solidFill>
-                <a:latin typeface="Comic Sans MS" pitchFamily="66" charset="0"/>
-                <a:cs typeface="Times New Roman" pitchFamily="18" charset="0"/>
-                <a:sym typeface="Symbol" pitchFamily="18" charset="2"/>
-              </a:rPr>
-              <a:t> independent</a:t>
-            </a:r>
-            <a:endParaRPr lang="en-US" sz="2000" dirty="0">
-              <a:solidFill>
-                <a:srgbClr val="008000"/>
-              </a:solidFill>
-              <a:latin typeface="Comic Sans MS" pitchFamily="66" charset="0"/>
-            </a:endParaRPr>
-          </a:p>
-        </p:txBody>
-      </p:sp>
-      <p:sp>
-        <p:nvSpPr>
-          <p:cNvPr id="729097" name="Rectangle 9"/>
-          <p:cNvSpPr>
-            <a:spLocks noChangeArrowheads="1"/>
-          </p:cNvSpPr>
-          <p:nvPr/>
-        </p:nvSpPr>
-        <p:spPr bwMode="auto">
-          <a:xfrm>
-            <a:off x="190500" y="1813560"/>
-            <a:ext cx="8717280" cy="3352800"/>
-          </a:xfrm>
-          <a:prstGeom prst="rect">
-            <a:avLst/>
-          </a:prstGeom>
-          <a:noFill/>
-          <a:ln w="41275" algn="ctr">
-            <a:solidFill>
-              <a:srgbClr val="FF00FF"/>
-            </a:solidFill>
-            <a:prstDash val="sysDash"/>
-            <a:miter lim="800000"/>
-            <a:headEnd/>
-            <a:tailEnd/>
-          </a:ln>
-        </p:spPr>
-        <p:txBody>
-          <a:bodyPr wrap="none" anchor="ctr"/>
-          <a:lstStyle/>
-          <a:p>
-            <a:endParaRPr lang="en-US"/>
-          </a:p>
-        </p:txBody>
-      </p:sp>
-      <p:graphicFrame>
-        <p:nvGraphicFramePr>
-          <p:cNvPr id="7" name="Object 6"/>
-          <p:cNvGraphicFramePr>
-            <a:graphicFrameLocks noChangeAspect="1"/>
-          </p:cNvGraphicFramePr>
-          <p:nvPr>
-            <p:extLst>
-              <p:ext uri="{D42A27DB-BD31-4B8C-83A1-F6EECF244321}">
-                <p14:modId xmlns:p14="http://schemas.microsoft.com/office/powerpoint/2010/main" val="2461875164"/>
-              </p:ext>
-            </p:extLst>
-          </p:nvPr>
-        </p:nvGraphicFramePr>
-        <p:xfrm>
-          <a:off x="479425" y="1666875"/>
-          <a:ext cx="8261350" cy="2041525"/>
-        </p:xfrm>
-        <a:graphic>
-          <a:graphicData uri="http://schemas.openxmlformats.org/presentationml/2006/ole">
-            <mc:AlternateContent xmlns:mc="http://schemas.openxmlformats.org/markup-compatibility/2006">
-              <mc:Choice xmlns:v="urn:schemas-microsoft-com:vml" Requires="v">
-                <p:oleObj spid="_x0000_s109612" name="Equation" r:id="rId5" imgW="2260600" imgH="558800" progId="Equation.DSMT4">
-                  <p:embed/>
-                </p:oleObj>
-              </mc:Choice>
-              <mc:Fallback>
-                <p:oleObj name="Equation" r:id="rId5" imgW="2260600" imgH="558800" progId="Equation.DSMT4">
-                  <p:embed/>
-                  <p:pic>
-                    <p:nvPicPr>
-                      <p:cNvPr id="0" name="Picture 2"/>
-                      <p:cNvPicPr>
-                        <a:picLocks noChangeAspect="1" noChangeArrowheads="1"/>
-                      </p:cNvPicPr>
-                      <p:nvPr/>
-                    </p:nvPicPr>
-                    <p:blipFill>
-                      <a:blip r:embed="rId6"/>
-                      <a:srcRect/>
-                      <a:stretch>
-                        <a:fillRect/>
-                      </a:stretch>
-                    </p:blipFill>
-                    <p:spPr bwMode="auto">
-                      <a:xfrm>
-                        <a:off x="479425" y="1666875"/>
-                        <a:ext cx="8261350" cy="2041525"/>
-                      </a:xfrm>
-                      <a:prstGeom prst="rect">
-                        <a:avLst/>
-                      </a:prstGeom>
-                      <a:noFill/>
-                      <a:extLst>
-                        <a:ext uri="{909E8E84-426E-40dd-AFC4-6F175D3DCCD1}">
-                          <a14:hiddenFill xmlns:a14="http://schemas.microsoft.com/office/drawing/2010/main">
-                            <a:solidFill>
-                              <a:srgbClr val="FFFFFF"/>
-                            </a:solidFill>
-                          </a14:hiddenFill>
-                        </a:ext>
-                      </a:extLst>
-                    </p:spPr>
-                  </p:pic>
-                </p:oleObj>
-              </mc:Fallback>
-            </mc:AlternateContent>
-          </a:graphicData>
-        </a:graphic>
-      </p:graphicFrame>
-      <p:sp>
-        <p:nvSpPr>
-          <p:cNvPr id="8" name="Rectangle 3"/>
-          <p:cNvSpPr txBox="1">
-            <a:spLocks noChangeArrowheads="1"/>
-          </p:cNvSpPr>
-          <p:nvPr/>
-        </p:nvSpPr>
-        <p:spPr bwMode="auto">
-          <a:xfrm>
-            <a:off x="635000" y="1013460"/>
-            <a:ext cx="7950200" cy="749300"/>
-          </a:xfrm>
-          <a:prstGeom prst="rect">
-            <a:avLst/>
-          </a:prstGeom>
-          <a:noFill/>
-          <a:ln w="9525">
-            <a:noFill/>
-            <a:miter lim="800000"/>
-            <a:headEnd/>
-            <a:tailEnd/>
-          </a:ln>
-        </p:spPr>
-        <p:txBody>
-          <a:bodyPr vert="horz" wrap="square" lIns="91440" tIns="45720" rIns="91440" bIns="45720" numCol="1" anchor="t" anchorCtr="0" compatLnSpc="1">
-            <a:prstTxWarp prst="textNoShape">
-              <a:avLst/>
-            </a:prstTxWarp>
-          </a:bodyPr>
-          <a:lstStyle/>
-          <a:p>
-            <a:pPr marL="342900" marR="0" lvl="0" indent="-342900" algn="l" defTabSz="914400" rtl="0" eaLnBrk="1" fontAlgn="base" latinLnBrk="0" hangingPunct="1">
-              <a:lnSpc>
-                <a:spcPct val="90000"/>
-              </a:lnSpc>
-              <a:spcBef>
-                <a:spcPct val="20000"/>
-              </a:spcBef>
-              <a:spcAft>
-                <a:spcPct val="0"/>
-              </a:spcAft>
-              <a:buClrTx/>
-              <a:buSzTx/>
-              <a:buFontTx/>
-              <a:buNone/>
-              <a:tabLst/>
-              <a:defRPr/>
-            </a:pPr>
-            <a:r>
-              <a:rPr kumimoji="0" lang="en-US" sz="4000" b="0" i="0" u="none" strike="noStrike" kern="0" cap="none" spc="0" normalizeH="0" baseline="0" noProof="0" dirty="0" err="1" smtClean="0">
-                <a:ln>
-                  <a:noFill/>
-                </a:ln>
-                <a:solidFill>
-                  <a:srgbClr val="008000"/>
-                </a:solidFill>
-                <a:effectLst/>
-                <a:uLnTx/>
-                <a:uFillTx/>
-                <a:latin typeface="+mn-lt"/>
-                <a:ea typeface="+mn-ea"/>
-                <a:cs typeface="Times New Roman" pitchFamily="18" charset="0"/>
-              </a:rPr>
-              <a:t>Pairwise</a:t>
-            </a:r>
-            <a:r>
-              <a:rPr kumimoji="0" lang="en-US" sz="4000" b="0" i="0" u="none" strike="noStrike" kern="0" cap="none" spc="0" normalizeH="0" baseline="0" noProof="0" dirty="0" smtClean="0">
-                <a:ln>
-                  <a:noFill/>
-                </a:ln>
-                <a:solidFill>
-                  <a:srgbClr val="008000"/>
-                </a:solidFill>
-                <a:effectLst/>
-                <a:uLnTx/>
-                <a:uFillTx/>
-                <a:latin typeface="+mn-lt"/>
-                <a:ea typeface="+mn-ea"/>
-                <a:cs typeface="Times New Roman" pitchFamily="18" charset="0"/>
-              </a:rPr>
-              <a:t> Independent</a:t>
-            </a:r>
-            <a:r>
-              <a:rPr kumimoji="0" lang="en-US" sz="4000" b="0" i="0" u="none" strike="noStrike" kern="0" cap="none" spc="0" normalizeH="0" baseline="0" noProof="0" dirty="0" smtClean="0">
-                <a:ln>
-                  <a:noFill/>
-                </a:ln>
-                <a:solidFill>
-                  <a:schemeClr val="tx1"/>
-                </a:solidFill>
-                <a:effectLst/>
-                <a:uLnTx/>
-                <a:uFillTx/>
-                <a:latin typeface="+mn-lt"/>
-                <a:ea typeface="+mn-ea"/>
-                <a:cs typeface="Times New Roman" pitchFamily="18" charset="0"/>
-              </a:rPr>
-              <a:t> </a:t>
-            </a:r>
-            <a:r>
-              <a:rPr kumimoji="0" lang="en-US" sz="4000" b="0" i="0" u="none" strike="noStrike" kern="0" cap="none" spc="0" normalizeH="0" baseline="0" noProof="0" dirty="0" err="1" smtClean="0">
-                <a:ln>
-                  <a:noFill/>
-                </a:ln>
-                <a:solidFill>
-                  <a:schemeClr val="tx1"/>
-                </a:solidFill>
-                <a:effectLst/>
-                <a:uLnTx/>
-                <a:uFillTx/>
-                <a:latin typeface="+mn-lt"/>
-                <a:ea typeface="+mn-ea"/>
-                <a:cs typeface="Times New Roman" pitchFamily="18" charset="0"/>
-              </a:rPr>
-              <a:t>Additivity</a:t>
-            </a:r>
-            <a:endParaRPr kumimoji="0" lang="en-US" sz="4000" b="0" i="0" u="none" strike="noStrike" kern="0" cap="none" spc="0" normalizeH="0" baseline="0" noProof="0" dirty="0" smtClean="0">
-              <a:ln>
-                <a:noFill/>
-              </a:ln>
-              <a:solidFill>
-                <a:srgbClr val="0000FF"/>
-              </a:solidFill>
-              <a:effectLst/>
-              <a:uLnTx/>
-              <a:uFillTx/>
-              <a:latin typeface="+mn-lt"/>
-              <a:ea typeface="+mn-ea"/>
-              <a:cs typeface="Times New Roman" pitchFamily="18" charset="0"/>
-              <a:sym typeface="Symbol" pitchFamily="18" charset="2"/>
-            </a:endParaRPr>
-          </a:p>
-        </p:txBody>
-      </p:sp>
-      <p:sp>
-        <p:nvSpPr>
-          <p:cNvPr id="9" name="Text Box 5"/>
-          <p:cNvSpPr txBox="1">
-            <a:spLocks noChangeArrowheads="1"/>
-          </p:cNvSpPr>
-          <p:nvPr/>
-        </p:nvSpPr>
-        <p:spPr bwMode="auto">
-          <a:xfrm>
-            <a:off x="810376" y="5191242"/>
-            <a:ext cx="7592143" cy="1200329"/>
-          </a:xfrm>
-          <a:prstGeom prst="rect">
-            <a:avLst/>
-          </a:prstGeom>
-          <a:noFill/>
-          <a:ln w="9525">
-            <a:noFill/>
-            <a:miter lim="800000"/>
-            <a:headEnd/>
-            <a:tailEnd/>
-          </a:ln>
-        </p:spPr>
-        <p:txBody>
-          <a:bodyPr wrap="none">
-            <a:spAutoFit/>
-          </a:bodyPr>
-          <a:lstStyle/>
-          <a:p>
-            <a:r>
-              <a:rPr lang="en-US" sz="3600" dirty="0" smtClean="0">
-                <a:latin typeface="Comic Sans MS" pitchFamily="66" charset="0"/>
-              </a:rPr>
-              <a:t>again, a simple proof applying</a:t>
-            </a:r>
-          </a:p>
-          <a:p>
-            <a:r>
-              <a:rPr lang="en-US" sz="3600" dirty="0" smtClean="0">
-                <a:latin typeface="Comic Sans MS" pitchFamily="66" charset="0"/>
-              </a:rPr>
-              <a:t>linearity of </a:t>
-            </a:r>
-            <a:r>
-              <a:rPr lang="en-US" sz="3600" dirty="0" smtClean="0">
-                <a:solidFill>
-                  <a:schemeClr val="accent1">
-                    <a:lumMod val="50000"/>
-                  </a:schemeClr>
-                </a:solidFill>
-                <a:latin typeface="Comic Sans MS" pitchFamily="66" charset="0"/>
-              </a:rPr>
-              <a:t>E[]</a:t>
-            </a:r>
-            <a:r>
-              <a:rPr lang="en-US" sz="3600" dirty="0" smtClean="0">
-                <a:latin typeface="Comic Sans MS" pitchFamily="66" charset="0"/>
-              </a:rPr>
-              <a:t> </a:t>
-            </a:r>
-            <a:r>
-              <a:rPr lang="en-US" sz="3600" dirty="0">
-                <a:latin typeface="Comic Sans MS" pitchFamily="66" charset="0"/>
-              </a:rPr>
-              <a:t>to the def of </a:t>
-            </a:r>
-            <a:r>
-              <a:rPr lang="en-US" sz="3600" dirty="0" err="1" smtClean="0">
-                <a:solidFill>
-                  <a:schemeClr val="accent1">
-                    <a:lumMod val="50000"/>
-                  </a:schemeClr>
-                </a:solidFill>
-                <a:latin typeface="Comic Sans MS" pitchFamily="66" charset="0"/>
-              </a:rPr>
-              <a:t>Var</a:t>
-            </a:r>
-            <a:r>
-              <a:rPr lang="en-US" sz="3600" dirty="0" smtClean="0">
-                <a:solidFill>
-                  <a:schemeClr val="accent1">
-                    <a:lumMod val="50000"/>
-                  </a:schemeClr>
-                </a:solidFill>
-                <a:latin typeface="Comic Sans MS" pitchFamily="66" charset="0"/>
-              </a:rPr>
-              <a:t>[]</a:t>
-            </a:r>
-            <a:endParaRPr lang="en-US" sz="3600" dirty="0">
-              <a:latin typeface="Comic Sans MS" pitchFamily="66" charset="0"/>
-            </a:endParaRPr>
-          </a:p>
-        </p:txBody>
-      </p:sp>
-    </p:spTree>
-    <p:custDataLst>
-      <p:tags r:id="rId2"/>
-    </p:custDataLst>
-  </p:cSld>
-  <p:clrMapOvr>
-    <a:masterClrMapping/>
-  </p:clrMapOvr>
-  <mc:AlternateContent xmlns:mc="http://schemas.openxmlformats.org/markup-compatibility/2006">
-    <mc:Choice xmlns:p14="http://schemas.microsoft.com/office/powerpoint/2010/main" Requires="p14">
-      <p:transition spd="slow" p14:dur="1200" advClick="0">
-        <p:fade thruBlk="1"/>
-      </p:transition>
-    </mc:Choice>
-    <mc:Fallback>
-      <p:transition xmlns:p14="http://schemas.microsoft.com/office/powerpoint/2010/main" spd="slow" advClick="0">
-        <p:fade thruBlk="1"/>
-      </p:transition>
-    </mc:Fallback>
-  </mc:AlternateContent>
-  <p:timing>
-    <p:tnLst>
-      <p:par>
-        <p:cTn xmlns:p14="http://schemas.microsoft.com/office/powerpoint/2010/main" id="1" dur="indefinite" restart="never" nodeType="tmRoot">
-          <p:childTnLst>
-            <p:seq concurrent="1" nextAc="seek">
-              <p:cTn id="2" dur="indefinite" nodeType="mainSeq">
-                <p:childTnLst>
-                  <p:par>
-                    <p:cTn id="3" fill="hold">
-                      <p:stCondLst>
-                        <p:cond delay="indefinite"/>
-                      </p:stCondLst>
-                      <p:childTnLst>
-                        <p:par>
-                          <p:cTn id="4" fill="hold">
-                            <p:stCondLst>
-                              <p:cond delay="0"/>
-                            </p:stCondLst>
-                            <p:childTnLst>
-                              <p:par>
-                                <p:cTn id="5" presetID="9" presetClass="entr" presetSubtype="0" fill="hold" grpId="0" nodeType="clickEffect">
-                                  <p:stCondLst>
-                                    <p:cond delay="0"/>
-                                  </p:stCondLst>
-                                  <p:childTnLst>
-                                    <p:set>
-                                      <p:cBhvr>
-                                        <p:cTn id="6" dur="1" fill="hold">
-                                          <p:stCondLst>
-                                            <p:cond delay="0"/>
-                                          </p:stCondLst>
-                                        </p:cTn>
-                                        <p:tgtEl>
-                                          <p:spTgt spid="8"/>
-                                        </p:tgtEl>
-                                        <p:attrNameLst>
-                                          <p:attrName>style.visibility</p:attrName>
-                                        </p:attrNameLst>
-                                      </p:cBhvr>
-                                      <p:to>
-                                        <p:strVal val="visible"/>
-                                      </p:to>
-                                    </p:set>
-                                    <p:animEffect transition="in" filter="dissolve">
-                                      <p:cBhvr>
-                                        <p:cTn id="7" dur="500"/>
-                                        <p:tgtEl>
-                                          <p:spTgt spid="8"/>
-                                        </p:tgtEl>
-                                      </p:cBhvr>
-                                    </p:animEffect>
-                                  </p:childTnLst>
-                                </p:cTn>
-                              </p:par>
-                            </p:childTnLst>
-                          </p:cTn>
-                        </p:par>
-                      </p:childTnLst>
-                    </p:cTn>
-                  </p:par>
-                  <p:par>
-                    <p:cTn id="8" fill="hold">
-                      <p:stCondLst>
-                        <p:cond delay="indefinite"/>
-                      </p:stCondLst>
-                      <p:childTnLst>
-                        <p:par>
-                          <p:cTn id="9" fill="hold">
-                            <p:stCondLst>
-                              <p:cond delay="0"/>
-                            </p:stCondLst>
-                            <p:childTnLst>
-                              <p:par>
-                                <p:cTn id="10" presetID="22" presetClass="entr" presetSubtype="8" fill="hold" nodeType="clickEffect">
-                                  <p:stCondLst>
-                                    <p:cond delay="0"/>
-                                  </p:stCondLst>
-                                  <p:childTnLst>
-                                    <p:set>
-                                      <p:cBhvr>
-                                        <p:cTn id="11" dur="1" fill="hold">
-                                          <p:stCondLst>
-                                            <p:cond delay="0"/>
-                                          </p:stCondLst>
-                                        </p:cTn>
-                                        <p:tgtEl>
-                                          <p:spTgt spid="7"/>
-                                        </p:tgtEl>
-                                        <p:attrNameLst>
-                                          <p:attrName>style.visibility</p:attrName>
-                                        </p:attrNameLst>
-                                      </p:cBhvr>
-                                      <p:to>
-                                        <p:strVal val="visible"/>
-                                      </p:to>
-                                    </p:set>
-                                    <p:animEffect transition="in" filter="wipe(left)">
-                                      <p:cBhvr>
-                                        <p:cTn id="12" dur="2000"/>
-                                        <p:tgtEl>
-                                          <p:spTgt spid="7"/>
-                                        </p:tgtEl>
-                                      </p:cBhvr>
-                                    </p:animEffect>
-                                  </p:childTnLst>
-                                </p:cTn>
-                              </p:par>
-                            </p:childTnLst>
-                          </p:cTn>
-                        </p:par>
-                      </p:childTnLst>
-                    </p:cTn>
-                  </p:par>
-                  <p:par>
-                    <p:cTn id="13" fill="hold">
-                      <p:stCondLst>
-                        <p:cond delay="indefinite"/>
-                      </p:stCondLst>
-                      <p:childTnLst>
-                        <p:par>
-                          <p:cTn id="14" fill="hold">
-                            <p:stCondLst>
-                              <p:cond delay="0"/>
-                            </p:stCondLst>
-                            <p:childTnLst>
-                              <p:par>
-                                <p:cTn id="15" presetID="23" presetClass="entr" presetSubtype="16" fill="hold" grpId="0" nodeType="clickEffect">
-                                  <p:stCondLst>
-                                    <p:cond delay="0"/>
-                                  </p:stCondLst>
-                                  <p:childTnLst>
-                                    <p:set>
-                                      <p:cBhvr>
-                                        <p:cTn id="16" dur="1" fill="hold">
-                                          <p:stCondLst>
-                                            <p:cond delay="0"/>
-                                          </p:stCondLst>
-                                        </p:cTn>
-                                        <p:tgtEl>
-                                          <p:spTgt spid="50182"/>
-                                        </p:tgtEl>
-                                        <p:attrNameLst>
-                                          <p:attrName>style.visibility</p:attrName>
-                                        </p:attrNameLst>
-                                      </p:cBhvr>
-                                      <p:to>
-                                        <p:strVal val="visible"/>
-                                      </p:to>
-                                    </p:set>
-                                    <p:anim calcmode="lin" valueType="num">
-                                      <p:cBhvr>
-                                        <p:cTn id="17" dur="500" fill="hold"/>
-                                        <p:tgtEl>
-                                          <p:spTgt spid="50182"/>
-                                        </p:tgtEl>
-                                        <p:attrNameLst>
-                                          <p:attrName>ppt_w</p:attrName>
-                                        </p:attrNameLst>
-                                      </p:cBhvr>
-                                      <p:tavLst>
-                                        <p:tav tm="0">
-                                          <p:val>
-                                            <p:fltVal val="0"/>
-                                          </p:val>
-                                        </p:tav>
-                                        <p:tav tm="100000">
-                                          <p:val>
-                                            <p:strVal val="#ppt_w"/>
-                                          </p:val>
-                                        </p:tav>
-                                      </p:tavLst>
-                                    </p:anim>
-                                    <p:anim calcmode="lin" valueType="num">
-                                      <p:cBhvr>
-                                        <p:cTn id="18" dur="500" fill="hold"/>
-                                        <p:tgtEl>
-                                          <p:spTgt spid="50182"/>
-                                        </p:tgtEl>
-                                        <p:attrNameLst>
-                                          <p:attrName>ppt_h</p:attrName>
-                                        </p:attrNameLst>
-                                      </p:cBhvr>
-                                      <p:tavLst>
-                                        <p:tav tm="0">
-                                          <p:val>
-                                            <p:fltVal val="0"/>
-                                          </p:val>
-                                        </p:tav>
-                                        <p:tav tm="100000">
-                                          <p:val>
-                                            <p:strVal val="#ppt_h"/>
-                                          </p:val>
-                                        </p:tav>
-                                      </p:tavLst>
-                                    </p:anim>
-                                  </p:childTnLst>
-                                </p:cTn>
-                              </p:par>
-                            </p:childTnLst>
-                          </p:cTn>
-                        </p:par>
-                      </p:childTnLst>
-                    </p:cTn>
-                  </p:par>
-                  <p:par>
-                    <p:cTn id="19" fill="hold">
-                      <p:stCondLst>
-                        <p:cond delay="indefinite"/>
-                      </p:stCondLst>
-                      <p:childTnLst>
-                        <p:par>
-                          <p:cTn id="20" fill="hold">
-                            <p:stCondLst>
-                              <p:cond delay="0"/>
-                            </p:stCondLst>
-                            <p:childTnLst>
-                              <p:par>
-                                <p:cTn id="21" presetID="31" presetClass="entr" presetSubtype="0" fill="hold" grpId="0" nodeType="clickEffect">
-                                  <p:stCondLst>
-                                    <p:cond delay="0"/>
-                                  </p:stCondLst>
-                                  <p:iterate type="lt">
-                                    <p:tmPct val="5000"/>
-                                  </p:iterate>
-                                  <p:childTnLst>
-                                    <p:set>
-                                      <p:cBhvr>
-                                        <p:cTn id="22" dur="1" fill="hold">
-                                          <p:stCondLst>
-                                            <p:cond delay="0"/>
-                                          </p:stCondLst>
-                                        </p:cTn>
-                                        <p:tgtEl>
-                                          <p:spTgt spid="729097"/>
-                                        </p:tgtEl>
-                                        <p:attrNameLst>
-                                          <p:attrName>style.visibility</p:attrName>
-                                        </p:attrNameLst>
-                                      </p:cBhvr>
-                                      <p:to>
-                                        <p:strVal val="visible"/>
-                                      </p:to>
-                                    </p:set>
-                                    <p:anim calcmode="lin" valueType="num">
-                                      <p:cBhvr>
-                                        <p:cTn id="23" dur="500" fill="hold"/>
-                                        <p:tgtEl>
-                                          <p:spTgt spid="729097"/>
-                                        </p:tgtEl>
-                                        <p:attrNameLst>
-                                          <p:attrName>ppt_w</p:attrName>
-                                        </p:attrNameLst>
-                                      </p:cBhvr>
-                                      <p:tavLst>
-                                        <p:tav tm="0">
-                                          <p:val>
-                                            <p:fltVal val="0"/>
-                                          </p:val>
-                                        </p:tav>
-                                        <p:tav tm="100000">
-                                          <p:val>
-                                            <p:strVal val="#ppt_w"/>
-                                          </p:val>
-                                        </p:tav>
-                                      </p:tavLst>
-                                    </p:anim>
-                                    <p:anim calcmode="lin" valueType="num">
-                                      <p:cBhvr>
-                                        <p:cTn id="24" dur="500" fill="hold"/>
-                                        <p:tgtEl>
-                                          <p:spTgt spid="729097"/>
-                                        </p:tgtEl>
-                                        <p:attrNameLst>
-                                          <p:attrName>ppt_h</p:attrName>
-                                        </p:attrNameLst>
-                                      </p:cBhvr>
-                                      <p:tavLst>
-                                        <p:tav tm="0">
-                                          <p:val>
-                                            <p:fltVal val="0"/>
-                                          </p:val>
-                                        </p:tav>
-                                        <p:tav tm="100000">
-                                          <p:val>
-                                            <p:strVal val="#ppt_h"/>
-                                          </p:val>
-                                        </p:tav>
-                                      </p:tavLst>
-                                    </p:anim>
-                                    <p:anim calcmode="lin" valueType="num">
-                                      <p:cBhvr>
-                                        <p:cTn id="25" dur="500" fill="hold"/>
-                                        <p:tgtEl>
-                                          <p:spTgt spid="729097"/>
-                                        </p:tgtEl>
-                                        <p:attrNameLst>
-                                          <p:attrName>style.rotation</p:attrName>
-                                        </p:attrNameLst>
-                                      </p:cBhvr>
-                                      <p:tavLst>
-                                        <p:tav tm="0">
-                                          <p:val>
-                                            <p:fltVal val="90"/>
-                                          </p:val>
-                                        </p:tav>
-                                        <p:tav tm="100000">
-                                          <p:val>
-                                            <p:fltVal val="0"/>
-                                          </p:val>
-                                        </p:tav>
-                                      </p:tavLst>
-                                    </p:anim>
-                                    <p:animEffect transition="in" filter="fade">
-                                      <p:cBhvr>
-                                        <p:cTn id="26" dur="500"/>
-                                        <p:tgtEl>
-                                          <p:spTgt spid="729097"/>
-                                        </p:tgtEl>
-                                      </p:cBhvr>
-                                    </p:animEffect>
-                                  </p:childTnLst>
-                                </p:cTn>
-                              </p:par>
-                            </p:childTnLst>
-                          </p:cTn>
-                        </p:par>
-                      </p:childTnLst>
-                    </p:cTn>
-                  </p:par>
-                  <p:par>
-                    <p:cTn id="27" fill="hold">
-                      <p:stCondLst>
-                        <p:cond delay="indefinite"/>
-                      </p:stCondLst>
-                      <p:childTnLst>
-                        <p:par>
-                          <p:cTn id="28" fill="hold">
-                            <p:stCondLst>
-                              <p:cond delay="0"/>
-                            </p:stCondLst>
-                            <p:childTnLst>
-                              <p:par>
-                                <p:cTn id="29" presetID="9" presetClass="entr" presetSubtype="0" fill="hold" grpId="0" nodeType="clickEffect">
-                                  <p:stCondLst>
-                                    <p:cond delay="0"/>
-                                  </p:stCondLst>
-                                  <p:childTnLst>
-                                    <p:set>
-                                      <p:cBhvr>
-                                        <p:cTn id="30" dur="1" fill="hold">
-                                          <p:stCondLst>
-                                            <p:cond delay="0"/>
-                                          </p:stCondLst>
-                                        </p:cTn>
-                                        <p:tgtEl>
-                                          <p:spTgt spid="9"/>
-                                        </p:tgtEl>
-                                        <p:attrNameLst>
-                                          <p:attrName>style.visibility</p:attrName>
-                                        </p:attrNameLst>
-                                      </p:cBhvr>
-                                      <p:to>
-                                        <p:strVal val="visible"/>
-                                      </p:to>
-                                    </p:set>
-                                    <p:animEffect transition="in" filter="dissolve">
-                                      <p:cBhvr>
-                                        <p:cTn id="31" dur="500"/>
-                                        <p:tgtEl>
-                                          <p:spTgt spid="9"/>
-                                        </p:tgtEl>
-                                      </p:cBhvr>
-                                    </p:animEffect>
-                                  </p:childTnLst>
-                                </p:cTn>
-                              </p:par>
-                            </p:childTnLst>
-                          </p:cTn>
-                        </p:par>
-                      </p:childTnLst>
-                    </p:cTn>
-                  </p:par>
-                </p:childTnLst>
-              </p:cTn>
-              <p:prevCondLst>
-                <p:cond evt="onPrev" delay="0">
-                  <p:tgtEl>
-                    <p:sldTgt/>
-                  </p:tgtEl>
-                </p:cond>
-              </p:prevCondLst>
-              <p:nextCondLst>
-                <p:cond evt="onNext" delay="0">
-                  <p:tgtEl>
-                    <p:sldTgt/>
-                  </p:tgtEl>
-                </p:cond>
-              </p:nextCondLst>
-            </p:seq>
-          </p:childTnLst>
-        </p:cTn>
-      </p:par>
-    </p:tnLst>
-    <p:bldLst>
-      <p:bldP spid="50182" grpId="0"/>
-      <p:bldP spid="729097" grpId="0" animBg="1"/>
-      <p:bldP spid="8" grpId="0"/>
-      <p:bldP spid="9" grpId="0"/>
-    </p:bldLst>
-  </p:timing>
-</p:sld>
-</file>
-
 <file path=ppt/slides/slide2.xml><?xml version="1.0" encoding="utf-8"?>
 <p:sld xmlns:a="http://schemas.openxmlformats.org/drawingml/2006/main" xmlns:r="http://schemas.openxmlformats.org/officeDocument/2006/relationships" xmlns:p="http://schemas.openxmlformats.org/presentationml/2006/main">
   <p:cSld>
@@ -9740,7 +10328,7 @@
           <a:graphicData uri="http://schemas.openxmlformats.org/presentationml/2006/ole">
             <mc:AlternateContent xmlns:mc="http://schemas.openxmlformats.org/markup-compatibility/2006">
               <mc:Choice xmlns:v="urn:schemas-microsoft-com:vml" Requires="v">
-                <p:oleObj spid="_x0000_s120994" name="Equation" r:id="rId5" imgW="1397000" imgH="266700" progId="Equation.DSMT4">
+                <p:oleObj spid="_x0000_s121021" name="Equation" r:id="rId5" imgW="1397000" imgH="266700" progId="Equation.DSMT4">
                   <p:embed/>
                 </p:oleObj>
               </mc:Choice>
@@ -9932,7 +10520,7 @@
           <a:graphicData uri="http://schemas.openxmlformats.org/presentationml/2006/ole">
             <mc:AlternateContent xmlns:mc="http://schemas.openxmlformats.org/markup-compatibility/2006">
               <mc:Choice xmlns:v="urn:schemas-microsoft-com:vml" Requires="v">
-                <p:oleObj spid="_x0000_s120995" name="Equation" r:id="rId7" imgW="126720" imgH="190440" progId="Equation.DSMT4">
+                <p:oleObj spid="_x0000_s121022" name="Equation" r:id="rId7" imgW="126720" imgH="190440" progId="Equation.DSMT4">
                   <p:embed/>
                 </p:oleObj>
               </mc:Choice>
@@ -10008,7 +10596,7 @@
           <a:graphicData uri="http://schemas.openxmlformats.org/presentationml/2006/ole">
             <mc:AlternateContent xmlns:mc="http://schemas.openxmlformats.org/markup-compatibility/2006">
               <mc:Choice xmlns:v="urn:schemas-microsoft-com:vml" Requires="v">
-                <p:oleObj spid="_x0000_s120996" name="Equation" r:id="rId9" imgW="1384300" imgH="266700" progId="Equation.DSMT4">
+                <p:oleObj spid="_x0000_s121023" name="Equation" r:id="rId9" imgW="1384300" imgH="266700" progId="Equation.DSMT4">
                   <p:embed/>
                 </p:oleObj>
               </mc:Choice>
@@ -10078,7 +10666,7 @@
           <a:graphicData uri="http://schemas.openxmlformats.org/presentationml/2006/ole">
             <mc:AlternateContent xmlns:mc="http://schemas.openxmlformats.org/markup-compatibility/2006">
               <mc:Choice xmlns:v="urn:schemas-microsoft-com:vml" Requires="v">
-                <p:oleObj spid="_x0000_s120997" name="Equation" r:id="rId11" imgW="1206500" imgH="266700" progId="Equation.DSMT4">
+                <p:oleObj spid="_x0000_s121024" name="Equation" r:id="rId11" imgW="1206500" imgH="266700" progId="Equation.DSMT4">
                   <p:embed/>
                 </p:oleObj>
               </mc:Choice>
@@ -10142,7 +10730,7 @@
           <a:graphicData uri="http://schemas.openxmlformats.org/presentationml/2006/ole">
             <mc:AlternateContent xmlns:mc="http://schemas.openxmlformats.org/markup-compatibility/2006">
               <mc:Choice xmlns:v="urn:schemas-microsoft-com:vml" Requires="v">
-                <p:oleObj spid="_x0000_s120998" name="Equation" r:id="rId13" imgW="1218960" imgH="253800" progId="Equation.DSMT4">
+                <p:oleObj spid="_x0000_s121025" name="Equation" r:id="rId13" imgW="1218960" imgH="253800" progId="Equation.DSMT4">
                   <p:embed/>
                 </p:oleObj>
               </mc:Choice>
@@ -10578,6 +11166,1051 @@
 </p:sld>
 </file>
 
+<file path=ppt/slides/slide20.xml><?xml version="1.0" encoding="utf-8"?>
+<p:sld xmlns:a="http://schemas.openxmlformats.org/drawingml/2006/main" xmlns:r="http://schemas.openxmlformats.org/officeDocument/2006/relationships" xmlns:p="http://schemas.openxmlformats.org/presentationml/2006/main">
+  <p:cSld>
+    <p:spTree>
+      <p:nvGrpSpPr>
+        <p:cNvPr id="1" name=""/>
+        <p:cNvGrpSpPr/>
+        <p:nvPr/>
+      </p:nvGrpSpPr>
+      <p:grpSpPr>
+        <a:xfrm>
+          <a:off x="0" y="0"/>
+          <a:ext cx="0" cy="0"/>
+          <a:chOff x="0" y="0"/>
+          <a:chExt cx="0" cy="0"/>
+        </a:xfrm>
+      </p:grpSpPr>
+      <p:sp>
+        <p:nvSpPr>
+          <p:cNvPr id="50179" name="Rectangle 2"/>
+          <p:cNvSpPr>
+            <a:spLocks noGrp="1" noChangeArrowheads="1"/>
+          </p:cNvSpPr>
+          <p:nvPr>
+            <p:ph type="title"/>
+          </p:nvPr>
+        </p:nvSpPr>
+        <p:spPr/>
+        <p:txBody>
+          <a:bodyPr/>
+          <a:lstStyle/>
+          <a:p>
+            <a:pPr eaLnBrk="1" hangingPunct="1"/>
+            <a:r>
+              <a:rPr lang="en-US" sz="3600" dirty="0" smtClean="0"/>
+              <a:t>Calculating Variance</a:t>
+            </a:r>
+          </a:p>
+        </p:txBody>
+      </p:sp>
+      <p:sp>
+        <p:nvSpPr>
+          <p:cNvPr id="50180" name="Rectangle 4"/>
+          <p:cNvSpPr>
+            <a:spLocks noChangeArrowheads="1"/>
+          </p:cNvSpPr>
+          <p:nvPr/>
+        </p:nvSpPr>
+        <p:spPr bwMode="auto">
+          <a:xfrm>
+            <a:off x="2590800" y="3048000"/>
+            <a:ext cx="1143000" cy="609600"/>
+          </a:xfrm>
+          <a:prstGeom prst="rect">
+            <a:avLst/>
+          </a:prstGeom>
+          <a:noFill/>
+          <a:ln w="9525">
+            <a:noFill/>
+            <a:miter lim="800000"/>
+            <a:headEnd/>
+            <a:tailEnd/>
+          </a:ln>
+        </p:spPr>
+        <p:txBody>
+          <a:bodyPr wrap="none" anchor="ctr">
+            <a:spAutoFit/>
+          </a:bodyPr>
+          <a:lstStyle/>
+          <a:p>
+            <a:endParaRPr lang="en-US"/>
+          </a:p>
+        </p:txBody>
+      </p:sp>
+      <p:sp>
+        <p:nvSpPr>
+          <p:cNvPr id="50182" name="Text Box 6"/>
+          <p:cNvSpPr txBox="1">
+            <a:spLocks noChangeArrowheads="1"/>
+          </p:cNvSpPr>
+          <p:nvPr/>
+        </p:nvSpPr>
+        <p:spPr bwMode="auto">
+          <a:xfrm>
+            <a:off x="1350963" y="3604895"/>
+            <a:ext cx="6459537" cy="1378839"/>
+          </a:xfrm>
+          <a:prstGeom prst="rect">
+            <a:avLst/>
+          </a:prstGeom>
+          <a:noFill/>
+          <a:ln w="9525">
+            <a:noFill/>
+            <a:miter lim="800000"/>
+            <a:headEnd/>
+            <a:tailEnd/>
+          </a:ln>
+        </p:spPr>
+        <p:txBody>
+          <a:bodyPr wrap="square">
+            <a:spAutoFit/>
+          </a:bodyPr>
+          <a:lstStyle/>
+          <a:p>
+            <a:pPr>
+              <a:lnSpc>
+                <a:spcPct val="90000"/>
+              </a:lnSpc>
+            </a:pPr>
+            <a:r>
+              <a:rPr lang="en-US" sz="4400" dirty="0">
+                <a:latin typeface="Comic Sans MS" pitchFamily="66" charset="0"/>
+                <a:cs typeface="Times New Roman" pitchFamily="18" charset="0"/>
+                <a:sym typeface="Symbol" pitchFamily="18" charset="2"/>
+              </a:rPr>
+              <a:t>providing</a:t>
+            </a:r>
+            <a:r>
+              <a:rPr lang="en-US" sz="4400" dirty="0">
+                <a:solidFill>
+                  <a:srgbClr val="FF00FF"/>
+                </a:solidFill>
+                <a:latin typeface="Comic Sans MS" pitchFamily="66" charset="0"/>
+                <a:cs typeface="Times New Roman" pitchFamily="18" charset="0"/>
+                <a:sym typeface="Symbol" pitchFamily="18" charset="2"/>
+              </a:rPr>
+              <a:t> </a:t>
+            </a:r>
+            <a:r>
+              <a:rPr lang="en-US" sz="4400" dirty="0">
+                <a:solidFill>
+                  <a:schemeClr val="accent1">
+                    <a:lumMod val="50000"/>
+                  </a:schemeClr>
+                </a:solidFill>
+                <a:latin typeface="Comic Sans MS" pitchFamily="66" charset="0"/>
+                <a:cs typeface="Times New Roman" pitchFamily="18" charset="0"/>
+                <a:sym typeface="Symbol" pitchFamily="18" charset="2"/>
+              </a:rPr>
+              <a:t>R</a:t>
+            </a:r>
+            <a:r>
+              <a:rPr lang="en-US" sz="4400" baseline="-25000" dirty="0">
+                <a:solidFill>
+                  <a:schemeClr val="accent1">
+                    <a:lumMod val="50000"/>
+                  </a:schemeClr>
+                </a:solidFill>
+                <a:latin typeface="Comic Sans MS" pitchFamily="66" charset="0"/>
+                <a:cs typeface="Times New Roman" pitchFamily="18" charset="0"/>
+                <a:sym typeface="Symbol" pitchFamily="18" charset="2"/>
+              </a:rPr>
+              <a:t>1</a:t>
+            </a:r>
+            <a:r>
+              <a:rPr lang="en-US" sz="4400" dirty="0">
+                <a:solidFill>
+                  <a:schemeClr val="accent1">
+                    <a:lumMod val="50000"/>
+                  </a:schemeClr>
+                </a:solidFill>
+                <a:latin typeface="Comic Sans MS" pitchFamily="66" charset="0"/>
+                <a:cs typeface="Times New Roman" pitchFamily="18" charset="0"/>
+                <a:sym typeface="Symbol" pitchFamily="18" charset="2"/>
+              </a:rPr>
+              <a:t>,R</a:t>
+            </a:r>
+            <a:r>
+              <a:rPr lang="en-US" sz="4400" baseline="-25000" dirty="0">
+                <a:solidFill>
+                  <a:schemeClr val="accent1">
+                    <a:lumMod val="50000"/>
+                  </a:schemeClr>
+                </a:solidFill>
+                <a:latin typeface="Comic Sans MS" pitchFamily="66" charset="0"/>
+                <a:cs typeface="Times New Roman" pitchFamily="18" charset="0"/>
+                <a:sym typeface="Symbol" pitchFamily="18" charset="2"/>
+              </a:rPr>
+              <a:t>2</a:t>
+            </a:r>
+            <a:r>
+              <a:rPr lang="en-US" sz="4400" dirty="0">
+                <a:solidFill>
+                  <a:schemeClr val="accent1">
+                    <a:lumMod val="50000"/>
+                  </a:schemeClr>
+                </a:solidFill>
+                <a:latin typeface="Comic Sans MS" pitchFamily="66" charset="0"/>
+                <a:cs typeface="Times New Roman" pitchFamily="18" charset="0"/>
+                <a:sym typeface="Symbol" pitchFamily="18" charset="2"/>
+              </a:rPr>
+              <a:t>,…,</a:t>
+            </a:r>
+            <a:r>
+              <a:rPr lang="en-US" sz="4400" dirty="0" err="1">
+                <a:solidFill>
+                  <a:schemeClr val="accent1">
+                    <a:lumMod val="50000"/>
+                  </a:schemeClr>
+                </a:solidFill>
+                <a:latin typeface="Comic Sans MS" pitchFamily="66" charset="0"/>
+                <a:cs typeface="Times New Roman" pitchFamily="18" charset="0"/>
+                <a:sym typeface="Symbol" pitchFamily="18" charset="2"/>
+              </a:rPr>
+              <a:t>R</a:t>
+            </a:r>
+            <a:r>
+              <a:rPr lang="en-US" sz="4400" baseline="-25000" dirty="0" err="1">
+                <a:solidFill>
+                  <a:schemeClr val="accent1">
+                    <a:lumMod val="50000"/>
+                  </a:schemeClr>
+                </a:solidFill>
+                <a:latin typeface="Comic Sans MS" pitchFamily="66" charset="0"/>
+                <a:cs typeface="Times New Roman" pitchFamily="18" charset="0"/>
+                <a:sym typeface="Symbol" pitchFamily="18" charset="2"/>
+              </a:rPr>
+              <a:t>n</a:t>
+            </a:r>
+            <a:r>
+              <a:rPr lang="en-US" sz="4400" dirty="0">
+                <a:solidFill>
+                  <a:srgbClr val="FF6600"/>
+                </a:solidFill>
+                <a:latin typeface="Comic Sans MS" pitchFamily="66" charset="0"/>
+                <a:cs typeface="Times New Roman" pitchFamily="18" charset="0"/>
+                <a:sym typeface="Symbol" pitchFamily="18" charset="2"/>
+              </a:rPr>
+              <a:t> </a:t>
+            </a:r>
+            <a:r>
+              <a:rPr lang="en-US" sz="4400" dirty="0" smtClean="0">
+                <a:latin typeface="Comic Sans MS" pitchFamily="66" charset="0"/>
+                <a:cs typeface="Times New Roman" pitchFamily="18" charset="0"/>
+                <a:sym typeface="Symbol" pitchFamily="18" charset="2"/>
+              </a:rPr>
+              <a:t>are</a:t>
+            </a:r>
+            <a:endParaRPr lang="en-US" sz="4400" dirty="0">
+              <a:latin typeface="Comic Sans MS" pitchFamily="66" charset="0"/>
+              <a:cs typeface="Times New Roman" pitchFamily="18" charset="0"/>
+              <a:sym typeface="Symbol" pitchFamily="18" charset="2"/>
+            </a:endParaRPr>
+          </a:p>
+          <a:p>
+            <a:r>
+              <a:rPr lang="en-US" sz="4400" dirty="0" err="1">
+                <a:solidFill>
+                  <a:srgbClr val="008000"/>
+                </a:solidFill>
+                <a:latin typeface="Comic Sans MS" pitchFamily="66" charset="0"/>
+                <a:cs typeface="Times New Roman" pitchFamily="18" charset="0"/>
+                <a:sym typeface="Symbol" pitchFamily="18" charset="2"/>
+              </a:rPr>
+              <a:t>pairwise</a:t>
+            </a:r>
+            <a:r>
+              <a:rPr lang="en-US" sz="4400" dirty="0">
+                <a:solidFill>
+                  <a:srgbClr val="008000"/>
+                </a:solidFill>
+                <a:latin typeface="Comic Sans MS" pitchFamily="66" charset="0"/>
+                <a:cs typeface="Times New Roman" pitchFamily="18" charset="0"/>
+                <a:sym typeface="Symbol" pitchFamily="18" charset="2"/>
+              </a:rPr>
+              <a:t> independent</a:t>
+            </a:r>
+            <a:endParaRPr lang="en-US" sz="2000" dirty="0">
+              <a:solidFill>
+                <a:srgbClr val="008000"/>
+              </a:solidFill>
+              <a:latin typeface="Comic Sans MS" pitchFamily="66" charset="0"/>
+            </a:endParaRPr>
+          </a:p>
+        </p:txBody>
+      </p:sp>
+      <p:sp>
+        <p:nvSpPr>
+          <p:cNvPr id="729097" name="Rectangle 9"/>
+          <p:cNvSpPr>
+            <a:spLocks noChangeArrowheads="1"/>
+          </p:cNvSpPr>
+          <p:nvPr/>
+        </p:nvSpPr>
+        <p:spPr bwMode="auto">
+          <a:xfrm>
+            <a:off x="190500" y="1813560"/>
+            <a:ext cx="8717280" cy="3352800"/>
+          </a:xfrm>
+          <a:prstGeom prst="rect">
+            <a:avLst/>
+          </a:prstGeom>
+          <a:noFill/>
+          <a:ln w="41275" algn="ctr">
+            <a:solidFill>
+              <a:srgbClr val="FF00FF"/>
+            </a:solidFill>
+            <a:prstDash val="sysDash"/>
+            <a:miter lim="800000"/>
+            <a:headEnd/>
+            <a:tailEnd/>
+          </a:ln>
+        </p:spPr>
+        <p:txBody>
+          <a:bodyPr wrap="none" anchor="ctr"/>
+          <a:lstStyle/>
+          <a:p>
+            <a:endParaRPr lang="en-US"/>
+          </a:p>
+        </p:txBody>
+      </p:sp>
+      <p:graphicFrame>
+        <p:nvGraphicFramePr>
+          <p:cNvPr id="7" name="Object 6"/>
+          <p:cNvGraphicFramePr>
+            <a:graphicFrameLocks noChangeAspect="1"/>
+          </p:cNvGraphicFramePr>
+          <p:nvPr>
+            <p:extLst>
+              <p:ext uri="{D42A27DB-BD31-4B8C-83A1-F6EECF244321}">
+                <p14:modId xmlns:p14="http://schemas.microsoft.com/office/powerpoint/2010/main" val="2461875164"/>
+              </p:ext>
+            </p:extLst>
+          </p:nvPr>
+        </p:nvGraphicFramePr>
+        <p:xfrm>
+          <a:off x="479425" y="1666875"/>
+          <a:ext cx="8261350" cy="2041525"/>
+        </p:xfrm>
+        <a:graphic>
+          <a:graphicData uri="http://schemas.openxmlformats.org/presentationml/2006/ole">
+            <mc:AlternateContent xmlns:mc="http://schemas.openxmlformats.org/markup-compatibility/2006">
+              <mc:Choice xmlns:v="urn:schemas-microsoft-com:vml" Requires="v">
+                <p:oleObj spid="_x0000_s109619" name="Equation" r:id="rId5" imgW="2260600" imgH="558800" progId="Equation.DSMT4">
+                  <p:embed/>
+                </p:oleObj>
+              </mc:Choice>
+              <mc:Fallback>
+                <p:oleObj name="Equation" r:id="rId5" imgW="2260600" imgH="558800" progId="Equation.DSMT4">
+                  <p:embed/>
+                  <p:pic>
+                    <p:nvPicPr>
+                      <p:cNvPr id="0" name="Picture 2"/>
+                      <p:cNvPicPr>
+                        <a:picLocks noChangeAspect="1" noChangeArrowheads="1"/>
+                      </p:cNvPicPr>
+                      <p:nvPr/>
+                    </p:nvPicPr>
+                    <p:blipFill>
+                      <a:blip r:embed="rId6"/>
+                      <a:srcRect/>
+                      <a:stretch>
+                        <a:fillRect/>
+                      </a:stretch>
+                    </p:blipFill>
+                    <p:spPr bwMode="auto">
+                      <a:xfrm>
+                        <a:off x="479425" y="1666875"/>
+                        <a:ext cx="8261350" cy="2041525"/>
+                      </a:xfrm>
+                      <a:prstGeom prst="rect">
+                        <a:avLst/>
+                      </a:prstGeom>
+                      <a:noFill/>
+                      <a:extLst>
+                        <a:ext uri="{909E8E84-426E-40dd-AFC4-6F175D3DCCD1}">
+                          <a14:hiddenFill xmlns:a14="http://schemas.microsoft.com/office/drawing/2010/main">
+                            <a:solidFill>
+                              <a:srgbClr val="FFFFFF"/>
+                            </a:solidFill>
+                          </a14:hiddenFill>
+                        </a:ext>
+                      </a:extLst>
+                    </p:spPr>
+                  </p:pic>
+                </p:oleObj>
+              </mc:Fallback>
+            </mc:AlternateContent>
+          </a:graphicData>
+        </a:graphic>
+      </p:graphicFrame>
+      <p:sp>
+        <p:nvSpPr>
+          <p:cNvPr id="8" name="Rectangle 3"/>
+          <p:cNvSpPr txBox="1">
+            <a:spLocks noChangeArrowheads="1"/>
+          </p:cNvSpPr>
+          <p:nvPr/>
+        </p:nvSpPr>
+        <p:spPr bwMode="auto">
+          <a:xfrm>
+            <a:off x="635000" y="1013460"/>
+            <a:ext cx="7950200" cy="749300"/>
+          </a:xfrm>
+          <a:prstGeom prst="rect">
+            <a:avLst/>
+          </a:prstGeom>
+          <a:noFill/>
+          <a:ln w="9525">
+            <a:noFill/>
+            <a:miter lim="800000"/>
+            <a:headEnd/>
+            <a:tailEnd/>
+          </a:ln>
+        </p:spPr>
+        <p:txBody>
+          <a:bodyPr vert="horz" wrap="square" lIns="91440" tIns="45720" rIns="91440" bIns="45720" numCol="1" anchor="t" anchorCtr="0" compatLnSpc="1">
+            <a:prstTxWarp prst="textNoShape">
+              <a:avLst/>
+            </a:prstTxWarp>
+          </a:bodyPr>
+          <a:lstStyle/>
+          <a:p>
+            <a:pPr marL="342900" marR="0" lvl="0" indent="-342900" algn="l" defTabSz="914400" rtl="0" eaLnBrk="1" fontAlgn="base" latinLnBrk="0" hangingPunct="1">
+              <a:lnSpc>
+                <a:spcPct val="90000"/>
+              </a:lnSpc>
+              <a:spcBef>
+                <a:spcPct val="20000"/>
+              </a:spcBef>
+              <a:spcAft>
+                <a:spcPct val="0"/>
+              </a:spcAft>
+              <a:buClrTx/>
+              <a:buSzTx/>
+              <a:buFontTx/>
+              <a:buNone/>
+              <a:tabLst/>
+              <a:defRPr/>
+            </a:pPr>
+            <a:r>
+              <a:rPr kumimoji="0" lang="en-US" sz="4000" b="0" i="0" u="none" strike="noStrike" kern="0" cap="none" spc="0" normalizeH="0" baseline="0" noProof="0" dirty="0" err="1" smtClean="0">
+                <a:ln>
+                  <a:noFill/>
+                </a:ln>
+                <a:solidFill>
+                  <a:srgbClr val="008000"/>
+                </a:solidFill>
+                <a:effectLst/>
+                <a:uLnTx/>
+                <a:uFillTx/>
+                <a:latin typeface="+mn-lt"/>
+                <a:ea typeface="+mn-ea"/>
+                <a:cs typeface="Times New Roman" pitchFamily="18" charset="0"/>
+              </a:rPr>
+              <a:t>Pairwise</a:t>
+            </a:r>
+            <a:r>
+              <a:rPr kumimoji="0" lang="en-US" sz="4000" b="0" i="0" u="none" strike="noStrike" kern="0" cap="none" spc="0" normalizeH="0" baseline="0" noProof="0" dirty="0" smtClean="0">
+                <a:ln>
+                  <a:noFill/>
+                </a:ln>
+                <a:solidFill>
+                  <a:srgbClr val="008000"/>
+                </a:solidFill>
+                <a:effectLst/>
+                <a:uLnTx/>
+                <a:uFillTx/>
+                <a:latin typeface="+mn-lt"/>
+                <a:ea typeface="+mn-ea"/>
+                <a:cs typeface="Times New Roman" pitchFamily="18" charset="0"/>
+              </a:rPr>
+              <a:t> Independent</a:t>
+            </a:r>
+            <a:r>
+              <a:rPr kumimoji="0" lang="en-US" sz="4000" b="0" i="0" u="none" strike="noStrike" kern="0" cap="none" spc="0" normalizeH="0" baseline="0" noProof="0" dirty="0" smtClean="0">
+                <a:ln>
+                  <a:noFill/>
+                </a:ln>
+                <a:solidFill>
+                  <a:schemeClr val="tx1"/>
+                </a:solidFill>
+                <a:effectLst/>
+                <a:uLnTx/>
+                <a:uFillTx/>
+                <a:latin typeface="+mn-lt"/>
+                <a:ea typeface="+mn-ea"/>
+                <a:cs typeface="Times New Roman" pitchFamily="18" charset="0"/>
+              </a:rPr>
+              <a:t> </a:t>
+            </a:r>
+            <a:r>
+              <a:rPr kumimoji="0" lang="en-US" sz="4000" b="0" i="0" u="none" strike="noStrike" kern="0" cap="none" spc="0" normalizeH="0" baseline="0" noProof="0" dirty="0" err="1" smtClean="0">
+                <a:ln>
+                  <a:noFill/>
+                </a:ln>
+                <a:solidFill>
+                  <a:schemeClr val="tx1"/>
+                </a:solidFill>
+                <a:effectLst/>
+                <a:uLnTx/>
+                <a:uFillTx/>
+                <a:latin typeface="+mn-lt"/>
+                <a:ea typeface="+mn-ea"/>
+                <a:cs typeface="Times New Roman" pitchFamily="18" charset="0"/>
+              </a:rPr>
+              <a:t>Additivity</a:t>
+            </a:r>
+            <a:endParaRPr kumimoji="0" lang="en-US" sz="4000" b="0" i="0" u="none" strike="noStrike" kern="0" cap="none" spc="0" normalizeH="0" baseline="0" noProof="0" dirty="0" smtClean="0">
+              <a:ln>
+                <a:noFill/>
+              </a:ln>
+              <a:solidFill>
+                <a:srgbClr val="0000FF"/>
+              </a:solidFill>
+              <a:effectLst/>
+              <a:uLnTx/>
+              <a:uFillTx/>
+              <a:latin typeface="+mn-lt"/>
+              <a:ea typeface="+mn-ea"/>
+              <a:cs typeface="Times New Roman" pitchFamily="18" charset="0"/>
+              <a:sym typeface="Symbol" pitchFamily="18" charset="2"/>
+            </a:endParaRPr>
+          </a:p>
+        </p:txBody>
+      </p:sp>
+      <p:sp>
+        <p:nvSpPr>
+          <p:cNvPr id="9" name="Text Box 5"/>
+          <p:cNvSpPr txBox="1">
+            <a:spLocks noChangeArrowheads="1"/>
+          </p:cNvSpPr>
+          <p:nvPr/>
+        </p:nvSpPr>
+        <p:spPr bwMode="auto">
+          <a:xfrm>
+            <a:off x="810376" y="5191242"/>
+            <a:ext cx="7592143" cy="1200329"/>
+          </a:xfrm>
+          <a:prstGeom prst="rect">
+            <a:avLst/>
+          </a:prstGeom>
+          <a:noFill/>
+          <a:ln w="9525">
+            <a:noFill/>
+            <a:miter lim="800000"/>
+            <a:headEnd/>
+            <a:tailEnd/>
+          </a:ln>
+        </p:spPr>
+        <p:txBody>
+          <a:bodyPr wrap="none">
+            <a:spAutoFit/>
+          </a:bodyPr>
+          <a:lstStyle/>
+          <a:p>
+            <a:r>
+              <a:rPr lang="en-US" sz="3600" dirty="0" smtClean="0">
+                <a:latin typeface="Comic Sans MS" pitchFamily="66" charset="0"/>
+              </a:rPr>
+              <a:t>again, a simple proof applying</a:t>
+            </a:r>
+          </a:p>
+          <a:p>
+            <a:r>
+              <a:rPr lang="en-US" sz="3600" dirty="0" smtClean="0">
+                <a:latin typeface="Comic Sans MS" pitchFamily="66" charset="0"/>
+              </a:rPr>
+              <a:t>linearity of </a:t>
+            </a:r>
+            <a:r>
+              <a:rPr lang="en-US" sz="3600" dirty="0" smtClean="0">
+                <a:solidFill>
+                  <a:schemeClr val="accent1">
+                    <a:lumMod val="50000"/>
+                  </a:schemeClr>
+                </a:solidFill>
+                <a:latin typeface="Comic Sans MS" pitchFamily="66" charset="0"/>
+              </a:rPr>
+              <a:t>E[]</a:t>
+            </a:r>
+            <a:r>
+              <a:rPr lang="en-US" sz="3600" dirty="0" smtClean="0">
+                <a:latin typeface="Comic Sans MS" pitchFamily="66" charset="0"/>
+              </a:rPr>
+              <a:t> </a:t>
+            </a:r>
+            <a:r>
+              <a:rPr lang="en-US" sz="3600" dirty="0">
+                <a:latin typeface="Comic Sans MS" pitchFamily="66" charset="0"/>
+              </a:rPr>
+              <a:t>to the def of </a:t>
+            </a:r>
+            <a:r>
+              <a:rPr lang="en-US" sz="3600" dirty="0" err="1" smtClean="0">
+                <a:solidFill>
+                  <a:schemeClr val="accent1">
+                    <a:lumMod val="50000"/>
+                  </a:schemeClr>
+                </a:solidFill>
+                <a:latin typeface="Comic Sans MS" pitchFamily="66" charset="0"/>
+              </a:rPr>
+              <a:t>Var</a:t>
+            </a:r>
+            <a:r>
+              <a:rPr lang="en-US" sz="3600" dirty="0" smtClean="0">
+                <a:solidFill>
+                  <a:schemeClr val="accent1">
+                    <a:lumMod val="50000"/>
+                  </a:schemeClr>
+                </a:solidFill>
+                <a:latin typeface="Comic Sans MS" pitchFamily="66" charset="0"/>
+              </a:rPr>
+              <a:t>[]</a:t>
+            </a:r>
+            <a:endParaRPr lang="en-US" sz="3600" dirty="0">
+              <a:latin typeface="Comic Sans MS" pitchFamily="66" charset="0"/>
+            </a:endParaRPr>
+          </a:p>
+        </p:txBody>
+      </p:sp>
+    </p:spTree>
+    <p:custDataLst>
+      <p:tags r:id="rId2"/>
+    </p:custDataLst>
+  </p:cSld>
+  <p:clrMapOvr>
+    <a:masterClrMapping/>
+  </p:clrMapOvr>
+  <mc:AlternateContent xmlns:mc="http://schemas.openxmlformats.org/markup-compatibility/2006" xmlns:p14="http://schemas.microsoft.com/office/powerpoint/2010/main">
+    <mc:Choice Requires="p14">
+      <p:transition spd="slow" p14:dur="1200" advClick="0">
+        <p:fade thruBlk="1"/>
+      </p:transition>
+    </mc:Choice>
+    <mc:Fallback xmlns="">
+      <p:transition xmlns:p14="http://schemas.microsoft.com/office/powerpoint/2010/main" spd="slow" advClick="0">
+        <p:fade thruBlk="1"/>
+      </p:transition>
+    </mc:Fallback>
+  </mc:AlternateContent>
+  <p:timing>
+    <p:tnLst>
+      <p:par>
+        <p:cTn xmlns:p14="http://schemas.microsoft.com/office/powerpoint/2010/main" id="1" dur="indefinite" restart="never" nodeType="tmRoot">
+          <p:childTnLst>
+            <p:seq concurrent="1" nextAc="seek">
+              <p:cTn id="2" dur="indefinite" nodeType="mainSeq">
+                <p:childTnLst>
+                  <p:par>
+                    <p:cTn id="3" fill="hold">
+                      <p:stCondLst>
+                        <p:cond delay="indefinite"/>
+                      </p:stCondLst>
+                      <p:childTnLst>
+                        <p:par>
+                          <p:cTn id="4" fill="hold">
+                            <p:stCondLst>
+                              <p:cond delay="0"/>
+                            </p:stCondLst>
+                            <p:childTnLst>
+                              <p:par>
+                                <p:cTn id="5" presetID="9" presetClass="entr" presetSubtype="0" fill="hold" grpId="0" nodeType="clickEffect">
+                                  <p:stCondLst>
+                                    <p:cond delay="0"/>
+                                  </p:stCondLst>
+                                  <p:childTnLst>
+                                    <p:set>
+                                      <p:cBhvr>
+                                        <p:cTn id="6" dur="1" fill="hold">
+                                          <p:stCondLst>
+                                            <p:cond delay="0"/>
+                                          </p:stCondLst>
+                                        </p:cTn>
+                                        <p:tgtEl>
+                                          <p:spTgt spid="8"/>
+                                        </p:tgtEl>
+                                        <p:attrNameLst>
+                                          <p:attrName>style.visibility</p:attrName>
+                                        </p:attrNameLst>
+                                      </p:cBhvr>
+                                      <p:to>
+                                        <p:strVal val="visible"/>
+                                      </p:to>
+                                    </p:set>
+                                    <p:animEffect transition="in" filter="dissolve">
+                                      <p:cBhvr>
+                                        <p:cTn id="7" dur="500"/>
+                                        <p:tgtEl>
+                                          <p:spTgt spid="8"/>
+                                        </p:tgtEl>
+                                      </p:cBhvr>
+                                    </p:animEffect>
+                                  </p:childTnLst>
+                                </p:cTn>
+                              </p:par>
+                            </p:childTnLst>
+                          </p:cTn>
+                        </p:par>
+                      </p:childTnLst>
+                    </p:cTn>
+                  </p:par>
+                  <p:par>
+                    <p:cTn id="8" fill="hold">
+                      <p:stCondLst>
+                        <p:cond delay="indefinite"/>
+                      </p:stCondLst>
+                      <p:childTnLst>
+                        <p:par>
+                          <p:cTn id="9" fill="hold">
+                            <p:stCondLst>
+                              <p:cond delay="0"/>
+                            </p:stCondLst>
+                            <p:childTnLst>
+                              <p:par>
+                                <p:cTn id="10" presetID="22" presetClass="entr" presetSubtype="8" fill="hold" nodeType="clickEffect">
+                                  <p:stCondLst>
+                                    <p:cond delay="0"/>
+                                  </p:stCondLst>
+                                  <p:childTnLst>
+                                    <p:set>
+                                      <p:cBhvr>
+                                        <p:cTn id="11" dur="1" fill="hold">
+                                          <p:stCondLst>
+                                            <p:cond delay="0"/>
+                                          </p:stCondLst>
+                                        </p:cTn>
+                                        <p:tgtEl>
+                                          <p:spTgt spid="7"/>
+                                        </p:tgtEl>
+                                        <p:attrNameLst>
+                                          <p:attrName>style.visibility</p:attrName>
+                                        </p:attrNameLst>
+                                      </p:cBhvr>
+                                      <p:to>
+                                        <p:strVal val="visible"/>
+                                      </p:to>
+                                    </p:set>
+                                    <p:animEffect transition="in" filter="wipe(left)">
+                                      <p:cBhvr>
+                                        <p:cTn id="12" dur="2000"/>
+                                        <p:tgtEl>
+                                          <p:spTgt spid="7"/>
+                                        </p:tgtEl>
+                                      </p:cBhvr>
+                                    </p:animEffect>
+                                  </p:childTnLst>
+                                </p:cTn>
+                              </p:par>
+                            </p:childTnLst>
+                          </p:cTn>
+                        </p:par>
+                      </p:childTnLst>
+                    </p:cTn>
+                  </p:par>
+                  <p:par>
+                    <p:cTn id="13" fill="hold">
+                      <p:stCondLst>
+                        <p:cond delay="indefinite"/>
+                      </p:stCondLst>
+                      <p:childTnLst>
+                        <p:par>
+                          <p:cTn id="14" fill="hold">
+                            <p:stCondLst>
+                              <p:cond delay="0"/>
+                            </p:stCondLst>
+                            <p:childTnLst>
+                              <p:par>
+                                <p:cTn id="15" presetID="23" presetClass="entr" presetSubtype="16" fill="hold" grpId="0" nodeType="clickEffect">
+                                  <p:stCondLst>
+                                    <p:cond delay="0"/>
+                                  </p:stCondLst>
+                                  <p:childTnLst>
+                                    <p:set>
+                                      <p:cBhvr>
+                                        <p:cTn id="16" dur="1" fill="hold">
+                                          <p:stCondLst>
+                                            <p:cond delay="0"/>
+                                          </p:stCondLst>
+                                        </p:cTn>
+                                        <p:tgtEl>
+                                          <p:spTgt spid="50182"/>
+                                        </p:tgtEl>
+                                        <p:attrNameLst>
+                                          <p:attrName>style.visibility</p:attrName>
+                                        </p:attrNameLst>
+                                      </p:cBhvr>
+                                      <p:to>
+                                        <p:strVal val="visible"/>
+                                      </p:to>
+                                    </p:set>
+                                    <p:anim calcmode="lin" valueType="num">
+                                      <p:cBhvr>
+                                        <p:cTn id="17" dur="500" fill="hold"/>
+                                        <p:tgtEl>
+                                          <p:spTgt spid="50182"/>
+                                        </p:tgtEl>
+                                        <p:attrNameLst>
+                                          <p:attrName>ppt_w</p:attrName>
+                                        </p:attrNameLst>
+                                      </p:cBhvr>
+                                      <p:tavLst>
+                                        <p:tav tm="0">
+                                          <p:val>
+                                            <p:fltVal val="0"/>
+                                          </p:val>
+                                        </p:tav>
+                                        <p:tav tm="100000">
+                                          <p:val>
+                                            <p:strVal val="#ppt_w"/>
+                                          </p:val>
+                                        </p:tav>
+                                      </p:tavLst>
+                                    </p:anim>
+                                    <p:anim calcmode="lin" valueType="num">
+                                      <p:cBhvr>
+                                        <p:cTn id="18" dur="500" fill="hold"/>
+                                        <p:tgtEl>
+                                          <p:spTgt spid="50182"/>
+                                        </p:tgtEl>
+                                        <p:attrNameLst>
+                                          <p:attrName>ppt_h</p:attrName>
+                                        </p:attrNameLst>
+                                      </p:cBhvr>
+                                      <p:tavLst>
+                                        <p:tav tm="0">
+                                          <p:val>
+                                            <p:fltVal val="0"/>
+                                          </p:val>
+                                        </p:tav>
+                                        <p:tav tm="100000">
+                                          <p:val>
+                                            <p:strVal val="#ppt_h"/>
+                                          </p:val>
+                                        </p:tav>
+                                      </p:tavLst>
+                                    </p:anim>
+                                  </p:childTnLst>
+                                </p:cTn>
+                              </p:par>
+                            </p:childTnLst>
+                          </p:cTn>
+                        </p:par>
+                      </p:childTnLst>
+                    </p:cTn>
+                  </p:par>
+                  <p:par>
+                    <p:cTn id="19" fill="hold">
+                      <p:stCondLst>
+                        <p:cond delay="indefinite"/>
+                      </p:stCondLst>
+                      <p:childTnLst>
+                        <p:par>
+                          <p:cTn id="20" fill="hold">
+                            <p:stCondLst>
+                              <p:cond delay="0"/>
+                            </p:stCondLst>
+                            <p:childTnLst>
+                              <p:par>
+                                <p:cTn id="21" presetID="31" presetClass="entr" presetSubtype="0" fill="hold" grpId="0" nodeType="clickEffect">
+                                  <p:stCondLst>
+                                    <p:cond delay="0"/>
+                                  </p:stCondLst>
+                                  <p:iterate type="lt">
+                                    <p:tmPct val="5000"/>
+                                  </p:iterate>
+                                  <p:childTnLst>
+                                    <p:set>
+                                      <p:cBhvr>
+                                        <p:cTn id="22" dur="1" fill="hold">
+                                          <p:stCondLst>
+                                            <p:cond delay="0"/>
+                                          </p:stCondLst>
+                                        </p:cTn>
+                                        <p:tgtEl>
+                                          <p:spTgt spid="729097"/>
+                                        </p:tgtEl>
+                                        <p:attrNameLst>
+                                          <p:attrName>style.visibility</p:attrName>
+                                        </p:attrNameLst>
+                                      </p:cBhvr>
+                                      <p:to>
+                                        <p:strVal val="visible"/>
+                                      </p:to>
+                                    </p:set>
+                                    <p:anim calcmode="lin" valueType="num">
+                                      <p:cBhvr>
+                                        <p:cTn id="23" dur="500" fill="hold"/>
+                                        <p:tgtEl>
+                                          <p:spTgt spid="729097"/>
+                                        </p:tgtEl>
+                                        <p:attrNameLst>
+                                          <p:attrName>ppt_w</p:attrName>
+                                        </p:attrNameLst>
+                                      </p:cBhvr>
+                                      <p:tavLst>
+                                        <p:tav tm="0">
+                                          <p:val>
+                                            <p:fltVal val="0"/>
+                                          </p:val>
+                                        </p:tav>
+                                        <p:tav tm="100000">
+                                          <p:val>
+                                            <p:strVal val="#ppt_w"/>
+                                          </p:val>
+                                        </p:tav>
+                                      </p:tavLst>
+                                    </p:anim>
+                                    <p:anim calcmode="lin" valueType="num">
+                                      <p:cBhvr>
+                                        <p:cTn id="24" dur="500" fill="hold"/>
+                                        <p:tgtEl>
+                                          <p:spTgt spid="729097"/>
+                                        </p:tgtEl>
+                                        <p:attrNameLst>
+                                          <p:attrName>ppt_h</p:attrName>
+                                        </p:attrNameLst>
+                                      </p:cBhvr>
+                                      <p:tavLst>
+                                        <p:tav tm="0">
+                                          <p:val>
+                                            <p:fltVal val="0"/>
+                                          </p:val>
+                                        </p:tav>
+                                        <p:tav tm="100000">
+                                          <p:val>
+                                            <p:strVal val="#ppt_h"/>
+                                          </p:val>
+                                        </p:tav>
+                                      </p:tavLst>
+                                    </p:anim>
+                                    <p:anim calcmode="lin" valueType="num">
+                                      <p:cBhvr>
+                                        <p:cTn id="25" dur="500" fill="hold"/>
+                                        <p:tgtEl>
+                                          <p:spTgt spid="729097"/>
+                                        </p:tgtEl>
+                                        <p:attrNameLst>
+                                          <p:attrName>style.rotation</p:attrName>
+                                        </p:attrNameLst>
+                                      </p:cBhvr>
+                                      <p:tavLst>
+                                        <p:tav tm="0">
+                                          <p:val>
+                                            <p:fltVal val="90"/>
+                                          </p:val>
+                                        </p:tav>
+                                        <p:tav tm="100000">
+                                          <p:val>
+                                            <p:fltVal val="0"/>
+                                          </p:val>
+                                        </p:tav>
+                                      </p:tavLst>
+                                    </p:anim>
+                                    <p:animEffect transition="in" filter="fade">
+                                      <p:cBhvr>
+                                        <p:cTn id="26" dur="500"/>
+                                        <p:tgtEl>
+                                          <p:spTgt spid="729097"/>
+                                        </p:tgtEl>
+                                      </p:cBhvr>
+                                    </p:animEffect>
+                                  </p:childTnLst>
+                                </p:cTn>
+                              </p:par>
+                            </p:childTnLst>
+                          </p:cTn>
+                        </p:par>
+                      </p:childTnLst>
+                    </p:cTn>
+                  </p:par>
+                  <p:par>
+                    <p:cTn id="27" fill="hold">
+                      <p:stCondLst>
+                        <p:cond delay="indefinite"/>
+                      </p:stCondLst>
+                      <p:childTnLst>
+                        <p:par>
+                          <p:cTn id="28" fill="hold">
+                            <p:stCondLst>
+                              <p:cond delay="0"/>
+                            </p:stCondLst>
+                            <p:childTnLst>
+                              <p:par>
+                                <p:cTn id="29" presetID="9" presetClass="entr" presetSubtype="0" fill="hold" grpId="0" nodeType="clickEffect">
+                                  <p:stCondLst>
+                                    <p:cond delay="0"/>
+                                  </p:stCondLst>
+                                  <p:childTnLst>
+                                    <p:set>
+                                      <p:cBhvr>
+                                        <p:cTn id="30" dur="1" fill="hold">
+                                          <p:stCondLst>
+                                            <p:cond delay="0"/>
+                                          </p:stCondLst>
+                                        </p:cTn>
+                                        <p:tgtEl>
+                                          <p:spTgt spid="9"/>
+                                        </p:tgtEl>
+                                        <p:attrNameLst>
+                                          <p:attrName>style.visibility</p:attrName>
+                                        </p:attrNameLst>
+                                      </p:cBhvr>
+                                      <p:to>
+                                        <p:strVal val="visible"/>
+                                      </p:to>
+                                    </p:set>
+                                    <p:animEffect transition="in" filter="dissolve">
+                                      <p:cBhvr>
+                                        <p:cTn id="31" dur="500"/>
+                                        <p:tgtEl>
+                                          <p:spTgt spid="9"/>
+                                        </p:tgtEl>
+                                      </p:cBhvr>
+                                    </p:animEffect>
+                                  </p:childTnLst>
+                                </p:cTn>
+                              </p:par>
+                            </p:childTnLst>
+                          </p:cTn>
+                        </p:par>
+                      </p:childTnLst>
+                    </p:cTn>
+                  </p:par>
+                </p:childTnLst>
+              </p:cTn>
+              <p:prevCondLst>
+                <p:cond evt="onPrev" delay="0">
+                  <p:tgtEl>
+                    <p:sldTgt/>
+                  </p:tgtEl>
+                </p:cond>
+              </p:prevCondLst>
+              <p:nextCondLst>
+                <p:cond evt="onNext" delay="0">
+                  <p:tgtEl>
+                    <p:sldTgt/>
+                  </p:tgtEl>
+                </p:cond>
+              </p:nextCondLst>
+            </p:seq>
+          </p:childTnLst>
+        </p:cTn>
+      </p:par>
+    </p:tnLst>
+    <p:bldLst>
+      <p:bldP spid="50182" grpId="0"/>
+      <p:bldP spid="729097" grpId="0" animBg="1"/>
+      <p:bldP spid="8" grpId="0"/>
+      <p:bldP spid="9" grpId="0"/>
+    </p:bldLst>
+  </p:timing>
+</p:sld>
+</file>
+
 <file path=ppt/slides/slide3.xml><?xml version="1.0" encoding="utf-8"?>
 <p:sld xmlns:a="http://schemas.openxmlformats.org/drawingml/2006/main" xmlns:r="http://schemas.openxmlformats.org/officeDocument/2006/relationships" xmlns:p="http://schemas.openxmlformats.org/presentationml/2006/main">
   <p:cSld>
@@ -10703,7 +12336,7 @@
           <a:graphicData uri="http://schemas.openxmlformats.org/presentationml/2006/ole">
             <mc:AlternateContent xmlns:mc="http://schemas.openxmlformats.org/markup-compatibility/2006">
               <mc:Choice xmlns:v="urn:schemas-microsoft-com:vml" Requires="v">
-                <p:oleObj spid="_x0000_s108624" name="Equation" r:id="rId5" imgW="1574800" imgH="279400" progId="Equation.DSMT4">
+                <p:oleObj spid="_x0000_s108636" name="Equation" r:id="rId5" imgW="1574800" imgH="279400" progId="Equation.DSMT4">
                   <p:embed/>
                 </p:oleObj>
               </mc:Choice>
@@ -10779,7 +12412,7 @@
           <a:graphicData uri="http://schemas.openxmlformats.org/presentationml/2006/ole">
             <mc:AlternateContent xmlns:mc="http://schemas.openxmlformats.org/markup-compatibility/2006">
               <mc:Choice xmlns:v="urn:schemas-microsoft-com:vml" Requires="v">
-                <p:oleObj spid="_x0000_s108625" name="Equation" r:id="rId7" imgW="1600200" imgH="254000" progId="Equation.DSMT4">
+                <p:oleObj spid="_x0000_s108637" name="Equation" r:id="rId7" imgW="1600200" imgH="254000" progId="Equation.DSMT4">
                   <p:embed/>
                 </p:oleObj>
               </mc:Choice>
@@ -10835,13 +12468,13 @@
   <p:clrMapOvr>
     <a:masterClrMapping/>
   </p:clrMapOvr>
-  <mc:AlternateContent xmlns:mc="http://schemas.openxmlformats.org/markup-compatibility/2006">
-    <mc:Choice xmlns:p14="http://schemas.microsoft.com/office/powerpoint/2010/main" Requires="p14">
+  <mc:AlternateContent xmlns:mc="http://schemas.openxmlformats.org/markup-compatibility/2006" xmlns:p14="http://schemas.microsoft.com/office/powerpoint/2010/main">
+    <mc:Choice Requires="p14">
       <p:transition spd="slow" p14:dur="1200" advClick="0">
         <p:fade thruBlk="1"/>
       </p:transition>
     </mc:Choice>
-    <mc:Fallback>
+    <mc:Fallback xmlns="">
       <p:transition xmlns:p14="http://schemas.microsoft.com/office/powerpoint/2010/main" spd="slow" advClick="0">
         <p:fade thruBlk="1"/>
       </p:transition>
@@ -11259,7 +12892,7 @@
           <a:graphicData uri="http://schemas.openxmlformats.org/presentationml/2006/ole">
             <mc:AlternateContent xmlns:mc="http://schemas.openxmlformats.org/markup-compatibility/2006">
               <mc:Choice xmlns:v="urn:schemas-microsoft-com:vml" Requires="v">
-                <p:oleObj spid="_x0000_s502797" name="Equation" r:id="rId5" imgW="1574800" imgH="279400" progId="Equation.DSMT4">
+                <p:oleObj spid="_x0000_s502809" name="Equation" r:id="rId5" imgW="1574800" imgH="279400" progId="Equation.DSMT4">
                   <p:embed/>
                 </p:oleObj>
               </mc:Choice>
@@ -11335,7 +12968,7 @@
           <a:graphicData uri="http://schemas.openxmlformats.org/presentationml/2006/ole">
             <mc:AlternateContent xmlns:mc="http://schemas.openxmlformats.org/markup-compatibility/2006">
               <mc:Choice xmlns:v="urn:schemas-microsoft-com:vml" Requires="v">
-                <p:oleObj spid="_x0000_s502798" name="Equation" r:id="rId7" imgW="1485900" imgH="254000" progId="Equation.DSMT4">
+                <p:oleObj spid="_x0000_s502810" name="Equation" r:id="rId7" imgW="1485900" imgH="254000" progId="Equation.DSMT4">
                   <p:embed/>
                 </p:oleObj>
               </mc:Choice>
@@ -11542,7 +13175,6 @@
               <a:rPr lang="en-US" sz="3600" dirty="0" smtClean="0"/>
               <a:t> Variance Formula</a:t>
             </a:r>
-            <a:endParaRPr lang="en-US" sz="3600" dirty="0" smtClean="0"/>
           </a:p>
         </p:txBody>
       </p:sp>
@@ -11926,7 +13558,7 @@
           <a:graphicData uri="http://schemas.openxmlformats.org/presentationml/2006/ole">
             <mc:AlternateContent xmlns:mc="http://schemas.openxmlformats.org/markup-compatibility/2006">
               <mc:Choice xmlns:v="urn:schemas-microsoft-com:vml" Requires="v">
-                <p:oleObj spid="_x0000_s11319" name="Equation" r:id="rId5" imgW="914400" imgH="179640" progId="Equation.DSMT4">
+                <p:oleObj spid="_x0000_s11326" name="Equation" r:id="rId5" imgW="914400" imgH="179640" progId="Equation.DSMT4">
                   <p:embed/>
                 </p:oleObj>
               </mc:Choice>
@@ -13925,20 +15557,20 @@
             <p:ph idx="4294967295"/>
             <p:extLst>
               <p:ext uri="{D42A27DB-BD31-4B8C-83A1-F6EECF244321}">
-                <p14:modId xmlns:p14="http://schemas.microsoft.com/office/powerpoint/2010/main" val="3790909516"/>
+                <p14:modId xmlns:p14="http://schemas.microsoft.com/office/powerpoint/2010/main" val="2789378599"/>
               </p:ext>
             </p:extLst>
           </p:nvPr>
         </p:nvGraphicFramePr>
         <p:xfrm>
-          <a:off x="3643313" y="4729163"/>
+          <a:off x="3173413" y="4729163"/>
           <a:ext cx="4344987" cy="1757362"/>
         </p:xfrm>
         <a:graphic>
           <a:graphicData uri="http://schemas.openxmlformats.org/presentationml/2006/ole">
             <mc:AlternateContent xmlns:mc="http://schemas.openxmlformats.org/markup-compatibility/2006">
               <mc:Choice xmlns:v="urn:schemas-microsoft-com:vml" Requires="v">
-                <p:oleObj spid="_x0000_s266426" name="Equation" r:id="rId5" imgW="1130300" imgH="457200" progId="Equation.DSMT4">
+                <p:oleObj spid="_x0000_s266453" name="Equation" r:id="rId5" imgW="1130300" imgH="457200" progId="Equation.DSMT4">
                   <p:embed/>
                 </p:oleObj>
               </mc:Choice>
@@ -13962,7 +15594,7 @@
                     </p:blipFill>
                     <p:spPr bwMode="auto">
                       <a:xfrm>
-                        <a:off x="3643313" y="4729163"/>
+                        <a:off x="3173413" y="4729163"/>
                         <a:ext cx="4344987" cy="1757362"/>
                       </a:xfrm>
                       <a:prstGeom prst="rect">
@@ -13987,25 +15619,25 @@
           <p:nvPr>
             <p:extLst>
               <p:ext uri="{D42A27DB-BD31-4B8C-83A1-F6EECF244321}">
-                <p14:modId xmlns:p14="http://schemas.microsoft.com/office/powerpoint/2010/main" val="636112096"/>
+                <p14:modId xmlns:p14="http://schemas.microsoft.com/office/powerpoint/2010/main" val="2393977884"/>
               </p:ext>
             </p:extLst>
           </p:nvPr>
         </p:nvGraphicFramePr>
         <p:xfrm>
-          <a:off x="3916363" y="3808413"/>
-          <a:ext cx="3240087" cy="1831975"/>
+          <a:off x="3348038" y="3732213"/>
+          <a:ext cx="3030537" cy="1884362"/>
         </p:xfrm>
         <a:graphic>
           <a:graphicData uri="http://schemas.openxmlformats.org/presentationml/2006/ole">
             <mc:AlternateContent xmlns:mc="http://schemas.openxmlformats.org/markup-compatibility/2006">
               <mc:Choice xmlns:v="urn:schemas-microsoft-com:vml" Requires="v">
-                <p:oleObj spid="_x0000_s266427" name="Equation" r:id="rId7" imgW="787400" imgH="444500" progId="Equation.DSMT4">
+                <p:oleObj spid="_x0000_s266454" name="Equation" r:id="rId7" imgW="736600" imgH="457200" progId="Equation.DSMT4">
                   <p:embed/>
                 </p:oleObj>
               </mc:Choice>
               <mc:Fallback>
-                <p:oleObj name="Equation" r:id="rId7" imgW="787400" imgH="444500" progId="Equation.DSMT4">
+                <p:oleObj name="Equation" r:id="rId7" imgW="736600" imgH="457200" progId="Equation.DSMT4">
                   <p:embed/>
                   <p:pic>
                     <p:nvPicPr>
@@ -14024,8 +15656,8 @@
                     </p:blipFill>
                     <p:spPr bwMode="auto">
                       <a:xfrm>
-                        <a:off x="3916363" y="3808413"/>
-                        <a:ext cx="3240087" cy="1831975"/>
+                        <a:off x="3348038" y="3732213"/>
+                        <a:ext cx="3030537" cy="1884362"/>
                       </a:xfrm>
                       <a:prstGeom prst="rect">
                         <a:avLst/>
@@ -14062,7 +15694,7 @@
           <a:graphicData uri="http://schemas.openxmlformats.org/presentationml/2006/ole">
             <mc:AlternateContent xmlns:mc="http://schemas.openxmlformats.org/markup-compatibility/2006">
               <mc:Choice xmlns:v="urn:schemas-microsoft-com:vml" Requires="v">
-                <p:oleObj spid="_x0000_s266428" name="Equation" r:id="rId9" imgW="635000" imgH="241300" progId="Equation.DSMT4">
+                <p:oleObj spid="_x0000_s266455" name="Equation" r:id="rId9" imgW="635000" imgH="241300" progId="Equation.DSMT4">
                   <p:embed/>
                 </p:oleObj>
               </mc:Choice>
@@ -14132,7 +15764,7 @@
           <a:graphicData uri="http://schemas.openxmlformats.org/presentationml/2006/ole">
             <mc:AlternateContent xmlns:mc="http://schemas.openxmlformats.org/markup-compatibility/2006">
               <mc:Choice xmlns:v="urn:schemas-microsoft-com:vml" Requires="v">
-                <p:oleObj spid="_x0000_s266429" name="Equation" r:id="rId11" imgW="1117600" imgH="444500" progId="Equation.DSMT4">
+                <p:oleObj spid="_x0000_s266456" name="Equation" r:id="rId11" imgW="1117600" imgH="444500" progId="Equation.DSMT4">
                   <p:embed/>
                 </p:oleObj>
               </mc:Choice>
@@ -14239,7 +15871,7 @@
           <a:graphicData uri="http://schemas.openxmlformats.org/presentationml/2006/ole">
             <mc:AlternateContent xmlns:mc="http://schemas.openxmlformats.org/markup-compatibility/2006">
               <mc:Choice xmlns:v="urn:schemas-microsoft-com:vml" Requires="v">
-                <p:oleObj spid="_x0000_s266430" name="Equation" r:id="rId13" imgW="1155700" imgH="444500" progId="Equation.DSMT4">
+                <p:oleObj spid="_x0000_s266457" name="Equation" r:id="rId13" imgW="1155700" imgH="444500" progId="Equation.DSMT4">
                   <p:embed/>
                 </p:oleObj>
               </mc:Choice>
@@ -14629,7 +16261,7 @@
           <p:nvPr>
             <p:extLst>
               <p:ext uri="{D42A27DB-BD31-4B8C-83A1-F6EECF244321}">
-                <p14:modId xmlns:p14="http://schemas.microsoft.com/office/powerpoint/2010/main" val="3529469954"/>
+                <p14:modId xmlns:p14="http://schemas.microsoft.com/office/powerpoint/2010/main" val="586300245"/>
               </p:ext>
             </p:extLst>
           </p:nvPr>
@@ -14642,7 +16274,7 @@
           <a:graphicData uri="http://schemas.openxmlformats.org/presentationml/2006/ole">
             <mc:AlternateContent xmlns:mc="http://schemas.openxmlformats.org/markup-compatibility/2006">
               <mc:Choice xmlns:v="urn:schemas-microsoft-com:vml" Requires="v">
-                <p:oleObj spid="_x0000_s491570" name="Equation" r:id="rId5" imgW="1562100" imgH="482600" progId="Equation.DSMT4">
+                <p:oleObj spid="_x0000_s491584" name="Equation" r:id="rId5" imgW="1562100" imgH="482600" progId="Equation.DSMT4">
                   <p:embed/>
                 </p:oleObj>
               </mc:Choice>
@@ -14810,8 +16442,8 @@
         </p:nvSpPr>
         <p:spPr>
           <a:xfrm>
-            <a:off x="613834" y="984250"/>
-            <a:ext cx="5519360" cy="830997"/>
+            <a:off x="613834" y="781050"/>
+            <a:ext cx="5152672" cy="1569660"/>
           </a:xfrm>
           <a:prstGeom prst="rect">
             <a:avLst/>
@@ -14832,7 +16464,19 @@
                 <a:latin typeface="Comic Sans MS"/>
                 <a:cs typeface="Comic Sans MS"/>
               </a:rPr>
-              <a:t>cleverer approach:</a:t>
+              <a:t>total expectation</a:t>
+            </a:r>
+          </a:p>
+          <a:p>
+            <a:r>
+              <a:rPr lang="en-US" sz="4800" dirty="0" smtClean="0">
+                <a:solidFill>
+                  <a:srgbClr val="660066"/>
+                </a:solidFill>
+                <a:latin typeface="Comic Sans MS"/>
+                <a:cs typeface="Comic Sans MS"/>
+              </a:rPr>
+              <a:t> approach:</a:t>
             </a:r>
           </a:p>
         </p:txBody>
@@ -14859,7 +16503,7 @@
           <a:graphicData uri="http://schemas.openxmlformats.org/presentationml/2006/ole">
             <mc:AlternateContent xmlns:mc="http://schemas.openxmlformats.org/markup-compatibility/2006">
               <mc:Choice xmlns:v="urn:schemas-microsoft-com:vml" Requires="v">
-                <p:oleObj spid="_x0000_s491571" name="Equation" r:id="rId7" imgW="520700" imgH="241300" progId="Equation.DSMT4">
+                <p:oleObj spid="_x0000_s491585" name="Equation" r:id="rId7" imgW="520700" imgH="241300" progId="Equation.DSMT4">
                   <p:embed/>
                 </p:oleObj>
               </mc:Choice>
@@ -14920,13 +16564,13 @@
   <p:clrMapOvr>
     <a:masterClrMapping/>
   </p:clrMapOvr>
-  <mc:AlternateContent xmlns:mc="http://schemas.openxmlformats.org/markup-compatibility/2006">
-    <mc:Choice xmlns:p14="http://schemas.microsoft.com/office/powerpoint/2010/main" Requires="p14">
+  <mc:AlternateContent xmlns:mc="http://schemas.openxmlformats.org/markup-compatibility/2006" xmlns:p14="http://schemas.microsoft.com/office/powerpoint/2010/main">
+    <mc:Choice Requires="p14">
       <p:transition spd="slow" p14:dur="900" advClick="0">
         <p:fade thruBlk="1"/>
       </p:transition>
     </mc:Choice>
-    <mc:Fallback>
+    <mc:Fallback xmlns="">
       <p:transition xmlns:p14="http://schemas.microsoft.com/office/powerpoint/2010/main" spd="slow" advClick="0">
         <p:fade thruBlk="1"/>
       </p:transition>
@@ -15049,13 +16693,13 @@
 
 <file path=ppt/tags/tag11.xml><?xml version="1.0" encoding="utf-8"?>
 <p:tagLst xmlns:a="http://schemas.openxmlformats.org/drawingml/2006/main" xmlns:r="http://schemas.openxmlformats.org/officeDocument/2006/relationships" xmlns:p="http://schemas.openxmlformats.org/presentationml/2006/main">
-  <p:tag name="TIMING" val="|10.8|3.8|15.3"/>
+  <p:tag name="TIMING" val="|18.3"/>
 </p:tagLst>
 </file>
 
 <file path=ppt/tags/tag12.xml><?xml version="1.0" encoding="utf-8"?>
 <p:tagLst xmlns:a="http://schemas.openxmlformats.org/drawingml/2006/main" xmlns:r="http://schemas.openxmlformats.org/officeDocument/2006/relationships" xmlns:p="http://schemas.openxmlformats.org/presentationml/2006/main">
-  <p:tag name="TIMING" val="|27.5|2.8|22.3|27.1|1.1"/>
+  <p:tag name="TIMING" val="|10.8|3.8|15.3"/>
 </p:tagLst>
 </file>
 
@@ -15066,6 +16710,12 @@
 </file>
 
 <file path=ppt/tags/tag14.xml><?xml version="1.0" encoding="utf-8"?>
+<p:tagLst xmlns:a="http://schemas.openxmlformats.org/drawingml/2006/main" xmlns:r="http://schemas.openxmlformats.org/officeDocument/2006/relationships" xmlns:p="http://schemas.openxmlformats.org/presentationml/2006/main">
+  <p:tag name="TIMING" val="|27.5|2.8|22.3|27.1|1.1"/>
+</p:tagLst>
+</file>
+
+<file path=ppt/tags/tag15.xml><?xml version="1.0" encoding="utf-8"?>
 <p:tagLst xmlns:a="http://schemas.openxmlformats.org/drawingml/2006/main" xmlns:r="http://schemas.openxmlformats.org/officeDocument/2006/relationships" xmlns:p="http://schemas.openxmlformats.org/presentationml/2006/main">
   <p:tag name="TIMING" val="|9.3|5.2|4.6|4.9"/>
 </p:tagLst>

</xml_diff>